<commit_message>
add MS Office Tips file
</commit_message>
<xml_diff>
--- a/tool-tips.pptx
+++ b/tool-tips.pptx
@@ -1,22 +1,27 @@
 
 <file path=ppt/presentation.xml><?xml version="1.0" encoding="utf-8"?>
-<p:presentation xmlns:a="http://schemas.openxmlformats.org/drawingml/2006/main" xmlns:r="http://schemas.openxmlformats.org/officeDocument/2006/relationships" xmlns:p="http://schemas.openxmlformats.org/presentationml/2006/main" showSpecialPlsOnTitleSld="0" saveSubsetFonts="1">
+<p:presentation xmlns:a="http://schemas.openxmlformats.org/drawingml/2006/main" xmlns:r="http://schemas.openxmlformats.org/officeDocument/2006/relationships" xmlns:p="http://schemas.openxmlformats.org/presentationml/2006/main" showSpecialPlsOnTitleSld="0">
   <p:sldMasterIdLst>
     <p:sldMasterId id="2147483648" r:id="rId4"/>
   </p:sldMasterIdLst>
   <p:notesMasterIdLst>
-    <p:notesMasterId r:id="rId8"/>
+    <p:notesMasterId r:id="rId10"/>
   </p:notesMasterIdLst>
   <p:handoutMasterIdLst>
-    <p:handoutMasterId r:id="rId9"/>
+    <p:handoutMasterId r:id="rId11"/>
   </p:handoutMasterIdLst>
   <p:sldIdLst>
     <p:sldId id="383" r:id="rId5"/>
     <p:sldId id="384" r:id="rId6"/>
     <p:sldId id="385" r:id="rId7"/>
+    <p:sldId id="386" r:id="rId8"/>
+    <p:sldId id="388" r:id="rId9"/>
   </p:sldIdLst>
   <p:sldSz cx="12192000" cy="6858000"/>
   <p:notesSz cx="9388475" cy="7102475"/>
+  <p:custDataLst>
+    <p:tags r:id="rId12"/>
+  </p:custDataLst>
   <p:defaultTextStyle>
     <a:defPPr>
       <a:defRPr lang="en-US"/>
@@ -205,7 +210,7 @@
           <a:p>
             <a:fld id="{7CCA049B-3A46-4BDA-A8F5-2925B00FE570}" type="datetimeFigureOut">
               <a:rPr lang="en-US" smtClean="0"/>
-              <a:t>11/26/2023</a:t>
+              <a:t>11/29/2023</a:t>
             </a:fld>
             <a:endParaRPr lang="en-US" dirty="0"/>
           </a:p>
@@ -280,7 +285,7 @@
     </p:spTree>
     <p:extLst>
       <p:ext uri="{BB962C8B-B14F-4D97-AF65-F5344CB8AC3E}">
-        <p14:creationId xmlns:p14="http://schemas.microsoft.com/office/powerpoint/2010/main" val="791092665"/>
+        <p14:creationId xmlns:p14="http://schemas.microsoft.com/office/powerpoint/2010/main" val="1"/>
       </p:ext>
     </p:extLst>
   </p:cSld>
@@ -370,7 +375,7 @@
           <a:p>
             <a:fld id="{44C46CEC-428A-4DD0-A7C7-21AF8DE33E93}" type="datetimeFigureOut">
               <a:rPr lang="en-US" smtClean="0"/>
-              <a:t>11/26/2023</a:t>
+              <a:t>11/29/2023</a:t>
             </a:fld>
             <a:endParaRPr lang="en-US" dirty="0"/>
           </a:p>
@@ -535,11 +540,6 @@
         </p:txBody>
       </p:sp>
     </p:spTree>
-    <p:extLst>
-      <p:ext uri="{BB962C8B-B14F-4D97-AF65-F5344CB8AC3E}">
-        <p14:creationId xmlns:p14="http://schemas.microsoft.com/office/powerpoint/2010/main" val="1402020577"/>
-      </p:ext>
-    </p:extLst>
   </p:cSld>
   <p:clrMap bg1="lt1" tx1="dk1" bg2="lt2" tx2="dk2" accent1="accent1" accent2="accent2" accent3="accent3" accent4="accent4" accent5="accent5" accent6="accent6" hlink="hlink" folHlink="folHlink"/>
   <p:notesStyle>
@@ -738,11 +738,6 @@
         </p:txBody>
       </p:sp>
     </p:spTree>
-    <p:extLst>
-      <p:ext uri="{BB962C8B-B14F-4D97-AF65-F5344CB8AC3E}">
-        <p14:creationId xmlns:p14="http://schemas.microsoft.com/office/powerpoint/2010/main" val="2076836035"/>
-      </p:ext>
-    </p:extLst>
   </p:cSld>
   <p:clrMapOvr>
     <a:masterClrMapping/>
@@ -851,11 +846,114 @@
         </p:txBody>
       </p:sp>
     </p:spTree>
-    <p:extLst>
-      <p:ext uri="{BB962C8B-B14F-4D97-AF65-F5344CB8AC3E}">
-        <p14:creationId xmlns:p14="http://schemas.microsoft.com/office/powerpoint/2010/main" val="1732265514"/>
-      </p:ext>
-    </p:extLst>
+  </p:cSld>
+  <p:clrMapOvr>
+    <a:masterClrMapping/>
+  </p:clrMapOvr>
+</p:notes>
+</file>
+
+<file path=ppt/notesSlides/notesSlide3.xml><?xml version="1.0" encoding="utf-8"?>
+<p:notes xmlns:a="http://schemas.openxmlformats.org/drawingml/2006/main" xmlns:r="http://schemas.openxmlformats.org/officeDocument/2006/relationships" xmlns:p="http://schemas.openxmlformats.org/presentationml/2006/main">
+  <p:cSld>
+    <p:spTree>
+      <p:nvGrpSpPr>
+        <p:cNvPr id="1" name=""/>
+        <p:cNvGrpSpPr/>
+        <p:nvPr/>
+      </p:nvGrpSpPr>
+      <p:grpSpPr>
+        <a:xfrm>
+          <a:off x="0" y="0"/>
+          <a:ext cx="0" cy="0"/>
+          <a:chOff x="0" y="0"/>
+          <a:chExt cx="0" cy="0"/>
+        </a:xfrm>
+      </p:grpSpPr>
+      <p:sp>
+        <p:nvSpPr>
+          <p:cNvPr id="2" name="Slide Image Placeholder 1"/>
+          <p:cNvSpPr>
+            <a:spLocks noGrp="1" noRot="1" noChangeAspect="1"/>
+          </p:cNvSpPr>
+          <p:nvPr>
+            <p:ph type="sldImg"/>
+          </p:nvPr>
+        </p:nvSpPr>
+        <p:spPr/>
+      </p:sp>
+      <p:sp>
+        <p:nvSpPr>
+          <p:cNvPr id="3" name="Notes Placeholder 2"/>
+          <p:cNvSpPr>
+            <a:spLocks noGrp="1"/>
+          </p:cNvSpPr>
+          <p:nvPr>
+            <p:ph type="body" idx="1"/>
+          </p:nvPr>
+        </p:nvSpPr>
+        <p:spPr/>
+        <p:txBody>
+          <a:bodyPr/>
+          <a:lstStyle/>
+          <a:p>
+            <a:r>
+              <a:rPr lang="en-US" dirty="0"/>
+              <a:t>To use this title animation slide with a new image simply 1) move the top semi-transparent shape</a:t>
+            </a:r>
+            <a:r>
+              <a:rPr lang="en-US" baseline="0" dirty="0"/>
+              <a:t> </a:t>
+            </a:r>
+            <a:r>
+              <a:rPr lang="en-US" dirty="0"/>
+              <a:t>to the side, 2) delete placeholder image,</a:t>
+            </a:r>
+            <a:r>
+              <a:rPr lang="en-US" baseline="0" dirty="0"/>
+              <a:t> </a:t>
+            </a:r>
+            <a:br>
+              <a:rPr lang="en-US" baseline="0" dirty="0"/>
+            </a:br>
+            <a:r>
+              <a:rPr lang="en-US" baseline="0" dirty="0"/>
+              <a:t>3) click on the picture icon to add a new picture, 4) </a:t>
+            </a:r>
+            <a:r>
+              <a:rPr lang="en-US" dirty="0"/>
+              <a:t>Move semi-transparent shape back to original position, 5) Update text on slide.</a:t>
+            </a:r>
+          </a:p>
+          <a:p>
+            <a:endParaRPr lang="en-US" dirty="0"/>
+          </a:p>
+        </p:txBody>
+      </p:sp>
+      <p:sp>
+        <p:nvSpPr>
+          <p:cNvPr id="4" name="Slide Number Placeholder 3"/>
+          <p:cNvSpPr>
+            <a:spLocks noGrp="1"/>
+          </p:cNvSpPr>
+          <p:nvPr>
+            <p:ph type="sldNum" sz="quarter" idx="10"/>
+          </p:nvPr>
+        </p:nvSpPr>
+        <p:spPr/>
+        <p:txBody>
+          <a:bodyPr/>
+          <a:lstStyle/>
+          <a:p>
+            <a:fld id="{4CBCEA92-F142-4D57-B507-37BDAF44710C}" type="slidenum">
+              <a:rPr lang="en-US" smtClean="0"/>
+              <a:t>4</a:t>
+            </a:fld>
+            <a:endParaRPr lang="en-US" dirty="0"/>
+          </a:p>
+        </p:txBody>
+      </p:sp>
+    </p:spTree>
   </p:cSld>
   <p:clrMapOvr>
     <a:masterClrMapping/>
@@ -930,7 +1028,6 @@
               <a:buSzTx/>
               <a:buFontTx/>
               <a:buNone/>
-              <a:tabLst/>
               <a:defRPr/>
             </a:pPr>
             <a:endParaRPr kumimoji="0" lang="en-US" sz="1800" b="0" i="0" u="none" strike="noStrike" kern="0" cap="none" spc="0" normalizeH="0" baseline="0" noProof="0" dirty="0">
@@ -943,7 +1040,7 @@
               <a:effectLst/>
               <a:uLnTx/>
               <a:uFillTx/>
-              <a:latin typeface="Segoe UI"/>
+              <a:latin typeface="Segoe UI" panose="020B0502040204020203"/>
               <a:ea typeface="+mn-ea"/>
               <a:cs typeface="+mn-cs"/>
             </a:endParaRPr>
@@ -992,7 +1089,6 @@
               <a:buSzTx/>
               <a:buFontTx/>
               <a:buNone/>
-              <a:tabLst/>
               <a:defRPr/>
             </a:pPr>
             <a:endParaRPr kumimoji="0" lang="en-US" sz="1800" b="0" i="0" u="none" strike="noStrike" kern="0" cap="none" spc="0" normalizeH="0" baseline="0" noProof="0" dirty="0">
@@ -1005,7 +1101,7 @@
               <a:effectLst/>
               <a:uLnTx/>
               <a:uFillTx/>
-              <a:latin typeface="Segoe UI"/>
+              <a:latin typeface="Segoe UI" panose="020B0502040204020203"/>
               <a:ea typeface="+mn-ea"/>
               <a:cs typeface="+mn-cs"/>
             </a:endParaRPr>
@@ -1054,7 +1150,6 @@
               <a:buSzTx/>
               <a:buFontTx/>
               <a:buNone/>
-              <a:tabLst/>
               <a:defRPr/>
             </a:pPr>
             <a:endParaRPr kumimoji="0" lang="en-US" sz="1800" b="0" i="0" u="none" strike="noStrike" kern="0" cap="none" spc="0" normalizeH="0" baseline="0" noProof="0" dirty="0">
@@ -1067,7 +1162,7 @@
               <a:effectLst/>
               <a:uLnTx/>
               <a:uFillTx/>
-              <a:latin typeface="Segoe UI"/>
+              <a:latin typeface="Segoe UI" panose="020B0502040204020203"/>
               <a:ea typeface="+mn-ea"/>
               <a:cs typeface="+mn-cs"/>
             </a:endParaRPr>
@@ -1116,7 +1211,6 @@
               <a:buSzTx/>
               <a:buFontTx/>
               <a:buNone/>
-              <a:tabLst/>
               <a:defRPr/>
             </a:pPr>
             <a:endParaRPr kumimoji="0" lang="en-US" sz="1800" b="0" i="0" u="none" strike="noStrike" kern="0" cap="none" spc="0" normalizeH="0" baseline="0" noProof="0" dirty="0">
@@ -1129,7 +1223,7 @@
               <a:effectLst/>
               <a:uLnTx/>
               <a:uFillTx/>
-              <a:latin typeface="Segoe UI"/>
+              <a:latin typeface="Segoe UI" panose="020B0502040204020203"/>
               <a:ea typeface="+mn-ea"/>
               <a:cs typeface="+mn-cs"/>
             </a:endParaRPr>
@@ -1197,11 +1291,6 @@
         </p:txBody>
       </p:sp>
     </p:spTree>
-    <p:extLst>
-      <p:ext uri="{BB962C8B-B14F-4D97-AF65-F5344CB8AC3E}">
-        <p14:creationId xmlns:p14="http://schemas.microsoft.com/office/powerpoint/2010/main" val="2301043048"/>
-      </p:ext>
-    </p:extLst>
   </p:cSld>
   <p:clrMapOvr>
     <a:overrideClrMapping bg1="dk1" tx1="lt1" bg2="dk2" tx2="lt2" accent1="accent1" accent2="accent2" accent3="accent3" accent4="accent4" accent5="accent5" accent6="accent6" hlink="hlink" folHlink="folHlink"/>
@@ -1885,7 +1974,7 @@
             <a:spAutoFit/>
           </a:bodyPr>
           <a:lstStyle>
-            <a:lvl1pPr marL="0" marR="0" indent="0" algn="l" defTabSz="914367" rtl="0" eaLnBrk="1" fontAlgn="auto" latinLnBrk="0" hangingPunct="1">
+            <a:lvl1pPr marL="0" marR="0" indent="0" algn="l" defTabSz="914400" rtl="0" eaLnBrk="1" fontAlgn="auto" latinLnBrk="0" hangingPunct="1">
               <a:lnSpc>
                 <a:spcPct val="90000"/>
               </a:lnSpc>
@@ -1899,10 +1988,9 @@
                 <a:schemeClr val="tx1"/>
               </a:buClr>
               <a:buSzPct val="90000"/>
-              <a:buFont typeface="Wingdings" pitchFamily="2" charset="2"/>
+              <a:buFont typeface="Wingdings" panose="05000000000000000000" pitchFamily="2" charset="2"/>
               <a:buNone/>
-              <a:tabLst/>
-              <a:defRPr lang="en-US" sz="3137" kern="1200" spc="0" baseline="0" dirty="0">
+              <a:defRPr lang="en-US" sz="3135" kern="1200" spc="0" baseline="0" dirty="0">
                 <a:gradFill>
                   <a:gsLst>
                     <a:gs pos="15000">
@@ -1921,20 +2009,18 @@
             </a:lvl1pPr>
             <a:lvl2pPr marL="0" indent="0">
               <a:buNone/>
-              <a:defRPr sz="1961"/>
+              <a:defRPr sz="1960"/>
             </a:lvl2pPr>
-            <a:lvl3pPr marL="227209" indent="0">
+            <a:lvl3pPr marL="227330" indent="0">
               <a:buNone/>
-              <a:tabLst/>
-              <a:defRPr sz="1961"/>
+              <a:defRPr sz="1960"/>
             </a:lvl3pPr>
-            <a:lvl4pPr marL="451306" indent="0">
+            <a:lvl4pPr marL="451485" indent="0">
               <a:buNone/>
               <a:defRPr/>
             </a:lvl4pPr>
-            <a:lvl5pPr marL="672290" indent="0">
+            <a:lvl5pPr marL="672465" indent="0">
               <a:buNone/>
-              <a:tabLst/>
               <a:defRPr/>
             </a:lvl5pPr>
           </a:lstStyle>
@@ -2674,7 +2760,6 @@
           <a:p>
             <a:fld id="{4997E989-D798-4C62-8E93-3D2D613C2488}" type="slidenum">
               <a:rPr lang="en-US" smtClean="0"/>
-              <a:pPr/>
               <a:t>‹#›</a:t>
             </a:fld>
             <a:endParaRPr lang="en-US" dirty="0"/>
@@ -2682,11 +2767,6 @@
         </p:txBody>
       </p:sp>
     </p:spTree>
-    <p:extLst>
-      <p:ext uri="{BB962C8B-B14F-4D97-AF65-F5344CB8AC3E}">
-        <p14:creationId xmlns:p14="http://schemas.microsoft.com/office/powerpoint/2010/main" val="2158804360"/>
-      </p:ext>
-    </p:extLst>
   </p:cSld>
   <p:clrMapOvr>
     <a:masterClrMapping/>
@@ -3206,22 +3286,6 @@
       </p:bldP>
     </p:bldLst>
   </p:timing>
-  <p:extLst>
-    <p:ext uri="{DCECCB84-F9BA-43D5-87BE-67443E8EF086}">
-      <p15:sldGuideLst xmlns:p15="http://schemas.microsoft.com/office/powerpoint/2012/main">
-        <p15:guide id="1" orient="horz" pos="2160" userDrawn="1">
-          <p15:clr>
-            <a:srgbClr val="FBAE40"/>
-          </p15:clr>
-        </p15:guide>
-        <p15:guide id="2" pos="3840" userDrawn="1">
-          <p15:clr>
-            <a:srgbClr val="FBAE40"/>
-          </p15:clr>
-        </p15:guide>
-      </p15:sldGuideLst>
-    </p:ext>
-  </p:extLst>
 </p:sldLayout>
 </file>
 
@@ -3979,7 +4043,6 @@
           <a:p>
             <a:fld id="{4997E989-D798-4C62-8E93-3D2D613C2488}" type="slidenum">
               <a:rPr lang="en-US" smtClean="0"/>
-              <a:pPr/>
               <a:t>‹#›</a:t>
             </a:fld>
             <a:endParaRPr lang="en-US" dirty="0"/>
@@ -3987,31 +4050,10 @@
         </p:txBody>
       </p:sp>
     </p:spTree>
-    <p:extLst>
-      <p:ext uri="{BB962C8B-B14F-4D97-AF65-F5344CB8AC3E}">
-        <p14:creationId xmlns:p14="http://schemas.microsoft.com/office/powerpoint/2010/main" val="3153865956"/>
-      </p:ext>
-    </p:extLst>
   </p:cSld>
   <p:clrMapOvr>
     <a:masterClrMapping/>
   </p:clrMapOvr>
-  <p:extLst>
-    <p:ext uri="{DCECCB84-F9BA-43D5-87BE-67443E8EF086}">
-      <p15:sldGuideLst xmlns:p15="http://schemas.microsoft.com/office/powerpoint/2012/main">
-        <p15:guide id="1" orient="horz" pos="2160">
-          <p15:clr>
-            <a:srgbClr val="FBAE40"/>
-          </p15:clr>
-        </p15:guide>
-        <p15:guide id="2" pos="3840">
-          <p15:clr>
-            <a:srgbClr val="FBAE40"/>
-          </p15:clr>
-        </p15:guide>
-      </p15:sldGuideLst>
-    </p:ext>
-  </p:extLst>
 </p:sldLayout>
 </file>
 
@@ -5159,11 +5201,6 @@
         </p:txBody>
       </p:sp>
     </p:spTree>
-    <p:extLst>
-      <p:ext uri="{BB962C8B-B14F-4D97-AF65-F5344CB8AC3E}">
-        <p14:creationId xmlns:p14="http://schemas.microsoft.com/office/powerpoint/2010/main" val="3249118181"/>
-      </p:ext>
-    </p:extLst>
   </p:cSld>
   <p:clrMapOvr>
     <a:masterClrMapping/>
@@ -6824,7 +6861,7 @@
               <p:tmpl lvl="1">
                 <p:tnLst>
                   <p:par>
-                    <p:cTn presetID="2" presetClass="entr" presetSubtype="1" fill="hold" nodeType="withEffect" p14:presetBounceEnd="32000">
+                    <p:cTn presetID="2" presetClass="entr" presetSubtype="1" fill="hold" nodeType="withEffect">
                       <p:stCondLst>
                         <p:cond delay="0"/>
                       </p:stCondLst>
@@ -6847,7 +6884,7 @@
                             <p:strVal val="visible"/>
                           </p:to>
                         </p:set>
-                        <p:anim calcmode="lin" valueType="num" p14:bounceEnd="32000">
+                        <p:anim calcmode="lin" valueType="num">
                           <p:cBhvr additive="base">
                             <p:cTn dur="750" fill="hold"/>
                             <p:tgtEl>
@@ -6870,7 +6907,7 @@
                             </p:tav>
                           </p:tavLst>
                         </p:anim>
-                        <p:anim calcmode="lin" valueType="num" p14:bounceEnd="32000">
+                        <p:anim calcmode="lin" valueType="num">
                           <p:cBhvr additive="base">
                             <p:cTn dur="750" fill="hold"/>
                             <p:tgtEl>
@@ -7213,7 +7250,7 @@
               <p:tmpl lvl="1">
                 <p:tnLst>
                   <p:par>
-                    <p:cTn presetID="2" presetClass="entr" presetSubtype="1" fill="hold" nodeType="withEffect" p14:presetBounceEnd="32000">
+                    <p:cTn presetID="2" presetClass="entr" presetSubtype="1" fill="hold" nodeType="withEffect">
                       <p:stCondLst>
                         <p:cond delay="0"/>
                       </p:stCondLst>
@@ -7236,7 +7273,7 @@
                             <p:strVal val="visible"/>
                           </p:to>
                         </p:set>
-                        <p:anim calcmode="lin" valueType="num" p14:bounceEnd="32000">
+                        <p:anim calcmode="lin" valueType="num">
                           <p:cBhvr additive="base">
                             <p:cTn dur="750" fill="hold"/>
                             <p:tgtEl>
@@ -7259,7 +7296,7 @@
                             </p:tav>
                           </p:tavLst>
                         </p:anim>
-                        <p:anim calcmode="lin" valueType="num" p14:bounceEnd="32000">
+                        <p:anim calcmode="lin" valueType="num">
                           <p:cBhvr additive="base">
                             <p:cTn dur="750" fill="hold"/>
                             <p:tgtEl>
@@ -7602,7 +7639,7 @@
               <p:tmpl>
                 <p:tnLst>
                   <p:par>
-                    <p:cTn presetID="2" presetClass="entr" presetSubtype="1" fill="hold" nodeType="withEffect" p14:presetBounceEnd="32000">
+                    <p:cTn presetID="2" presetClass="entr" presetSubtype="1" fill="hold" nodeType="withEffect">
                       <p:stCondLst>
                         <p:cond delay="0"/>
                       </p:stCondLst>
@@ -7625,7 +7662,7 @@
                             <p:strVal val="visible"/>
                           </p:to>
                         </p:set>
-                        <p:anim calcmode="lin" valueType="num" p14:bounceEnd="32000">
+                        <p:anim calcmode="lin" valueType="num">
                           <p:cBhvr additive="base">
                             <p:cTn dur="750" fill="hold"/>
                             <p:tgtEl>
@@ -7648,7 +7685,7 @@
                             </p:tav>
                           </p:tavLst>
                         </p:anim>
-                        <p:anim calcmode="lin" valueType="num" p14:bounceEnd="32000">
+                        <p:anim calcmode="lin" valueType="num">
                           <p:cBhvr additive="base">
                             <p:cTn dur="750" fill="hold"/>
                             <p:tgtEl>
@@ -7683,7 +7720,7 @@
               <p:tmpl>
                 <p:tnLst>
                   <p:par>
-                    <p:cTn presetID="2" presetClass="entr" presetSubtype="1" fill="hold" nodeType="withEffect" p14:presetBounceEnd="32000">
+                    <p:cTn presetID="2" presetClass="entr" presetSubtype="1" fill="hold" nodeType="withEffect">
                       <p:stCondLst>
                         <p:cond delay="0"/>
                       </p:stCondLst>
@@ -7706,7 +7743,7 @@
                             <p:strVal val="visible"/>
                           </p:to>
                         </p:set>
-                        <p:anim calcmode="lin" valueType="num" p14:bounceEnd="32000">
+                        <p:anim calcmode="lin" valueType="num">
                           <p:cBhvr additive="base">
                             <p:cTn dur="750" fill="hold"/>
                             <p:tgtEl>
@@ -7729,7 +7766,7 @@
                             </p:tav>
                           </p:tavLst>
                         </p:anim>
-                        <p:anim calcmode="lin" valueType="num" p14:bounceEnd="32000">
+                        <p:anim calcmode="lin" valueType="num">
                           <p:cBhvr additive="base">
                             <p:cTn dur="750" fill="hold"/>
                             <p:tgtEl>
@@ -7764,7 +7801,7 @@
               <p:tmpl>
                 <p:tnLst>
                   <p:par>
-                    <p:cTn presetID="2" presetClass="entr" presetSubtype="1" fill="hold" nodeType="withEffect" p14:presetBounceEnd="32000">
+                    <p:cTn presetID="2" presetClass="entr" presetSubtype="1" fill="hold" nodeType="withEffect">
                       <p:stCondLst>
                         <p:cond delay="0"/>
                       </p:stCondLst>
@@ -7787,7 +7824,7 @@
                             <p:strVal val="visible"/>
                           </p:to>
                         </p:set>
-                        <p:anim calcmode="lin" valueType="num" p14:bounceEnd="32000">
+                        <p:anim calcmode="lin" valueType="num">
                           <p:cBhvr additive="base">
                             <p:cTn dur="750" fill="hold"/>
                             <p:tgtEl>
@@ -7810,7 +7847,7 @@
                             </p:tav>
                           </p:tavLst>
                         </p:anim>
-                        <p:anim calcmode="lin" valueType="num" p14:bounceEnd="32000">
+                        <p:anim calcmode="lin" valueType="num">
                           <p:cBhvr additive="base">
                             <p:cTn dur="750" fill="hold"/>
                             <p:tgtEl>
@@ -9085,7 +9122,7 @@
         <p:bldLst>
           <p:bldP spid="3" grpId="0" uiExpand="1">
             <p:tmplLst>
-              <p:tmpl>
+              <p:tmpl lvl="0">
                 <p:tnLst>
                   <p:par>
                     <p:cTn presetID="2" presetClass="entr" presetSubtype="4" decel="100000" fill="hold" nodeType="withEffect">
@@ -9166,7 +9203,7 @@
           </p:bldP>
           <p:bldP spid="7" grpId="0" uiExpand="1">
             <p:tmplLst>
-              <p:tmpl>
+              <p:tmpl lvl="0">
                 <p:tnLst>
                   <p:par>
                     <p:cTn presetID="2" presetClass="entr" presetSubtype="4" decel="100000" fill="hold" nodeType="withEffect">
@@ -9247,7 +9284,7 @@
           </p:bldP>
           <p:bldP spid="9" grpId="0">
             <p:tmplLst>
-              <p:tmpl>
+              <p:tmpl lvl="0">
                 <p:tnLst>
                   <p:par>
                     <p:cTn presetID="2" presetClass="entr" presetSubtype="4" decel="100000" fill="hold" nodeType="withEffect">
@@ -9328,7 +9365,7 @@
           </p:bldP>
           <p:bldP spid="10" grpId="0">
             <p:tmplLst>
-              <p:tmpl>
+              <p:tmpl lvl="0">
                 <p:tnLst>
                   <p:par>
                     <p:cTn presetID="2" presetClass="entr" presetSubtype="4" decel="100000" fill="hold" nodeType="withEffect">
@@ -9409,7 +9446,7 @@
           </p:bldP>
           <p:bldP spid="11" grpId="0">
             <p:tmplLst>
-              <p:tmpl>
+              <p:tmpl lvl="0">
                 <p:tnLst>
                   <p:par>
                     <p:cTn presetID="2" presetClass="entr" presetSubtype="4" decel="100000" fill="hold" nodeType="withEffect">
@@ -10273,7 +10310,7 @@
           </p:bldP>
           <p:bldP spid="19" grpId="0">
             <p:tmplLst>
-              <p:tmpl>
+              <p:tmpl lvl="0">
                 <p:tnLst>
                   <p:par>
                     <p:cTn presetID="2" presetClass="entr" presetSubtype="1" fill="hold" nodeType="withEffect">
@@ -10354,7 +10391,7 @@
           </p:bldP>
           <p:bldP spid="20" grpId="0">
             <p:tmplLst>
-              <p:tmpl>
+              <p:tmpl lvl="0">
                 <p:tnLst>
                   <p:par>
                     <p:cTn presetID="2" presetClass="entr" presetSubtype="1" fill="hold" nodeType="withEffect">
@@ -10435,7 +10472,7 @@
           </p:bldP>
           <p:bldP spid="21" grpId="0">
             <p:tmplLst>
-              <p:tmpl>
+              <p:tmpl lvl="0">
                 <p:tnLst>
                   <p:par>
                     <p:cTn presetID="2" presetClass="entr" presetSubtype="1" fill="hold" nodeType="withEffect">
@@ -10518,22 +10555,6 @@
       </p:timing>
     </mc:Fallback>
   </mc:AlternateContent>
-  <p:extLst>
-    <p:ext uri="{DCECCB84-F9BA-43D5-87BE-67443E8EF086}">
-      <p15:sldGuideLst xmlns:p15="http://schemas.microsoft.com/office/powerpoint/2012/main">
-        <p15:guide id="1" orient="horz" pos="2160">
-          <p15:clr>
-            <a:srgbClr val="FBAE40"/>
-          </p15:clr>
-        </p15:guide>
-        <p15:guide id="2" pos="3840">
-          <p15:clr>
-            <a:srgbClr val="FBAE40"/>
-          </p15:clr>
-        </p15:guide>
-      </p15:sldGuideLst>
-    </p:ext>
-  </p:extLst>
 </p:sldLayout>
 </file>
 
@@ -10870,7 +10891,6 @@
           <a:p>
             <a:fld id="{4997E989-D798-4C62-8E93-3D2D613C2488}" type="slidenum">
               <a:rPr lang="en-US" smtClean="0"/>
-              <a:pPr/>
               <a:t>‹#›</a:t>
             </a:fld>
             <a:endParaRPr lang="en-US" dirty="0"/>
@@ -10878,11 +10898,6 @@
         </p:txBody>
       </p:sp>
     </p:spTree>
-    <p:extLst>
-      <p:ext uri="{BB962C8B-B14F-4D97-AF65-F5344CB8AC3E}">
-        <p14:creationId xmlns:p14="http://schemas.microsoft.com/office/powerpoint/2010/main" val="1465193599"/>
-      </p:ext>
-    </p:extLst>
   </p:cSld>
   <p:clrMapOvr>
     <a:masterClrMapping/>
@@ -10987,7 +11002,6 @@
           <a:p>
             <a:fld id="{5AE1514C-5E56-4738-A1FF-4B1CFD2A3E36}" type="slidenum">
               <a:rPr lang="en-US" smtClean="0"/>
-              <a:pPr/>
               <a:t>‹#›</a:t>
             </a:fld>
             <a:endParaRPr lang="en-US" dirty="0"/>
@@ -11237,9 +11251,7 @@
       <p:sp>
         <p:nvSpPr>
           <p:cNvPr id="12" name="Slide Number Placeholder 7"/>
-          <p:cNvSpPr txBox="1">
-            <a:spLocks/>
-          </p:cNvSpPr>
+          <p:cNvSpPr txBox="1"/>
           <p:nvPr userDrawn="1"/>
         </p:nvSpPr>
         <p:spPr>
@@ -11355,7 +11367,6 @@
                   <a:schemeClr val="bg1"/>
                 </a:solidFill>
               </a:rPr>
-              <a:pPr/>
               <a:t>‹#›</a:t>
             </a:fld>
             <a:endParaRPr lang="en-US" dirty="0">
@@ -11367,11 +11378,6 @@
         </p:txBody>
       </p:sp>
     </p:spTree>
-    <p:extLst>
-      <p:ext uri="{BB962C8B-B14F-4D97-AF65-F5344CB8AC3E}">
-        <p14:creationId xmlns:p14="http://schemas.microsoft.com/office/powerpoint/2010/main" val="443957906"/>
-      </p:ext>
-    </p:extLst>
   </p:cSld>
   <p:clrMapOvr>
     <a:masterClrMapping/>
@@ -11713,7 +11719,6 @@
           <a:p>
             <a:fld id="{4997E989-D798-4C62-8E93-3D2D613C2488}" type="slidenum">
               <a:rPr lang="en-US" smtClean="0"/>
-              <a:pPr/>
               <a:t>‹#›</a:t>
             </a:fld>
             <a:endParaRPr lang="en-US" dirty="0"/>
@@ -11721,11 +11726,6 @@
         </p:txBody>
       </p:sp>
     </p:spTree>
-    <p:extLst>
-      <p:ext uri="{BB962C8B-B14F-4D97-AF65-F5344CB8AC3E}">
-        <p14:creationId xmlns:p14="http://schemas.microsoft.com/office/powerpoint/2010/main" val="1888233458"/>
-      </p:ext>
-    </p:extLst>
   </p:cSld>
   <p:clrMapOvr>
     <a:masterClrMapping/>
@@ -11779,7 +11779,7 @@
           <a:lstStyle>
             <a:lvl1pPr marL="0" indent="0" algn="ctr">
               <a:buNone/>
-              <a:defRPr sz="1568" b="1" cap="none" baseline="0">
+              <a:defRPr sz="1570" b="1" cap="none" baseline="0">
                 <a:gradFill>
                   <a:gsLst>
                     <a:gs pos="0">
@@ -12074,7 +12074,6 @@
           <a:p>
             <a:fld id="{4997E989-D798-4C62-8E93-3D2D613C2488}" type="slidenum">
               <a:rPr lang="en-US" smtClean="0"/>
-              <a:pPr/>
               <a:t>‹#›</a:t>
             </a:fld>
             <a:endParaRPr lang="en-US" dirty="0"/>
@@ -12082,11 +12081,6 @@
         </p:txBody>
       </p:sp>
     </p:spTree>
-    <p:extLst>
-      <p:ext uri="{BB962C8B-B14F-4D97-AF65-F5344CB8AC3E}">
-        <p14:creationId xmlns:p14="http://schemas.microsoft.com/office/powerpoint/2010/main" val="179820170"/>
-      </p:ext>
-    </p:extLst>
   </p:cSld>
   <p:clrMapOvr>
     <a:masterClrMapping/>
@@ -12141,7 +12135,7 @@
           <a:lstStyle>
             <a:lvl1pPr marL="0" indent="0" algn="ctr">
               <a:buNone/>
-              <a:defRPr sz="1568" b="1" cap="none" baseline="0">
+              <a:defRPr sz="1570" b="1" cap="none" baseline="0">
                 <a:gradFill>
                   <a:gsLst>
                     <a:gs pos="0">
@@ -12428,7 +12422,6 @@
           <a:p>
             <a:fld id="{4997E989-D798-4C62-8E93-3D2D613C2488}" type="slidenum">
               <a:rPr lang="en-US" smtClean="0"/>
-              <a:pPr/>
               <a:t>‹#›</a:t>
             </a:fld>
             <a:endParaRPr lang="en-US" dirty="0"/>
@@ -12436,11 +12429,6 @@
         </p:txBody>
       </p:sp>
     </p:spTree>
-    <p:extLst>
-      <p:ext uri="{BB962C8B-B14F-4D97-AF65-F5344CB8AC3E}">
-        <p14:creationId xmlns:p14="http://schemas.microsoft.com/office/powerpoint/2010/main" val="24176110"/>
-      </p:ext>
-    </p:extLst>
   </p:cSld>
   <p:clrMapOvr>
     <a:masterClrMapping/>
@@ -12494,7 +12482,7 @@
           <a:lstStyle>
             <a:lvl1pPr marL="0" indent="0" algn="ctr">
               <a:buNone/>
-              <a:defRPr sz="1568" b="1" cap="none" baseline="0">
+              <a:defRPr sz="1570" b="1" cap="none" baseline="0">
                 <a:gradFill>
                   <a:gsLst>
                     <a:gs pos="0">
@@ -12725,7 +12713,6 @@
           <a:p>
             <a:fld id="{4997E989-D798-4C62-8E93-3D2D613C2488}" type="slidenum">
               <a:rPr lang="en-US" smtClean="0"/>
-              <a:pPr/>
               <a:t>‹#›</a:t>
             </a:fld>
             <a:endParaRPr lang="en-US" dirty="0"/>
@@ -12733,11 +12720,6 @@
         </p:txBody>
       </p:sp>
     </p:spTree>
-    <p:extLst>
-      <p:ext uri="{BB962C8B-B14F-4D97-AF65-F5344CB8AC3E}">
-        <p14:creationId xmlns:p14="http://schemas.microsoft.com/office/powerpoint/2010/main" val="1628884554"/>
-      </p:ext>
-    </p:extLst>
   </p:cSld>
   <p:clrMapOvr>
     <a:masterClrMapping/>
@@ -12791,7 +12773,7 @@
           <a:lstStyle>
             <a:lvl1pPr marL="0" indent="0" algn="ctr">
               <a:buNone/>
-              <a:defRPr sz="1568" b="1" cap="none" baseline="0">
+              <a:defRPr sz="1570" b="1" cap="none" baseline="0">
                 <a:gradFill>
                   <a:gsLst>
                     <a:gs pos="0">
@@ -12981,7 +12963,6 @@
           <a:p>
             <a:fld id="{4997E989-D798-4C62-8E93-3D2D613C2488}" type="slidenum">
               <a:rPr lang="en-US" smtClean="0"/>
-              <a:pPr/>
               <a:t>‹#›</a:t>
             </a:fld>
             <a:endParaRPr lang="en-US" dirty="0"/>
@@ -12989,11 +12970,6 @@
         </p:txBody>
       </p:sp>
     </p:spTree>
-    <p:extLst>
-      <p:ext uri="{BB962C8B-B14F-4D97-AF65-F5344CB8AC3E}">
-        <p14:creationId xmlns:p14="http://schemas.microsoft.com/office/powerpoint/2010/main" val="3806054844"/>
-      </p:ext>
-    </p:extLst>
   </p:cSld>
   <p:clrMapOvr>
     <a:masterClrMapping/>
@@ -13125,7 +13101,6 @@
               <a:buSzTx/>
               <a:buFontTx/>
               <a:buNone/>
-              <a:tabLst/>
               <a:defRPr/>
             </a:pPr>
             <a:endParaRPr kumimoji="0" lang="en-US" sz="1800" b="0" i="0" u="none" strike="noStrike" kern="0" cap="none" spc="0" normalizeH="0" baseline="0" noProof="0" dirty="0">
@@ -13138,7 +13113,7 @@
               <a:effectLst/>
               <a:uLnTx/>
               <a:uFillTx/>
-              <a:latin typeface="Segoe UI"/>
+              <a:latin typeface="Segoe UI" panose="020B0502040204020203"/>
               <a:ea typeface="+mn-ea"/>
               <a:cs typeface="+mn-cs"/>
             </a:endParaRPr>
@@ -13148,9 +13123,7 @@
       <p:sp>
         <p:nvSpPr>
           <p:cNvPr id="17" name="Footer Placeholder 4"/>
-          <p:cNvSpPr txBox="1">
-            <a:spLocks/>
-          </p:cNvSpPr>
+          <p:cNvSpPr txBox="1"/>
           <p:nvPr userDrawn="1"/>
         </p:nvSpPr>
         <p:spPr>
@@ -13274,7 +13247,6 @@
               <a:buSzTx/>
               <a:buFontTx/>
               <a:buNone/>
-              <a:tabLst/>
               <a:defRPr/>
             </a:pPr>
             <a:endParaRPr kumimoji="0" lang="en-US" sz="1100" b="0" i="0" u="none" strike="noStrike" kern="1200" cap="none" spc="0" normalizeH="0" baseline="0" noProof="0" dirty="0">
@@ -13287,7 +13259,7 @@
               <a:effectLst/>
               <a:uLnTx/>
               <a:uFillTx/>
-              <a:latin typeface="Segoe UI"/>
+              <a:latin typeface="Segoe UI" panose="020B0502040204020203"/>
               <a:ea typeface="+mn-ea"/>
               <a:cs typeface="+mn-cs"/>
             </a:endParaRPr>
@@ -13355,7 +13327,6 @@
               <a:buClrTx/>
               <a:buSzTx/>
               <a:buFontTx/>
-              <a:tabLst/>
             </a:pPr>
             <a:r>
               <a:rPr lang="en-US" dirty="0"/>
@@ -13468,7 +13439,6 @@
               <a:buSzTx/>
               <a:buFont typeface="Arial" panose="020B0604020202020204" pitchFamily="34" charset="0"/>
               <a:buNone/>
-              <a:tabLst/>
               <a:defRPr kumimoji="0" lang="en-US" sz="2400" b="0" i="0" u="none" strike="noStrike" kern="1200" cap="none" spc="0" normalizeH="0" baseline="0">
                 <a:ln>
                   <a:noFill/>
@@ -13531,7 +13501,6 @@
               <a:buSzTx/>
               <a:buFont typeface="Arial" panose="020B0604020202020204" pitchFamily="34" charset="0"/>
               <a:buNone/>
-              <a:tabLst/>
               <a:defRPr/>
             </a:pPr>
             <a:r>
@@ -13608,7 +13577,6 @@
               <a:buSzTx/>
               <a:buFont typeface="Arial" panose="020B0604020202020204" pitchFamily="34" charset="0"/>
               <a:buNone/>
-              <a:tabLst/>
               <a:defRPr/>
             </a:pPr>
             <a:r>
@@ -13619,11 +13587,6 @@
         </p:txBody>
       </p:sp>
     </p:spTree>
-    <p:extLst>
-      <p:ext uri="{BB962C8B-B14F-4D97-AF65-F5344CB8AC3E}">
-        <p14:creationId xmlns:p14="http://schemas.microsoft.com/office/powerpoint/2010/main" val="2641874877"/>
-      </p:ext>
-    </p:extLst>
   </p:cSld>
   <p:clrMapOvr>
     <a:masterClrMapping/>
@@ -13965,7 +13928,6 @@
           <a:p>
             <a:fld id="{4997E989-D798-4C62-8E93-3D2D613C2488}" type="slidenum">
               <a:rPr lang="en-US" smtClean="0"/>
-              <a:pPr/>
               <a:t>‹#›</a:t>
             </a:fld>
             <a:endParaRPr lang="en-US" dirty="0"/>
@@ -13973,11 +13935,6 @@
         </p:txBody>
       </p:sp>
     </p:spTree>
-    <p:extLst>
-      <p:ext uri="{BB962C8B-B14F-4D97-AF65-F5344CB8AC3E}">
-        <p14:creationId xmlns:p14="http://schemas.microsoft.com/office/powerpoint/2010/main" val="2789140260"/>
-      </p:ext>
-    </p:extLst>
   </p:cSld>
   <p:clrMapOvr>
     <a:masterClrMapping/>
@@ -14071,7 +14028,7 @@
             <a:spAutoFit/>
           </a:bodyPr>
           <a:lstStyle>
-            <a:lvl1pPr marL="0" marR="0" indent="0" algn="l" defTabSz="914367" rtl="0" eaLnBrk="1" fontAlgn="auto" latinLnBrk="0" hangingPunct="1">
+            <a:lvl1pPr marL="0" marR="0" indent="0" algn="l" defTabSz="914400" rtl="0" eaLnBrk="1" fontAlgn="auto" latinLnBrk="0" hangingPunct="1">
               <a:lnSpc>
                 <a:spcPct val="90000"/>
               </a:lnSpc>
@@ -14085,10 +14042,9 @@
                 <a:schemeClr val="tx1"/>
               </a:buClr>
               <a:buSzPct val="90000"/>
-              <a:buFont typeface="Wingdings" pitchFamily="2" charset="2"/>
+              <a:buFont typeface="Wingdings" panose="05000000000000000000" pitchFamily="2" charset="2"/>
               <a:buNone/>
-              <a:tabLst/>
-              <a:defRPr lang="en-US" sz="3137" kern="1200" spc="0" baseline="0" dirty="0">
+              <a:defRPr lang="en-US" sz="3135" kern="1200" spc="0" baseline="0" dirty="0">
                 <a:gradFill>
                   <a:gsLst>
                     <a:gs pos="1250">
@@ -14107,20 +14063,18 @@
             </a:lvl1pPr>
             <a:lvl2pPr marL="0" indent="0">
               <a:buNone/>
-              <a:defRPr sz="1961"/>
+              <a:defRPr sz="1960"/>
             </a:lvl2pPr>
-            <a:lvl3pPr marL="227209" indent="0">
+            <a:lvl3pPr marL="227330" indent="0">
               <a:buNone/>
-              <a:tabLst/>
-              <a:defRPr sz="1961"/>
+              <a:defRPr sz="1960"/>
             </a:lvl3pPr>
-            <a:lvl4pPr marL="451306" indent="0">
+            <a:lvl4pPr marL="451485" indent="0">
               <a:buNone/>
               <a:defRPr/>
             </a:lvl4pPr>
-            <a:lvl5pPr marL="672290" indent="0">
+            <a:lvl5pPr marL="672465" indent="0">
               <a:buNone/>
-              <a:tabLst/>
               <a:defRPr/>
             </a:lvl5pPr>
           </a:lstStyle>
@@ -14167,7 +14121,7 @@
           <a:lstStyle>
             <a:lvl1pPr marL="0" indent="0" algn="l">
               <a:buNone/>
-              <a:defRPr sz="1961">
+              <a:defRPr sz="1960">
                 <a:latin typeface="+mn-lt"/>
               </a:defRPr>
             </a:lvl1pPr>
@@ -14179,19 +14133,19 @@
             </a:lvl2pPr>
             <a:lvl3pPr marL="0" indent="0" algn="l">
               <a:buNone/>
-              <a:defRPr sz="1568">
+              <a:defRPr sz="1570">
                 <a:latin typeface="+mn-lt"/>
               </a:defRPr>
             </a:lvl3pPr>
             <a:lvl4pPr marL="0" indent="0" algn="l">
               <a:buNone/>
-              <a:defRPr sz="1372">
+              <a:defRPr sz="1370">
                 <a:latin typeface="+mn-lt"/>
               </a:defRPr>
             </a:lvl4pPr>
             <a:lvl5pPr marL="0" indent="0" algn="l">
               <a:buNone/>
-              <a:defRPr sz="1372">
+              <a:defRPr sz="1370">
                 <a:latin typeface="+mn-lt"/>
               </a:defRPr>
             </a:lvl5pPr>
@@ -14327,7 +14281,6 @@
           <a:p>
             <a:fld id="{4997E989-D798-4C62-8E93-3D2D613C2488}" type="slidenum">
               <a:rPr lang="en-US" smtClean="0"/>
-              <a:pPr/>
               <a:t>‹#›</a:t>
             </a:fld>
             <a:endParaRPr lang="en-US" dirty="0"/>
@@ -14335,11 +14288,6 @@
         </p:txBody>
       </p:sp>
     </p:spTree>
-    <p:extLst>
-      <p:ext uri="{BB962C8B-B14F-4D97-AF65-F5344CB8AC3E}">
-        <p14:creationId xmlns:p14="http://schemas.microsoft.com/office/powerpoint/2010/main" val="2669198123"/>
-      </p:ext>
-    </p:extLst>
   </p:cSld>
   <p:clrMapOvr>
     <a:masterClrMapping/>
@@ -14549,11 +14497,6 @@
         </p:txBody>
       </p:sp>
     </p:spTree>
-    <p:extLst>
-      <p:ext uri="{BB962C8B-B14F-4D97-AF65-F5344CB8AC3E}">
-        <p14:creationId xmlns:p14="http://schemas.microsoft.com/office/powerpoint/2010/main" val="4073567290"/>
-      </p:ext>
-    </p:extLst>
   </p:cSld>
   <p:clrMapOvr>
     <a:overrideClrMapping bg1="dk1" tx1="lt1" bg2="dk2" tx2="lt2" accent1="accent1" accent2="accent2" accent3="accent3" accent4="accent4" accent5="accent5" accent6="accent6" hlink="hlink" folHlink="folHlink"/>
@@ -14648,11 +14591,6 @@
         </p:txBody>
       </p:sp>
     </p:spTree>
-    <p:extLst>
-      <p:ext uri="{BB962C8B-B14F-4D97-AF65-F5344CB8AC3E}">
-        <p14:creationId xmlns:p14="http://schemas.microsoft.com/office/powerpoint/2010/main" val="1558395814"/>
-      </p:ext>
-    </p:extLst>
   </p:cSld>
   <p:clrMapOvr>
     <a:masterClrMapping/>
@@ -14709,11 +14647,6 @@
         </p:txBody>
       </p:sp>
     </p:spTree>
-    <p:extLst>
-      <p:ext uri="{BB962C8B-B14F-4D97-AF65-F5344CB8AC3E}">
-        <p14:creationId xmlns:p14="http://schemas.microsoft.com/office/powerpoint/2010/main" val="3893648223"/>
-      </p:ext>
-    </p:extLst>
   </p:cSld>
   <p:clrMapOvr>
     <a:masterClrMapping/>
@@ -14740,13 +14673,7 @@
       </p:grpSpPr>
       <p:pic>
         <p:nvPicPr>
-          <p:cNvPr id="5" name="Picture 4">
-            <a:extLst>
-              <a:ext uri="{FF2B5EF4-FFF2-40B4-BE49-F238E27FC236}">
-                <a16:creationId xmlns:a16="http://schemas.microsoft.com/office/drawing/2014/main" id="{914BDA58-9C93-4222-A4EC-4BEB46CE0614}"/>
-              </a:ext>
-            </a:extLst>
-          </p:cNvPr>
+          <p:cNvPr id="5" name="Picture 4"/>
           <p:cNvPicPr>
             <a:picLocks noChangeAspect="1"/>
           </p:cNvPicPr>
@@ -14809,11 +14736,6 @@
         <p:nvSpPr>
           <p:cNvPr id="6" name="TextBox 5">
             <a:hlinkClick r:id="rId3"/>
-            <a:extLst>
-              <a:ext uri="{FF2B5EF4-FFF2-40B4-BE49-F238E27FC236}">
-                <a16:creationId xmlns:a16="http://schemas.microsoft.com/office/drawing/2014/main" id="{FC5E276D-531E-45A9-B450-EFEC62CDC8DF}"/>
-              </a:ext>
-            </a:extLst>
           </p:cNvPr>
           <p:cNvSpPr txBox="1"/>
           <p:nvPr userDrawn="1"/>
@@ -14852,7 +14774,6 @@
               <a:buSzTx/>
               <a:buFontTx/>
               <a:buNone/>
-              <a:tabLst/>
               <a:defRPr/>
             </a:pPr>
             <a:r>
@@ -14926,7 +14847,6 @@
               <a:buSzTx/>
               <a:buFontTx/>
               <a:buNone/>
-              <a:tabLst/>
               <a:defRPr/>
             </a:pPr>
             <a:r>
@@ -14966,13 +14886,7 @@
       </p:sp>
       <p:grpSp>
         <p:nvGrpSpPr>
-          <p:cNvPr id="8" name="Group 7">
-            <a:extLst>
-              <a:ext uri="{FF2B5EF4-FFF2-40B4-BE49-F238E27FC236}">
-                <a16:creationId xmlns:a16="http://schemas.microsoft.com/office/drawing/2014/main" id="{EF273A61-5610-4355-89F3-7C90515BFCC9}"/>
-              </a:ext>
-            </a:extLst>
-          </p:cNvPr>
+          <p:cNvPr id="8" name="Group 7"/>
           <p:cNvGrpSpPr/>
           <p:nvPr userDrawn="1"/>
         </p:nvGrpSpPr>
@@ -14986,13 +14900,7 @@
         </p:grpSpPr>
         <p:pic>
           <p:nvPicPr>
-            <p:cNvPr id="9" name="Picture 8">
-              <a:extLst>
-                <a:ext uri="{FF2B5EF4-FFF2-40B4-BE49-F238E27FC236}">
-                  <a16:creationId xmlns:a16="http://schemas.microsoft.com/office/drawing/2014/main" id="{6A49345F-7A53-4131-8BB4-087032A6CCD0}"/>
-                </a:ext>
-              </a:extLst>
-            </p:cNvPr>
+            <p:cNvPr id="9" name="Picture 8"/>
             <p:cNvPicPr>
               <a:picLocks noChangeAspect="1"/>
             </p:cNvPicPr>
@@ -15007,7 +14915,9 @@
               </a:extLst>
             </a:blip>
             <a:srcRect/>
-            <a:stretch/>
+            <a:stretch>
+              <a:fillRect/>
+            </a:stretch>
           </p:blipFill>
           <p:spPr>
             <a:xfrm>
@@ -15021,13 +14931,7 @@
         </p:pic>
         <p:sp>
           <p:nvSpPr>
-            <p:cNvPr id="10" name="TextBox 9">
-              <a:extLst>
-                <a:ext uri="{FF2B5EF4-FFF2-40B4-BE49-F238E27FC236}">
-                  <a16:creationId xmlns:a16="http://schemas.microsoft.com/office/drawing/2014/main" id="{5596D35F-1F19-4447-829C-790DF2B8D2DD}"/>
-                </a:ext>
-              </a:extLst>
-            </p:cNvPr>
+            <p:cNvPr id="10" name="TextBox 9"/>
             <p:cNvSpPr txBox="1"/>
             <p:nvPr/>
           </p:nvSpPr>
@@ -15087,11 +14991,6 @@
         </p:sp>
       </p:grpSp>
     </p:spTree>
-    <p:extLst>
-      <p:ext uri="{BB962C8B-B14F-4D97-AF65-F5344CB8AC3E}">
-        <p14:creationId xmlns:p14="http://schemas.microsoft.com/office/powerpoint/2010/main" val="2853556749"/>
-      </p:ext>
-    </p:extLst>
   </p:cSld>
   <p:clrMapOvr>
     <a:masterClrMapping/>
@@ -15166,7 +15065,6 @@
               <a:buSzTx/>
               <a:buFontTx/>
               <a:buNone/>
-              <a:tabLst/>
               <a:defRPr/>
             </a:pPr>
             <a:endParaRPr kumimoji="0" lang="en-US" sz="1800" b="0" i="0" u="none" strike="noStrike" kern="0" cap="none" spc="0" normalizeH="0" baseline="0" noProof="0" dirty="0">
@@ -15179,7 +15077,7 @@
               <a:effectLst/>
               <a:uLnTx/>
               <a:uFillTx/>
-              <a:latin typeface="Segoe UI"/>
+              <a:latin typeface="Segoe UI" panose="020B0502040204020203"/>
               <a:ea typeface="+mn-ea"/>
               <a:cs typeface="+mn-cs"/>
             </a:endParaRPr>
@@ -15228,7 +15126,6 @@
               <a:buSzTx/>
               <a:buFontTx/>
               <a:buNone/>
-              <a:tabLst/>
               <a:defRPr/>
             </a:pPr>
             <a:endParaRPr kumimoji="0" lang="en-US" sz="1800" b="0" i="0" u="none" strike="noStrike" kern="0" cap="none" spc="0" normalizeH="0" baseline="0" noProof="0" dirty="0">
@@ -15241,7 +15138,7 @@
               <a:effectLst/>
               <a:uLnTx/>
               <a:uFillTx/>
-              <a:latin typeface="Segoe UI"/>
+              <a:latin typeface="Segoe UI" panose="020B0502040204020203"/>
               <a:ea typeface="+mn-ea"/>
               <a:cs typeface="+mn-cs"/>
             </a:endParaRPr>
@@ -15290,7 +15187,6 @@
               <a:buSzTx/>
               <a:buFontTx/>
               <a:buNone/>
-              <a:tabLst/>
               <a:defRPr/>
             </a:pPr>
             <a:endParaRPr kumimoji="0" lang="en-US" sz="1800" b="0" i="0" u="none" strike="noStrike" kern="0" cap="none" spc="0" normalizeH="0" baseline="0" noProof="0" dirty="0">
@@ -15303,7 +15199,7 @@
               <a:effectLst/>
               <a:uLnTx/>
               <a:uFillTx/>
-              <a:latin typeface="Segoe UI"/>
+              <a:latin typeface="Segoe UI" panose="020B0502040204020203"/>
               <a:ea typeface="+mn-ea"/>
               <a:cs typeface="+mn-cs"/>
             </a:endParaRPr>
@@ -15352,7 +15248,6 @@
               <a:buSzTx/>
               <a:buFontTx/>
               <a:buNone/>
-              <a:tabLst/>
               <a:defRPr/>
             </a:pPr>
             <a:endParaRPr kumimoji="0" lang="en-US" sz="1800" b="0" i="0" u="none" strike="noStrike" kern="0" cap="none" spc="0" normalizeH="0" baseline="0" noProof="0" dirty="0">
@@ -15365,7 +15260,7 @@
               <a:effectLst/>
               <a:uLnTx/>
               <a:uFillTx/>
-              <a:latin typeface="Segoe UI"/>
+              <a:latin typeface="Segoe UI" panose="020B0502040204020203"/>
               <a:ea typeface="+mn-ea"/>
               <a:cs typeface="+mn-cs"/>
             </a:endParaRPr>
@@ -15436,11 +15331,6 @@
         <p:nvSpPr>
           <p:cNvPr id="8" name="TextBox 7">
             <a:hlinkClick r:id="rId2"/>
-            <a:extLst>
-              <a:ext uri="{FF2B5EF4-FFF2-40B4-BE49-F238E27FC236}">
-                <a16:creationId xmlns:a16="http://schemas.microsoft.com/office/drawing/2014/main" id="{E516C148-33F4-423B-AB9D-096AA82E12F1}"/>
-              </a:ext>
-            </a:extLst>
           </p:cNvPr>
           <p:cNvSpPr txBox="1"/>
           <p:nvPr userDrawn="1"/>
@@ -15477,7 +15367,6 @@
               <a:buSzTx/>
               <a:buFontTx/>
               <a:buNone/>
-              <a:tabLst/>
               <a:defRPr/>
             </a:pPr>
             <a:r>
@@ -15524,11 +15413,6 @@
         </p:txBody>
       </p:sp>
     </p:spTree>
-    <p:extLst>
-      <p:ext uri="{BB962C8B-B14F-4D97-AF65-F5344CB8AC3E}">
-        <p14:creationId xmlns:p14="http://schemas.microsoft.com/office/powerpoint/2010/main" val="586620223"/>
-      </p:ext>
-    </p:extLst>
   </p:cSld>
   <p:clrMapOvr>
     <a:overrideClrMapping bg1="dk1" tx1="lt1" bg2="dk2" tx2="lt2" accent1="accent1" accent2="accent2" accent3="accent3" accent4="accent4" accent5="accent5" accent6="accent6" hlink="hlink" folHlink="folHlink"/>
@@ -16159,7 +16043,7 @@
             <a:spAutoFit/>
           </a:bodyPr>
           <a:lstStyle>
-            <a:lvl1pPr marL="0" marR="0" indent="0" algn="l" defTabSz="914367" rtl="0" eaLnBrk="1" fontAlgn="auto" latinLnBrk="0" hangingPunct="1">
+            <a:lvl1pPr marL="0" marR="0" indent="0" algn="l" defTabSz="914400" rtl="0" eaLnBrk="1" fontAlgn="auto" latinLnBrk="0" hangingPunct="1">
               <a:lnSpc>
                 <a:spcPct val="90000"/>
               </a:lnSpc>
@@ -16173,10 +16057,9 @@
                 <a:schemeClr val="tx1"/>
               </a:buClr>
               <a:buSzPct val="90000"/>
-              <a:buFont typeface="Wingdings" pitchFamily="2" charset="2"/>
+              <a:buFont typeface="Wingdings" panose="05000000000000000000" pitchFamily="2" charset="2"/>
               <a:buNone/>
-              <a:tabLst/>
-              <a:defRPr lang="en-US" sz="3137" kern="1200" spc="0" baseline="0" dirty="0">
+              <a:defRPr lang="en-US" sz="3135" kern="1200" spc="0" baseline="0" dirty="0">
                 <a:gradFill>
                   <a:gsLst>
                     <a:gs pos="1250">
@@ -16195,20 +16078,18 @@
             </a:lvl1pPr>
             <a:lvl2pPr marL="0" indent="0">
               <a:buNone/>
-              <a:defRPr sz="1961"/>
+              <a:defRPr sz="1960"/>
             </a:lvl2pPr>
-            <a:lvl3pPr marL="227209" indent="0">
+            <a:lvl3pPr marL="227330" indent="0">
               <a:buNone/>
-              <a:tabLst/>
-              <a:defRPr sz="1961"/>
+              <a:defRPr sz="1960"/>
             </a:lvl3pPr>
-            <a:lvl4pPr marL="451306" indent="0">
+            <a:lvl4pPr marL="451485" indent="0">
               <a:buNone/>
               <a:defRPr/>
             </a:lvl4pPr>
-            <a:lvl5pPr marL="672290" indent="0">
+            <a:lvl5pPr marL="672465" indent="0">
               <a:buNone/>
-              <a:tabLst/>
               <a:defRPr/>
             </a:lvl5pPr>
           </a:lstStyle>
@@ -16255,7 +16136,7 @@
           <a:lstStyle>
             <a:lvl1pPr marL="0" indent="0" algn="l">
               <a:buNone/>
-              <a:defRPr sz="1961">
+              <a:defRPr sz="1960">
                 <a:latin typeface="+mn-lt"/>
               </a:defRPr>
             </a:lvl1pPr>
@@ -16267,19 +16148,19 @@
             </a:lvl2pPr>
             <a:lvl3pPr marL="0" indent="0" algn="l">
               <a:buNone/>
-              <a:defRPr sz="1568">
+              <a:defRPr sz="1570">
                 <a:latin typeface="+mn-lt"/>
               </a:defRPr>
             </a:lvl3pPr>
             <a:lvl4pPr marL="0" indent="0" algn="l">
               <a:buNone/>
-              <a:defRPr sz="1372">
+              <a:defRPr sz="1370">
                 <a:latin typeface="+mn-lt"/>
               </a:defRPr>
             </a:lvl4pPr>
             <a:lvl5pPr marL="0" indent="0" algn="l">
               <a:buNone/>
-              <a:defRPr sz="1372">
+              <a:defRPr sz="1370">
                 <a:latin typeface="+mn-lt"/>
               </a:defRPr>
             </a:lvl5pPr>
@@ -16363,11 +16244,6 @@
         <p:nvSpPr>
           <p:cNvPr id="12" name="TextBox 11">
             <a:hlinkClick r:id="rId3"/>
-            <a:extLst>
-              <a:ext uri="{FF2B5EF4-FFF2-40B4-BE49-F238E27FC236}">
-                <a16:creationId xmlns:a16="http://schemas.microsoft.com/office/drawing/2014/main" id="{B2DA80A1-9E22-4BFF-8562-466123B36943}"/>
-              </a:ext>
-            </a:extLst>
           </p:cNvPr>
           <p:cNvSpPr txBox="1"/>
           <p:nvPr userDrawn="1"/>
@@ -16406,7 +16282,6 @@
               <a:buSzTx/>
               <a:buFontTx/>
               <a:buNone/>
-              <a:tabLst/>
               <a:defRPr/>
             </a:pPr>
             <a:r>
@@ -16500,7 +16375,6 @@
           <a:p>
             <a:fld id="{4997E989-D798-4C62-8E93-3D2D613C2488}" type="slidenum">
               <a:rPr lang="en-US" smtClean="0"/>
-              <a:pPr/>
               <a:t>‹#›</a:t>
             </a:fld>
             <a:endParaRPr lang="en-US" dirty="0"/>
@@ -16511,11 +16385,6 @@
         <p:nvSpPr>
           <p:cNvPr id="13" name="TextBox 12">
             <a:hlinkClick r:id="rId4"/>
-            <a:extLst>
-              <a:ext uri="{FF2B5EF4-FFF2-40B4-BE49-F238E27FC236}">
-                <a16:creationId xmlns:a16="http://schemas.microsoft.com/office/drawing/2014/main" id="{1AF511EA-044E-4300-B921-D56138FE402E}"/>
-              </a:ext>
-            </a:extLst>
           </p:cNvPr>
           <p:cNvSpPr txBox="1"/>
           <p:nvPr userDrawn="1"/>
@@ -16552,7 +16421,6 @@
               <a:buSzTx/>
               <a:buFontTx/>
               <a:buNone/>
-              <a:tabLst/>
               <a:defRPr/>
             </a:pPr>
             <a:r>
@@ -16599,11 +16467,6 @@
         </p:txBody>
       </p:sp>
     </p:spTree>
-    <p:extLst>
-      <p:ext uri="{BB962C8B-B14F-4D97-AF65-F5344CB8AC3E}">
-        <p14:creationId xmlns:p14="http://schemas.microsoft.com/office/powerpoint/2010/main" val="3762340668"/>
-      </p:ext>
-    </p:extLst>
   </p:cSld>
   <p:clrMapOvr>
     <a:masterClrMapping/>
@@ -16766,7 +16629,6 @@
               <a:buSzTx/>
               <a:buFontTx/>
               <a:buNone/>
-              <a:tabLst/>
               <a:defRPr/>
             </a:pPr>
             <a:endParaRPr kumimoji="0" lang="en-US" sz="1800" b="0" i="0" u="none" strike="noStrike" kern="0" cap="none" spc="0" normalizeH="0" baseline="0" noProof="0" dirty="0">
@@ -16779,7 +16641,7 @@
               <a:effectLst/>
               <a:uLnTx/>
               <a:uFillTx/>
-              <a:latin typeface="Calibri"/>
+              <a:latin typeface="Calibri" panose="020F0502020204030204"/>
               <a:ea typeface="+mn-ea"/>
               <a:cs typeface="+mn-cs"/>
             </a:endParaRPr>
@@ -16787,11 +16649,6 @@
         </p:txBody>
       </p:sp>
     </p:spTree>
-    <p:extLst>
-      <p:ext uri="{BB962C8B-B14F-4D97-AF65-F5344CB8AC3E}">
-        <p14:creationId xmlns:p14="http://schemas.microsoft.com/office/powerpoint/2010/main" val="3706376384"/>
-      </p:ext>
-    </p:extLst>
   </p:cSld>
   <p:clrMapOvr>
     <a:overrideClrMapping bg1="dk1" tx1="lt1" bg2="dk2" tx2="lt2" accent1="accent1" accent2="accent2" accent3="accent3" accent4="accent4" accent5="accent5" accent6="accent6" hlink="hlink" folHlink="folHlink"/>
@@ -16879,7 +16736,7 @@
                 </a:gradFill>
               </a:defRPr>
             </a:lvl1pPr>
-            <a:lvl2pPr marL="109538" indent="0" algn="l">
+            <a:lvl2pPr marL="109855" indent="0" algn="l">
               <a:spcBef>
                 <a:spcPts val="0"/>
               </a:spcBef>
@@ -17066,11 +16923,6 @@
         </p:txBody>
       </p:sp>
     </p:spTree>
-    <p:extLst>
-      <p:ext uri="{BB962C8B-B14F-4D97-AF65-F5344CB8AC3E}">
-        <p14:creationId xmlns:p14="http://schemas.microsoft.com/office/powerpoint/2010/main" val="3266280494"/>
-      </p:ext>
-    </p:extLst>
   </p:cSld>
   <p:clrMapOvr>
     <a:masterClrMapping/>
@@ -17333,11 +17185,6 @@
         </p:txBody>
       </p:sp>
     </p:spTree>
-    <p:extLst>
-      <p:ext uri="{BB962C8B-B14F-4D97-AF65-F5344CB8AC3E}">
-        <p14:creationId xmlns:p14="http://schemas.microsoft.com/office/powerpoint/2010/main" val="3031631337"/>
-      </p:ext>
-    </p:extLst>
   </p:cSld>
   <p:clrMapOvr>
     <a:masterClrMapping/>
@@ -17410,7 +17257,7 @@
                 </a:gradFill>
               </a:defRPr>
             </a:lvl1pPr>
-            <a:lvl2pPr marL="109538" indent="0" algn="l">
+            <a:lvl2pPr marL="109855" indent="0" algn="l">
               <a:spcBef>
                 <a:spcPts val="0"/>
               </a:spcBef>
@@ -17597,11 +17444,6 @@
         </p:txBody>
       </p:sp>
     </p:spTree>
-    <p:extLst>
-      <p:ext uri="{BB962C8B-B14F-4D97-AF65-F5344CB8AC3E}">
-        <p14:creationId xmlns:p14="http://schemas.microsoft.com/office/powerpoint/2010/main" val="2075739131"/>
-      </p:ext>
-    </p:extLst>
   </p:cSld>
   <p:clrMapOvr>
     <a:masterClrMapping/>
@@ -17807,7 +17649,6 @@
           <a:p>
             <a:fld id="{4997E989-D798-4C62-8E93-3D2D613C2488}" type="slidenum">
               <a:rPr lang="en-US" smtClean="0"/>
-              <a:pPr/>
               <a:t>‹#›</a:t>
             </a:fld>
             <a:endParaRPr lang="en-US" dirty="0"/>
@@ -17815,11 +17656,6 @@
         </p:txBody>
       </p:sp>
     </p:spTree>
-    <p:extLst>
-      <p:ext uri="{BB962C8B-B14F-4D97-AF65-F5344CB8AC3E}">
-        <p14:creationId xmlns:p14="http://schemas.microsoft.com/office/powerpoint/2010/main" val="2460922820"/>
-      </p:ext>
-    </p:extLst>
   </p:cSld>
   <p:clrMapOvr>
     <a:masterClrMapping/>
@@ -17873,7 +17709,7 @@
             <a:spAutoFit/>
           </a:bodyPr>
           <a:lstStyle>
-            <a:lvl1pPr marL="0" marR="0" indent="0" algn="l" defTabSz="914367" rtl="0" eaLnBrk="1" fontAlgn="auto" latinLnBrk="0" hangingPunct="1">
+            <a:lvl1pPr marL="0" marR="0" indent="0" algn="l" defTabSz="914400" rtl="0" eaLnBrk="1" fontAlgn="auto" latinLnBrk="0" hangingPunct="1">
               <a:lnSpc>
                 <a:spcPct val="90000"/>
               </a:lnSpc>
@@ -17887,9 +17723,8 @@
                 <a:schemeClr val="tx1"/>
               </a:buClr>
               <a:buSzPct val="90000"/>
-              <a:buFont typeface="Wingdings" pitchFamily="2" charset="2"/>
+              <a:buFont typeface="Wingdings" panose="05000000000000000000" pitchFamily="2" charset="2"/>
               <a:buNone/>
-              <a:tabLst/>
               <a:defRPr lang="en-US" sz="2800" b="0" kern="1200" spc="0" baseline="0" dirty="0">
                 <a:solidFill>
                   <a:schemeClr val="bg1"/>
@@ -17901,20 +17736,18 @@
             </a:lvl1pPr>
             <a:lvl2pPr marL="0" indent="0">
               <a:buNone/>
-              <a:defRPr sz="1961"/>
+              <a:defRPr sz="1960"/>
             </a:lvl2pPr>
-            <a:lvl3pPr marL="227209" indent="0">
+            <a:lvl3pPr marL="227330" indent="0">
               <a:buNone/>
-              <a:tabLst/>
-              <a:defRPr sz="1961"/>
+              <a:defRPr sz="1960"/>
             </a:lvl3pPr>
-            <a:lvl4pPr marL="451306" indent="0">
+            <a:lvl4pPr marL="451485" indent="0">
               <a:buNone/>
               <a:defRPr/>
             </a:lvl4pPr>
-            <a:lvl5pPr marL="672290" indent="0">
+            <a:lvl5pPr marL="672465" indent="0">
               <a:buNone/>
-              <a:tabLst/>
               <a:defRPr/>
             </a:lvl5pPr>
           </a:lstStyle>
@@ -18421,11 +18254,6 @@
         </p:txBody>
       </p:sp>
     </p:spTree>
-    <p:extLst>
-      <p:ext uri="{BB962C8B-B14F-4D97-AF65-F5344CB8AC3E}">
-        <p14:creationId xmlns:p14="http://schemas.microsoft.com/office/powerpoint/2010/main" val="3029200699"/>
-      </p:ext>
-    </p:extLst>
   </p:cSld>
   <p:clrMapOvr>
     <a:masterClrMapping/>
@@ -18572,7 +18400,7 @@
             <a:spAutoFit/>
           </a:bodyPr>
           <a:lstStyle>
-            <a:lvl1pPr marL="0" marR="0" indent="0" algn="l" defTabSz="914367" rtl="0" eaLnBrk="1" fontAlgn="auto" latinLnBrk="0" hangingPunct="1">
+            <a:lvl1pPr marL="0" marR="0" indent="0" algn="l" defTabSz="914400" rtl="0" eaLnBrk="1" fontAlgn="auto" latinLnBrk="0" hangingPunct="1">
               <a:lnSpc>
                 <a:spcPct val="90000"/>
               </a:lnSpc>
@@ -18586,9 +18414,8 @@
                 <a:schemeClr val="tx1"/>
               </a:buClr>
               <a:buSzPct val="90000"/>
-              <a:buFont typeface="Wingdings" pitchFamily="2" charset="2"/>
+              <a:buFont typeface="Wingdings" panose="05000000000000000000" pitchFamily="2" charset="2"/>
               <a:buNone/>
-              <a:tabLst/>
               <a:defRPr lang="en-US" sz="2800" b="0" kern="1200" spc="0" baseline="0" dirty="0">
                 <a:gradFill>
                   <a:gsLst>
@@ -18608,20 +18435,18 @@
             </a:lvl1pPr>
             <a:lvl2pPr marL="0" indent="0">
               <a:buNone/>
-              <a:defRPr sz="1961"/>
+              <a:defRPr sz="1960"/>
             </a:lvl2pPr>
-            <a:lvl3pPr marL="227209" indent="0">
+            <a:lvl3pPr marL="227330" indent="0">
               <a:buNone/>
-              <a:tabLst/>
-              <a:defRPr sz="1961"/>
+              <a:defRPr sz="1960"/>
             </a:lvl3pPr>
-            <a:lvl4pPr marL="451306" indent="0">
+            <a:lvl4pPr marL="451485" indent="0">
               <a:buNone/>
               <a:defRPr/>
             </a:lvl4pPr>
-            <a:lvl5pPr marL="672290" indent="0">
+            <a:lvl5pPr marL="672465" indent="0">
               <a:buNone/>
-              <a:tabLst/>
               <a:defRPr/>
             </a:lvl5pPr>
           </a:lstStyle>
@@ -18680,19 +18505,19 @@
             </a:lvl2pPr>
             <a:lvl3pPr marL="0" indent="0" algn="l">
               <a:buNone/>
-              <a:defRPr sz="1568">
+              <a:defRPr sz="1570">
                 <a:latin typeface="+mn-lt"/>
               </a:defRPr>
             </a:lvl3pPr>
             <a:lvl4pPr marL="0" indent="0" algn="l">
               <a:buNone/>
-              <a:defRPr sz="1372">
+              <a:defRPr sz="1370">
                 <a:latin typeface="+mn-lt"/>
               </a:defRPr>
             </a:lvl4pPr>
             <a:lvl5pPr marL="0" indent="0" algn="l">
               <a:buNone/>
-              <a:defRPr sz="1372">
+              <a:defRPr sz="1370">
                 <a:latin typeface="+mn-lt"/>
               </a:defRPr>
             </a:lvl5pPr>
@@ -18768,7 +18593,6 @@
           <a:p>
             <a:fld id="{5AE1514C-5E56-4738-A1FF-4B1CFD2A3E36}" type="slidenum">
               <a:rPr lang="en-US" smtClean="0"/>
-              <a:pPr/>
               <a:t>‹#›</a:t>
             </a:fld>
             <a:endParaRPr lang="en-US" dirty="0"/>
@@ -18859,19 +18683,19 @@
             </a:lvl2pPr>
             <a:lvl3pPr marL="0" indent="0" algn="l">
               <a:buNone/>
-              <a:defRPr sz="1568">
+              <a:defRPr sz="1570">
                 <a:latin typeface="+mn-lt"/>
               </a:defRPr>
             </a:lvl3pPr>
             <a:lvl4pPr marL="0" indent="0" algn="l">
               <a:buNone/>
-              <a:defRPr sz="1372">
+              <a:defRPr sz="1370">
                 <a:latin typeface="+mn-lt"/>
               </a:defRPr>
             </a:lvl4pPr>
             <a:lvl5pPr marL="0" indent="0" algn="l">
               <a:buNone/>
-              <a:defRPr sz="1372">
+              <a:defRPr sz="1370">
                 <a:latin typeface="+mn-lt"/>
               </a:defRPr>
             </a:lvl5pPr>
@@ -18947,19 +18771,19 @@
             </a:lvl2pPr>
             <a:lvl3pPr marL="0" indent="0" algn="l">
               <a:buNone/>
-              <a:defRPr sz="1568">
+              <a:defRPr sz="1570">
                 <a:latin typeface="+mn-lt"/>
               </a:defRPr>
             </a:lvl3pPr>
             <a:lvl4pPr marL="0" indent="0" algn="l">
               <a:buNone/>
-              <a:defRPr sz="1372">
+              <a:defRPr sz="1370">
                 <a:latin typeface="+mn-lt"/>
               </a:defRPr>
             </a:lvl4pPr>
             <a:lvl5pPr marL="0" indent="0" algn="l">
               <a:buNone/>
-              <a:defRPr sz="1372">
+              <a:defRPr sz="1370">
                 <a:latin typeface="+mn-lt"/>
               </a:defRPr>
             </a:lvl5pPr>
@@ -19003,11 +18827,6 @@
         </p:txBody>
       </p:sp>
     </p:spTree>
-    <p:extLst>
-      <p:ext uri="{BB962C8B-B14F-4D97-AF65-F5344CB8AC3E}">
-        <p14:creationId xmlns:p14="http://schemas.microsoft.com/office/powerpoint/2010/main" val="2660674075"/>
-      </p:ext>
-    </p:extLst>
   </p:cSld>
   <p:clrMapOvr>
     <a:masterClrMapping/>
@@ -19318,7 +19137,6 @@
           <a:p>
             <a:fld id="{4997E989-D798-4C62-8E93-3D2D613C2488}" type="slidenum">
               <a:rPr lang="en-US" smtClean="0"/>
-              <a:pPr/>
               <a:t>‹#›</a:t>
             </a:fld>
             <a:endParaRPr lang="en-US" dirty="0"/>
@@ -19326,41 +19144,36 @@
         </p:txBody>
       </p:sp>
     </p:spTree>
-    <p:extLst>
-      <p:ext uri="{BB962C8B-B14F-4D97-AF65-F5344CB8AC3E}">
-        <p14:creationId xmlns:p14="http://schemas.microsoft.com/office/powerpoint/2010/main" val="3860510708"/>
-      </p:ext>
-    </p:extLst>
   </p:cSld>
   <p:clrMap bg1="lt1" tx1="dk1" bg2="lt2" tx2="dk2" accent1="accent1" accent2="accent2" accent3="accent3" accent4="accent4" accent5="accent5" accent6="accent6" hlink="hlink" folHlink="folHlink"/>
   <p:sldLayoutIdLst>
-    <p:sldLayoutId id="2147483744" r:id="rId1"/>
-    <p:sldLayoutId id="2147483712" r:id="rId2"/>
-    <p:sldLayoutId id="2147483672" r:id="rId3"/>
-    <p:sldLayoutId id="2147483749" r:id="rId4"/>
-    <p:sldLayoutId id="2147483750" r:id="rId5"/>
-    <p:sldLayoutId id="2147483752" r:id="rId6"/>
-    <p:sldLayoutId id="2147483674" r:id="rId7"/>
-    <p:sldLayoutId id="2147483720" r:id="rId8"/>
-    <p:sldLayoutId id="2147483721" r:id="rId9"/>
-    <p:sldLayoutId id="2147483732" r:id="rId10"/>
-    <p:sldLayoutId id="2147483730" r:id="rId11"/>
-    <p:sldLayoutId id="2147483716" r:id="rId12"/>
-    <p:sldLayoutId id="2147483735" r:id="rId13"/>
-    <p:sldLayoutId id="2147483700" r:id="rId14"/>
-    <p:sldLayoutId id="2147483734" r:id="rId15"/>
-    <p:sldLayoutId id="2147483701" r:id="rId16"/>
-    <p:sldLayoutId id="2147483736" r:id="rId17"/>
-    <p:sldLayoutId id="2147483733" r:id="rId18"/>
-    <p:sldLayoutId id="2147483741" r:id="rId19"/>
-    <p:sldLayoutId id="2147483727" r:id="rId20"/>
-    <p:sldLayoutId id="2147483719" r:id="rId21"/>
-    <p:sldLayoutId id="2147483655" r:id="rId22"/>
-    <p:sldLayoutId id="2147483748" r:id="rId23"/>
-    <p:sldLayoutId id="2147483753" r:id="rId24"/>
-    <p:sldLayoutId id="2147483747" r:id="rId25"/>
-    <p:sldLayoutId id="2147483745" r:id="rId26"/>
-    <p:sldLayoutId id="2147483737" r:id="rId27"/>
+    <p:sldLayoutId id="2147483649" r:id="rId1"/>
+    <p:sldLayoutId id="2147483650" r:id="rId2"/>
+    <p:sldLayoutId id="2147483651" r:id="rId3"/>
+    <p:sldLayoutId id="2147483652" r:id="rId4"/>
+    <p:sldLayoutId id="2147483653" r:id="rId5"/>
+    <p:sldLayoutId id="2147483654" r:id="rId6"/>
+    <p:sldLayoutId id="2147483655" r:id="rId7"/>
+    <p:sldLayoutId id="2147483656" r:id="rId8"/>
+    <p:sldLayoutId id="2147483657" r:id="rId9"/>
+    <p:sldLayoutId id="2147483658" r:id="rId10"/>
+    <p:sldLayoutId id="2147483659" r:id="rId11"/>
+    <p:sldLayoutId id="2147483660" r:id="rId12"/>
+    <p:sldLayoutId id="2147483661" r:id="rId13"/>
+    <p:sldLayoutId id="2147483662" r:id="rId14"/>
+    <p:sldLayoutId id="2147483663" r:id="rId15"/>
+    <p:sldLayoutId id="2147483664" r:id="rId16"/>
+    <p:sldLayoutId id="2147483665" r:id="rId17"/>
+    <p:sldLayoutId id="2147483666" r:id="rId18"/>
+    <p:sldLayoutId id="2147483667" r:id="rId19"/>
+    <p:sldLayoutId id="2147483668" r:id="rId20"/>
+    <p:sldLayoutId id="2147483669" r:id="rId21"/>
+    <p:sldLayoutId id="2147483670" r:id="rId22"/>
+    <p:sldLayoutId id="2147483671" r:id="rId23"/>
+    <p:sldLayoutId id="2147483672" r:id="rId24"/>
+    <p:sldLayoutId id="2147483673" r:id="rId25"/>
+    <p:sldLayoutId id="2147483674" r:id="rId26"/>
+    <p:sldLayoutId id="2147483675" r:id="rId27"/>
   </p:sldLayoutIdLst>
   <p:hf hdr="0" ftr="0" dt="0"/>
   <p:txStyles>
@@ -19677,47 +19490,6 @@
       </a:lvl9pPr>
     </p:otherStyle>
   </p:txStyles>
-  <p:extLst>
-    <p:ext uri="{27BBF7A9-308A-43DC-89C8-2F10F3537804}">
-      <p15:sldGuideLst xmlns:p15="http://schemas.microsoft.com/office/powerpoint/2012/main">
-        <p15:guide id="1" orient="horz" pos="2160" userDrawn="1">
-          <p15:clr>
-            <a:srgbClr val="F26B43"/>
-          </p15:clr>
-        </p15:guide>
-        <p15:guide id="2" pos="3840" userDrawn="1">
-          <p15:clr>
-            <a:srgbClr val="F26B43"/>
-          </p15:clr>
-        </p15:guide>
-        <p15:guide id="3" pos="192" userDrawn="1">
-          <p15:clr>
-            <a:srgbClr val="F26B43"/>
-          </p15:clr>
-        </p15:guide>
-        <p15:guide id="4" pos="7536" userDrawn="1">
-          <p15:clr>
-            <a:srgbClr val="F26B43"/>
-          </p15:clr>
-        </p15:guide>
-        <p15:guide id="5" orient="horz" pos="264" userDrawn="1">
-          <p15:clr>
-            <a:srgbClr val="F26B43"/>
-          </p15:clr>
-        </p15:guide>
-        <p15:guide id="6" orient="horz" pos="792" userDrawn="1">
-          <p15:clr>
-            <a:srgbClr val="F26B43"/>
-          </p15:clr>
-        </p15:guide>
-        <p15:guide id="7" orient="horz" pos="4200" userDrawn="1">
-          <p15:clr>
-            <a:srgbClr val="F26B43"/>
-          </p15:clr>
-        </p15:guide>
-      </p15:sldGuideLst>
-    </p:ext>
-  </p:extLst>
 </p:sldMaster>
 </file>
 
@@ -19867,7 +19639,6 @@
               <a:buSzTx/>
               <a:buFontTx/>
               <a:buNone/>
-              <a:tabLst/>
               <a:defRPr/>
             </a:pPr>
             <a:endParaRPr kumimoji="0" lang="en-US" sz="1800" b="0" i="0" u="none" strike="noStrike" kern="0" cap="none" spc="0" normalizeH="0" baseline="0" dirty="0">
@@ -19940,7 +19711,6 @@
               <a:buSzTx/>
               <a:buFontTx/>
               <a:buNone/>
-              <a:tabLst/>
               <a:defRPr/>
             </a:pPr>
             <a:endParaRPr kumimoji="0" lang="en-US" sz="1800" b="0" i="0" u="none" strike="noStrike" kern="0" cap="none" spc="0" normalizeH="0" baseline="0" dirty="0">
@@ -20013,7 +19783,6 @@
               <a:buSzTx/>
               <a:buFontTx/>
               <a:buNone/>
-              <a:tabLst/>
               <a:defRPr/>
             </a:pPr>
             <a:endParaRPr kumimoji="0" lang="en-US" sz="1800" b="0" i="0" u="none" strike="noStrike" kern="0" cap="none" spc="0" normalizeH="0" baseline="0" dirty="0">
@@ -20086,7 +19855,6 @@
               <a:buSzTx/>
               <a:buFontTx/>
               <a:buNone/>
-              <a:tabLst/>
               <a:defRPr/>
             </a:pPr>
             <a:endParaRPr kumimoji="0" lang="en-US" sz="1800" b="0" i="0" u="none" strike="noStrike" kern="0" cap="none" spc="0" normalizeH="0" baseline="0" dirty="0">
@@ -20159,7 +19927,6 @@
               <a:buSzTx/>
               <a:buFontTx/>
               <a:buNone/>
-              <a:tabLst/>
               <a:defRPr/>
             </a:pPr>
             <a:endParaRPr kumimoji="0" lang="en-US" sz="1800" b="0" i="0" u="none" strike="noStrike" kern="0" cap="none" spc="0" normalizeH="0" baseline="0" dirty="0">
@@ -20233,7 +20000,6 @@
               <a:buSzTx/>
               <a:buFontTx/>
               <a:buNone/>
-              <a:tabLst/>
               <a:defRPr/>
             </a:pPr>
             <a:endParaRPr kumimoji="0" lang="en-US" sz="1800" b="0" i="0" u="none" strike="noStrike" kern="0" cap="none" spc="0" normalizeH="0" baseline="0" dirty="0">
@@ -20359,9 +20125,7 @@
       <p:sp>
         <p:nvSpPr>
           <p:cNvPr id="9" name="Title 6"/>
-          <p:cNvSpPr txBox="1">
-            <a:spLocks/>
-          </p:cNvSpPr>
+          <p:cNvSpPr txBox="1"/>
           <p:nvPr/>
         </p:nvSpPr>
         <p:spPr>
@@ -20571,7 +20335,6 @@
               <a:buSzTx/>
               <a:buFontTx/>
               <a:buNone/>
-              <a:tabLst/>
               <a:defRPr/>
             </a:pPr>
             <a:endParaRPr kumimoji="0" lang="en-US" sz="1800" b="0" i="0" u="none" strike="noStrike" kern="0" cap="none" spc="0" normalizeH="0" baseline="0" dirty="0">
@@ -20613,13 +20376,7 @@
       </p:sp>
       <p:pic>
         <p:nvPicPr>
-          <p:cNvPr id="13" name="Picture 12">
-            <a:extLst>
-              <a:ext uri="{FF2B5EF4-FFF2-40B4-BE49-F238E27FC236}">
-                <a16:creationId xmlns:a16="http://schemas.microsoft.com/office/drawing/2014/main" id="{3EBE6AA3-5741-0A14-5F0F-785DB9B1B59E}"/>
-              </a:ext>
-            </a:extLst>
-          </p:cNvPr>
+          <p:cNvPr id="13" name="Picture 12"/>
           <p:cNvPicPr>
             <a:picLocks noChangeAspect="1"/>
           </p:cNvPicPr>
@@ -20648,11 +20405,6 @@
         </p:spPr>
       </p:pic>
     </p:spTree>
-    <p:extLst>
-      <p:ext uri="{BB962C8B-B14F-4D97-AF65-F5344CB8AC3E}">
-        <p14:creationId xmlns:p14="http://schemas.microsoft.com/office/powerpoint/2010/main" val="1788325768"/>
-      </p:ext>
-    </p:extLst>
   </p:cSld>
   <p:clrMapOvr>
     <a:masterClrMapping/>
@@ -21394,7 +21146,7 @@
                         <p:par>
                           <p:cTn id="53" fill="hold">
                             <p:stCondLst>
-                              <p:cond delay="1250"/>
+                              <p:cond delay="500"/>
                             </p:stCondLst>
                             <p:childTnLst>
                               <p:par>
@@ -21430,7 +21182,7 @@
                         <p:par>
                           <p:cTn id="56" fill="hold">
                             <p:stCondLst>
-                              <p:cond delay="1250"/>
+                              <p:cond delay="500"/>
                             </p:stCondLst>
                             <p:childTnLst>
                               <p:par>
@@ -21572,13 +21324,7 @@
       </p:grpSpPr>
       <p:sp>
         <p:nvSpPr>
-          <p:cNvPr id="10" name="Title 9">
-            <a:extLst>
-              <a:ext uri="{FF2B5EF4-FFF2-40B4-BE49-F238E27FC236}">
-                <a16:creationId xmlns:a16="http://schemas.microsoft.com/office/drawing/2014/main" id="{0952C55C-6656-F7BB-BF3A-043EEEF765BA}"/>
-              </a:ext>
-            </a:extLst>
-          </p:cNvPr>
+          <p:cNvPr id="10" name="Title 9"/>
           <p:cNvSpPr>
             <a:spLocks noGrp="1"/>
           </p:cNvSpPr>
@@ -21685,13 +21431,7 @@
       </p:sp>
       <p:sp>
         <p:nvSpPr>
-          <p:cNvPr id="3" name="Slide Number Placeholder 2">
-            <a:extLst>
-              <a:ext uri="{FF2B5EF4-FFF2-40B4-BE49-F238E27FC236}">
-                <a16:creationId xmlns:a16="http://schemas.microsoft.com/office/drawing/2014/main" id="{29FA48A0-94BB-4B06-9432-D53B7BDA2773}"/>
-              </a:ext>
-            </a:extLst>
-          </p:cNvPr>
+          <p:cNvPr id="3" name="Slide Number Placeholder 2"/>
           <p:cNvSpPr>
             <a:spLocks noGrp="1"/>
           </p:cNvSpPr>
@@ -21719,16 +21459,8 @@
       </p:sp>
       <p:sp>
         <p:nvSpPr>
-          <p:cNvPr id="11" name="Title 6">
-            <a:extLst>
-              <a:ext uri="{FF2B5EF4-FFF2-40B4-BE49-F238E27FC236}">
-                <a16:creationId xmlns:a16="http://schemas.microsoft.com/office/drawing/2014/main" id="{FD78C205-E2FF-EC0A-EF19-7AAD7A641D63}"/>
-              </a:ext>
-            </a:extLst>
-          </p:cNvPr>
-          <p:cNvSpPr txBox="1">
-            <a:spLocks/>
-          </p:cNvSpPr>
+          <p:cNvPr id="11" name="Title 6"/>
+          <p:cNvSpPr txBox="1"/>
           <p:nvPr/>
         </p:nvSpPr>
         <p:spPr>
@@ -21784,11 +21516,6 @@
         </p:txBody>
       </p:sp>
     </p:spTree>
-    <p:extLst>
-      <p:ext uri="{BB962C8B-B14F-4D97-AF65-F5344CB8AC3E}">
-        <p14:creationId xmlns:p14="http://schemas.microsoft.com/office/powerpoint/2010/main" val="966677200"/>
-      </p:ext>
-    </p:extLst>
   </p:cSld>
   <p:clrMapOvr>
     <a:masterClrMapping/>
@@ -21954,7 +21681,6 @@
               <a:buSzTx/>
               <a:buFontTx/>
               <a:buNone/>
-              <a:tabLst/>
               <a:defRPr/>
             </a:pPr>
             <a:endParaRPr kumimoji="0" lang="en-US" sz="1800" b="0" i="0" u="none" strike="noStrike" kern="0" cap="none" spc="0" normalizeH="0" baseline="0" dirty="0">
@@ -22027,7 +21753,6 @@
               <a:buSzTx/>
               <a:buFontTx/>
               <a:buNone/>
-              <a:tabLst/>
               <a:defRPr/>
             </a:pPr>
             <a:endParaRPr kumimoji="0" lang="en-US" sz="1800" b="0" i="0" u="none" strike="noStrike" kern="0" cap="none" spc="0" normalizeH="0" baseline="0" dirty="0">
@@ -22100,7 +21825,6 @@
               <a:buSzTx/>
               <a:buFontTx/>
               <a:buNone/>
-              <a:tabLst/>
               <a:defRPr/>
             </a:pPr>
             <a:endParaRPr kumimoji="0" lang="en-US" sz="1800" b="0" i="0" u="none" strike="noStrike" kern="0" cap="none" spc="0" normalizeH="0" baseline="0" dirty="0">
@@ -22173,7 +21897,6 @@
               <a:buSzTx/>
               <a:buFontTx/>
               <a:buNone/>
-              <a:tabLst/>
               <a:defRPr/>
             </a:pPr>
             <a:endParaRPr kumimoji="0" lang="en-US" sz="1800" b="0" i="0" u="none" strike="noStrike" kern="0" cap="none" spc="0" normalizeH="0" baseline="0" dirty="0">
@@ -22246,7 +21969,6 @@
               <a:buSzTx/>
               <a:buFontTx/>
               <a:buNone/>
-              <a:tabLst/>
               <a:defRPr/>
             </a:pPr>
             <a:endParaRPr kumimoji="0" lang="en-US" sz="1800" b="0" i="0" u="none" strike="noStrike" kern="0" cap="none" spc="0" normalizeH="0" baseline="0" dirty="0">
@@ -22320,7 +22042,6 @@
               <a:buSzTx/>
               <a:buFontTx/>
               <a:buNone/>
-              <a:tabLst/>
               <a:defRPr/>
             </a:pPr>
             <a:endParaRPr kumimoji="0" lang="en-US" sz="1800" b="0" i="0" u="none" strike="noStrike" kern="0" cap="none" spc="0" normalizeH="0" baseline="0" dirty="0">
@@ -22446,9 +22167,7 @@
       <p:sp>
         <p:nvSpPr>
           <p:cNvPr id="9" name="Title 6"/>
-          <p:cNvSpPr txBox="1">
-            <a:spLocks/>
-          </p:cNvSpPr>
+          <p:cNvSpPr txBox="1"/>
           <p:nvPr/>
         </p:nvSpPr>
         <p:spPr>
@@ -22650,7 +22369,6 @@
               <a:buSzTx/>
               <a:buFontTx/>
               <a:buNone/>
-              <a:tabLst/>
               <a:defRPr/>
             </a:pPr>
             <a:endParaRPr kumimoji="0" lang="en-US" sz="1800" b="0" i="0" u="none" strike="noStrike" kern="0" cap="none" spc="0" normalizeH="0" baseline="0" dirty="0">
@@ -22692,13 +22410,7 @@
       </p:sp>
       <p:pic>
         <p:nvPicPr>
-          <p:cNvPr id="5" name="图片 4">
-            <a:extLst>
-              <a:ext uri="{FF2B5EF4-FFF2-40B4-BE49-F238E27FC236}">
-                <a16:creationId xmlns:a16="http://schemas.microsoft.com/office/drawing/2014/main" id="{2EE11362-2D4B-D65C-DFD6-B72A40A575B1}"/>
-              </a:ext>
-            </a:extLst>
-          </p:cNvPr>
+          <p:cNvPr id="5" name="图片 4"/>
           <p:cNvPicPr>
             <a:picLocks noChangeAspect="1"/>
           </p:cNvPicPr>
@@ -22728,13 +22440,7 @@
       </p:pic>
       <p:pic>
         <p:nvPicPr>
-          <p:cNvPr id="6" name="图片 5">
-            <a:extLst>
-              <a:ext uri="{FF2B5EF4-FFF2-40B4-BE49-F238E27FC236}">
-                <a16:creationId xmlns:a16="http://schemas.microsoft.com/office/drawing/2014/main" id="{B0AB461D-6F99-F5FD-A6BF-B6CBEF65B9EC}"/>
-              </a:ext>
-            </a:extLst>
-          </p:cNvPr>
+          <p:cNvPr id="6" name="图片 5"/>
           <p:cNvPicPr>
             <a:picLocks noChangeAspect="1"/>
           </p:cNvPicPr>
@@ -22768,13 +22474,7 @@
       </p:pic>
       <p:pic>
         <p:nvPicPr>
-          <p:cNvPr id="8" name="图片 7">
-            <a:extLst>
-              <a:ext uri="{FF2B5EF4-FFF2-40B4-BE49-F238E27FC236}">
-                <a16:creationId xmlns:a16="http://schemas.microsoft.com/office/drawing/2014/main" id="{87956A8C-A80E-46C3-0C93-FAD930985CEB}"/>
-              </a:ext>
-            </a:extLst>
-          </p:cNvPr>
+          <p:cNvPr id="8" name="图片 7"/>
           <p:cNvPicPr>
             <a:picLocks noChangeAspect="1"/>
           </p:cNvPicPr>
@@ -22808,13 +22508,7 @@
       </p:pic>
       <p:sp>
         <p:nvSpPr>
-          <p:cNvPr id="17" name="箭头: 右 16">
-            <a:extLst>
-              <a:ext uri="{FF2B5EF4-FFF2-40B4-BE49-F238E27FC236}">
-                <a16:creationId xmlns:a16="http://schemas.microsoft.com/office/drawing/2014/main" id="{D4928FC7-6661-4ADB-62A3-9440C7CA0470}"/>
-              </a:ext>
-            </a:extLst>
-          </p:cNvPr>
+          <p:cNvPr id="17" name="箭头: 右 16"/>
           <p:cNvSpPr/>
           <p:nvPr/>
         </p:nvSpPr>
@@ -22854,13 +22548,7 @@
       </p:sp>
       <p:pic>
         <p:nvPicPr>
-          <p:cNvPr id="18" name="图片 17">
-            <a:extLst>
-              <a:ext uri="{FF2B5EF4-FFF2-40B4-BE49-F238E27FC236}">
-                <a16:creationId xmlns:a16="http://schemas.microsoft.com/office/drawing/2014/main" id="{4A4CD44E-0EEC-B047-AC3A-9CAC8AD52D23}"/>
-              </a:ext>
-            </a:extLst>
-          </p:cNvPr>
+          <p:cNvPr id="18" name="图片 17"/>
           <p:cNvPicPr>
             <a:picLocks noChangeAspect="1"/>
           </p:cNvPicPr>
@@ -22893,11 +22581,6 @@
         </p:spPr>
       </p:pic>
     </p:spTree>
-    <p:extLst>
-      <p:ext uri="{BB962C8B-B14F-4D97-AF65-F5344CB8AC3E}">
-        <p14:creationId xmlns:p14="http://schemas.microsoft.com/office/powerpoint/2010/main" val="1480494732"/>
-      </p:ext>
-    </p:extLst>
   </p:cSld>
   <p:clrMapOvr>
     <a:masterClrMapping/>
@@ -23639,7 +23322,7 @@
                         <p:par>
                           <p:cTn id="53" fill="hold">
                             <p:stCondLst>
-                              <p:cond delay="1250"/>
+                              <p:cond delay="500"/>
                             </p:stCondLst>
                             <p:childTnLst>
                               <p:par>
@@ -23675,7 +23358,7 @@
                         <p:par>
                           <p:cTn id="56" fill="hold">
                             <p:stCondLst>
-                              <p:cond delay="1250"/>
+                              <p:cond delay="500"/>
                             </p:stCondLst>
                             <p:childTnLst>
                               <p:par>
@@ -23796,6 +23479,2039 @@
     </p:bldLst>
   </p:timing>
 </p:sld>
+</file>
+
+<file path=ppt/slides/slide4.xml><?xml version="1.0" encoding="utf-8"?>
+<p:sld xmlns:a="http://schemas.openxmlformats.org/drawingml/2006/main" xmlns:r="http://schemas.openxmlformats.org/officeDocument/2006/relationships" xmlns:p="http://schemas.openxmlformats.org/presentationml/2006/main">
+  <p:cSld>
+    <p:spTree>
+      <p:nvGrpSpPr>
+        <p:cNvPr id="1" name=""/>
+        <p:cNvGrpSpPr/>
+        <p:nvPr/>
+      </p:nvGrpSpPr>
+      <p:grpSpPr>
+        <a:xfrm>
+          <a:off x="0" y="0"/>
+          <a:ext cx="0" cy="0"/>
+          <a:chOff x="0" y="0"/>
+          <a:chExt cx="0" cy="0"/>
+        </a:xfrm>
+      </p:grpSpPr>
+      <p:pic>
+        <p:nvPicPr>
+          <p:cNvPr id="31" name="Picture Placeholder 30"/>
+          <p:cNvPicPr>
+            <a:picLocks noGrp="1" noChangeAspect="1"/>
+          </p:cNvPicPr>
+          <p:nvPr>
+            <p:ph type="pic" sz="quarter" idx="14"/>
+          </p:nvPr>
+        </p:nvPicPr>
+        <p:blipFill>
+          <a:blip r:embed="rId4">
+            <a:extLst>
+              <a:ext uri="{28A0092B-C50C-407E-A947-70E740481C1C}">
+                <a14:useLocalDpi xmlns:a14="http://schemas.microsoft.com/office/drawing/2010/main" val="0"/>
+              </a:ext>
+            </a:extLst>
+          </a:blip>
+          <a:srcRect/>
+          <a:stretch>
+            <a:fillRect/>
+          </a:stretch>
+        </p:blipFill>
+        <p:spPr/>
+      </p:pic>
+      <p:sp>
+        <p:nvSpPr>
+          <p:cNvPr id="4" name="Rectangle 3"/>
+          <p:cNvSpPr/>
+          <p:nvPr/>
+        </p:nvSpPr>
+        <p:spPr>
+          <a:xfrm>
+            <a:off x="0" y="0"/>
+            <a:ext cx="12192000" cy="6858000"/>
+          </a:xfrm>
+          <a:prstGeom prst="rect">
+            <a:avLst/>
+          </a:prstGeom>
+          <a:solidFill>
+            <a:srgbClr val="000000">
+              <a:alpha val="40000"/>
+            </a:srgbClr>
+          </a:solidFill>
+          <a:ln>
+            <a:noFill/>
+          </a:ln>
+        </p:spPr>
+        <p:style>
+          <a:lnRef idx="2">
+            <a:schemeClr val="accent1">
+              <a:shade val="50000"/>
+            </a:schemeClr>
+          </a:lnRef>
+          <a:fillRef idx="1">
+            <a:schemeClr val="accent1"/>
+          </a:fillRef>
+          <a:effectRef idx="0">
+            <a:schemeClr val="accent1"/>
+          </a:effectRef>
+          <a:fontRef idx="minor">
+            <a:schemeClr val="lt1"/>
+          </a:fontRef>
+        </p:style>
+        <p:txBody>
+          <a:bodyPr rtlCol="0" anchor="ctr"/>
+          <a:lstStyle/>
+          <a:p>
+            <a:pPr algn="ctr"/>
+            <a:endParaRPr lang="en-US" dirty="0"/>
+          </a:p>
+        </p:txBody>
+      </p:sp>
+      <p:sp>
+        <p:nvSpPr>
+          <p:cNvPr id="14" name="Oval 13"/>
+          <p:cNvSpPr/>
+          <p:nvPr/>
+        </p:nvSpPr>
+        <p:spPr>
+          <a:xfrm>
+            <a:off x="1219939" y="-739444"/>
+            <a:ext cx="9107555" cy="9034439"/>
+          </a:xfrm>
+          <a:prstGeom prst="ellipse">
+            <a:avLst/>
+          </a:prstGeom>
+          <a:noFill/>
+          <a:ln w="19050">
+            <a:solidFill>
+              <a:schemeClr val="accent1"/>
+            </a:solidFill>
+          </a:ln>
+          <a:effectLst/>
+        </p:spPr>
+        <p:style>
+          <a:lnRef idx="2">
+            <a:schemeClr val="accent1">
+              <a:shade val="50000"/>
+            </a:schemeClr>
+          </a:lnRef>
+          <a:fillRef idx="1">
+            <a:schemeClr val="accent1"/>
+          </a:fillRef>
+          <a:effectRef idx="0">
+            <a:schemeClr val="accent1"/>
+          </a:effectRef>
+          <a:fontRef idx="minor">
+            <a:schemeClr val="lt1"/>
+          </a:fontRef>
+        </p:style>
+        <p:txBody>
+          <a:bodyPr rtlCol="0" anchor="ctr"/>
+          <a:lstStyle/>
+          <a:p>
+            <a:pPr marL="0" marR="0" lvl="0" indent="0" algn="ctr" defTabSz="914400" eaLnBrk="1" fontAlgn="auto" latinLnBrk="0" hangingPunct="1">
+              <a:lnSpc>
+                <a:spcPct val="100000"/>
+              </a:lnSpc>
+              <a:spcBef>
+                <a:spcPts val="0"/>
+              </a:spcBef>
+              <a:spcAft>
+                <a:spcPts val="0"/>
+              </a:spcAft>
+              <a:buClrTx/>
+              <a:buSzTx/>
+              <a:buFontTx/>
+              <a:buNone/>
+              <a:defRPr/>
+            </a:pPr>
+            <a:endParaRPr kumimoji="0" lang="en-US" sz="1800" b="0" i="0" u="none" strike="noStrike" kern="0" cap="none" spc="0" normalizeH="0" baseline="0" dirty="0">
+              <a:ln>
+                <a:noFill/>
+              </a:ln>
+              <a:solidFill>
+                <a:sysClr val="windowText" lastClr="000000"/>
+              </a:solidFill>
+              <a:effectLst/>
+              <a:uLnTx/>
+              <a:uFillTx/>
+            </a:endParaRPr>
+          </a:p>
+        </p:txBody>
+      </p:sp>
+      <p:sp>
+        <p:nvSpPr>
+          <p:cNvPr id="15" name="Oval 14"/>
+          <p:cNvSpPr/>
+          <p:nvPr/>
+        </p:nvSpPr>
+        <p:spPr>
+          <a:xfrm>
+            <a:off x="1219939" y="-739444"/>
+            <a:ext cx="9107555" cy="9034439"/>
+          </a:xfrm>
+          <a:prstGeom prst="ellipse">
+            <a:avLst/>
+          </a:prstGeom>
+          <a:noFill/>
+          <a:ln w="19050">
+            <a:solidFill>
+              <a:schemeClr val="accent1"/>
+            </a:solidFill>
+          </a:ln>
+          <a:effectLst/>
+        </p:spPr>
+        <p:style>
+          <a:lnRef idx="2">
+            <a:schemeClr val="accent1">
+              <a:shade val="50000"/>
+            </a:schemeClr>
+          </a:lnRef>
+          <a:fillRef idx="1">
+            <a:schemeClr val="accent1"/>
+          </a:fillRef>
+          <a:effectRef idx="0">
+            <a:schemeClr val="accent1"/>
+          </a:effectRef>
+          <a:fontRef idx="minor">
+            <a:schemeClr val="lt1"/>
+          </a:fontRef>
+        </p:style>
+        <p:txBody>
+          <a:bodyPr rtlCol="0" anchor="ctr"/>
+          <a:lstStyle/>
+          <a:p>
+            <a:pPr marL="0" marR="0" lvl="0" indent="0" algn="ctr" defTabSz="914400" eaLnBrk="1" fontAlgn="auto" latinLnBrk="0" hangingPunct="1">
+              <a:lnSpc>
+                <a:spcPct val="100000"/>
+              </a:lnSpc>
+              <a:spcBef>
+                <a:spcPts val="0"/>
+              </a:spcBef>
+              <a:spcAft>
+                <a:spcPts val="0"/>
+              </a:spcAft>
+              <a:buClrTx/>
+              <a:buSzTx/>
+              <a:buFontTx/>
+              <a:buNone/>
+              <a:defRPr/>
+            </a:pPr>
+            <a:endParaRPr kumimoji="0" lang="en-US" sz="1800" b="0" i="0" u="none" strike="noStrike" kern="0" cap="none" spc="0" normalizeH="0" baseline="0" dirty="0">
+              <a:ln>
+                <a:noFill/>
+              </a:ln>
+              <a:solidFill>
+                <a:sysClr val="windowText" lastClr="000000"/>
+              </a:solidFill>
+              <a:effectLst/>
+              <a:uLnTx/>
+              <a:uFillTx/>
+            </a:endParaRPr>
+          </a:p>
+        </p:txBody>
+      </p:sp>
+      <p:sp>
+        <p:nvSpPr>
+          <p:cNvPr id="16" name="Oval 15"/>
+          <p:cNvSpPr/>
+          <p:nvPr/>
+        </p:nvSpPr>
+        <p:spPr>
+          <a:xfrm>
+            <a:off x="1219939" y="-739444"/>
+            <a:ext cx="9107555" cy="9034439"/>
+          </a:xfrm>
+          <a:prstGeom prst="ellipse">
+            <a:avLst/>
+          </a:prstGeom>
+          <a:noFill/>
+          <a:ln w="19050">
+            <a:solidFill>
+              <a:schemeClr val="accent1"/>
+            </a:solidFill>
+          </a:ln>
+          <a:effectLst/>
+        </p:spPr>
+        <p:style>
+          <a:lnRef idx="2">
+            <a:schemeClr val="accent1">
+              <a:shade val="50000"/>
+            </a:schemeClr>
+          </a:lnRef>
+          <a:fillRef idx="1">
+            <a:schemeClr val="accent1"/>
+          </a:fillRef>
+          <a:effectRef idx="0">
+            <a:schemeClr val="accent1"/>
+          </a:effectRef>
+          <a:fontRef idx="minor">
+            <a:schemeClr val="lt1"/>
+          </a:fontRef>
+        </p:style>
+        <p:txBody>
+          <a:bodyPr rtlCol="0" anchor="ctr"/>
+          <a:lstStyle/>
+          <a:p>
+            <a:pPr marL="0" marR="0" lvl="0" indent="0" algn="ctr" defTabSz="914400" eaLnBrk="1" fontAlgn="auto" latinLnBrk="0" hangingPunct="1">
+              <a:lnSpc>
+                <a:spcPct val="100000"/>
+              </a:lnSpc>
+              <a:spcBef>
+                <a:spcPts val="0"/>
+              </a:spcBef>
+              <a:spcAft>
+                <a:spcPts val="0"/>
+              </a:spcAft>
+              <a:buClrTx/>
+              <a:buSzTx/>
+              <a:buFontTx/>
+              <a:buNone/>
+              <a:defRPr/>
+            </a:pPr>
+            <a:endParaRPr kumimoji="0" lang="en-US" sz="1800" b="0" i="0" u="none" strike="noStrike" kern="0" cap="none" spc="0" normalizeH="0" baseline="0" dirty="0">
+              <a:ln>
+                <a:noFill/>
+              </a:ln>
+              <a:solidFill>
+                <a:sysClr val="windowText" lastClr="000000"/>
+              </a:solidFill>
+              <a:effectLst/>
+              <a:uLnTx/>
+              <a:uFillTx/>
+            </a:endParaRPr>
+          </a:p>
+        </p:txBody>
+      </p:sp>
+      <p:sp>
+        <p:nvSpPr>
+          <p:cNvPr id="10" name="Oval 9"/>
+          <p:cNvSpPr/>
+          <p:nvPr/>
+        </p:nvSpPr>
+        <p:spPr>
+          <a:xfrm>
+            <a:off x="5907634" y="3213970"/>
+            <a:ext cx="2805809" cy="2783284"/>
+          </a:xfrm>
+          <a:prstGeom prst="ellipse">
+            <a:avLst/>
+          </a:prstGeom>
+          <a:noFill/>
+          <a:ln w="19050">
+            <a:solidFill>
+              <a:schemeClr val="accent1"/>
+            </a:solidFill>
+          </a:ln>
+          <a:effectLst/>
+        </p:spPr>
+        <p:style>
+          <a:lnRef idx="2">
+            <a:schemeClr val="accent1">
+              <a:shade val="50000"/>
+            </a:schemeClr>
+          </a:lnRef>
+          <a:fillRef idx="1">
+            <a:schemeClr val="accent1"/>
+          </a:fillRef>
+          <a:effectRef idx="0">
+            <a:schemeClr val="accent1"/>
+          </a:effectRef>
+          <a:fontRef idx="minor">
+            <a:schemeClr val="lt1"/>
+          </a:fontRef>
+        </p:style>
+        <p:txBody>
+          <a:bodyPr rtlCol="0" anchor="ctr"/>
+          <a:lstStyle/>
+          <a:p>
+            <a:pPr marL="0" marR="0" lvl="0" indent="0" algn="ctr" defTabSz="914400" eaLnBrk="1" fontAlgn="auto" latinLnBrk="0" hangingPunct="1">
+              <a:lnSpc>
+                <a:spcPct val="100000"/>
+              </a:lnSpc>
+              <a:spcBef>
+                <a:spcPts val="0"/>
+              </a:spcBef>
+              <a:spcAft>
+                <a:spcPts val="0"/>
+              </a:spcAft>
+              <a:buClrTx/>
+              <a:buSzTx/>
+              <a:buFontTx/>
+              <a:buNone/>
+              <a:defRPr/>
+            </a:pPr>
+            <a:endParaRPr kumimoji="0" lang="en-US" sz="1800" b="0" i="0" u="none" strike="noStrike" kern="0" cap="none" spc="0" normalizeH="0" baseline="0" dirty="0">
+              <a:ln>
+                <a:noFill/>
+              </a:ln>
+              <a:solidFill>
+                <a:sysClr val="windowText" lastClr="000000"/>
+              </a:solidFill>
+              <a:effectLst/>
+              <a:uLnTx/>
+              <a:uFillTx/>
+            </a:endParaRPr>
+          </a:p>
+        </p:txBody>
+      </p:sp>
+      <p:sp>
+        <p:nvSpPr>
+          <p:cNvPr id="11" name="Oval 10"/>
+          <p:cNvSpPr/>
+          <p:nvPr/>
+        </p:nvSpPr>
+        <p:spPr>
+          <a:xfrm>
+            <a:off x="5907634" y="3213970"/>
+            <a:ext cx="2805809" cy="2783284"/>
+          </a:xfrm>
+          <a:prstGeom prst="ellipse">
+            <a:avLst/>
+          </a:prstGeom>
+          <a:noFill/>
+          <a:ln w="19050">
+            <a:solidFill>
+              <a:schemeClr val="accent1"/>
+            </a:solidFill>
+          </a:ln>
+          <a:effectLst/>
+        </p:spPr>
+        <p:style>
+          <a:lnRef idx="2">
+            <a:schemeClr val="accent1">
+              <a:shade val="50000"/>
+            </a:schemeClr>
+          </a:lnRef>
+          <a:fillRef idx="1">
+            <a:schemeClr val="accent1"/>
+          </a:fillRef>
+          <a:effectRef idx="0">
+            <a:schemeClr val="accent1"/>
+          </a:effectRef>
+          <a:fontRef idx="minor">
+            <a:schemeClr val="lt1"/>
+          </a:fontRef>
+        </p:style>
+        <p:txBody>
+          <a:bodyPr rtlCol="0" anchor="ctr"/>
+          <a:lstStyle/>
+          <a:p>
+            <a:pPr marL="0" marR="0" lvl="0" indent="0" algn="ctr" defTabSz="914400" eaLnBrk="1" fontAlgn="auto" latinLnBrk="0" hangingPunct="1">
+              <a:lnSpc>
+                <a:spcPct val="100000"/>
+              </a:lnSpc>
+              <a:spcBef>
+                <a:spcPts val="0"/>
+              </a:spcBef>
+              <a:spcAft>
+                <a:spcPts val="0"/>
+              </a:spcAft>
+              <a:buClrTx/>
+              <a:buSzTx/>
+              <a:buFontTx/>
+              <a:buNone/>
+              <a:defRPr/>
+            </a:pPr>
+            <a:endParaRPr kumimoji="0" lang="en-US" sz="1800" b="0" i="0" u="none" strike="noStrike" kern="0" cap="none" spc="0" normalizeH="0" baseline="0" dirty="0">
+              <a:ln>
+                <a:noFill/>
+              </a:ln>
+              <a:solidFill>
+                <a:sysClr val="windowText" lastClr="000000"/>
+              </a:solidFill>
+              <a:effectLst/>
+              <a:uLnTx/>
+              <a:uFillTx/>
+            </a:endParaRPr>
+          </a:p>
+        </p:txBody>
+      </p:sp>
+      <p:sp>
+        <p:nvSpPr>
+          <p:cNvPr id="12" name="Oval 11"/>
+          <p:cNvSpPr/>
+          <p:nvPr/>
+        </p:nvSpPr>
+        <p:spPr>
+          <a:xfrm>
+            <a:off x="5907634" y="3213970"/>
+            <a:ext cx="2805809" cy="2783284"/>
+          </a:xfrm>
+          <a:prstGeom prst="ellipse">
+            <a:avLst/>
+          </a:prstGeom>
+          <a:noFill/>
+          <a:ln w="19050" cmpd="thinThick">
+            <a:solidFill>
+              <a:schemeClr val="accent1"/>
+            </a:solidFill>
+            <a:prstDash val="solid"/>
+          </a:ln>
+          <a:effectLst/>
+        </p:spPr>
+        <p:style>
+          <a:lnRef idx="2">
+            <a:schemeClr val="accent1">
+              <a:shade val="50000"/>
+            </a:schemeClr>
+          </a:lnRef>
+          <a:fillRef idx="1">
+            <a:schemeClr val="accent1"/>
+          </a:fillRef>
+          <a:effectRef idx="0">
+            <a:schemeClr val="accent1"/>
+          </a:effectRef>
+          <a:fontRef idx="minor">
+            <a:schemeClr val="lt1"/>
+          </a:fontRef>
+        </p:style>
+        <p:txBody>
+          <a:bodyPr rtlCol="0" anchor="ctr"/>
+          <a:lstStyle/>
+          <a:p>
+            <a:pPr marL="0" marR="0" lvl="0" indent="0" algn="ctr" defTabSz="914400" eaLnBrk="1" fontAlgn="auto" latinLnBrk="0" hangingPunct="1">
+              <a:lnSpc>
+                <a:spcPct val="100000"/>
+              </a:lnSpc>
+              <a:spcBef>
+                <a:spcPts val="0"/>
+              </a:spcBef>
+              <a:spcAft>
+                <a:spcPts val="0"/>
+              </a:spcAft>
+              <a:buClrTx/>
+              <a:buSzTx/>
+              <a:buFontTx/>
+              <a:buNone/>
+              <a:defRPr/>
+            </a:pPr>
+            <a:endParaRPr kumimoji="0" lang="en-US" sz="1800" b="0" i="0" u="none" strike="noStrike" kern="0" cap="none" spc="0" normalizeH="0" baseline="0" dirty="0">
+              <a:ln>
+                <a:noFill/>
+              </a:ln>
+              <a:solidFill>
+                <a:sysClr val="windowText" lastClr="000000"/>
+              </a:solidFill>
+              <a:effectLst/>
+              <a:uLnTx/>
+              <a:uFillTx/>
+            </a:endParaRPr>
+          </a:p>
+        </p:txBody>
+      </p:sp>
+      <p:sp>
+        <p:nvSpPr>
+          <p:cNvPr id="46" name="Rectangle 45"/>
+          <p:cNvSpPr/>
+          <p:nvPr/>
+        </p:nvSpPr>
+        <p:spPr>
+          <a:xfrm flipH="1">
+            <a:off x="7911255" y="4253573"/>
+            <a:ext cx="2995659" cy="704078"/>
+          </a:xfrm>
+          <a:prstGeom prst="rect">
+            <a:avLst/>
+          </a:prstGeom>
+          <a:solidFill>
+            <a:schemeClr val="bg2"/>
+          </a:solidFill>
+          <a:ln>
+            <a:noFill/>
+          </a:ln>
+        </p:spPr>
+        <p:style>
+          <a:lnRef idx="2">
+            <a:schemeClr val="accent1">
+              <a:shade val="50000"/>
+            </a:schemeClr>
+          </a:lnRef>
+          <a:fillRef idx="1">
+            <a:schemeClr val="accent1"/>
+          </a:fillRef>
+          <a:effectRef idx="0">
+            <a:schemeClr val="accent1"/>
+          </a:effectRef>
+          <a:fontRef idx="minor">
+            <a:schemeClr val="lt1"/>
+          </a:fontRef>
+        </p:style>
+        <p:txBody>
+          <a:bodyPr rtlCol="0" anchor="ctr"/>
+          <a:lstStyle/>
+          <a:p>
+            <a:pPr lvl="0" algn="ctr">
+              <a:lnSpc>
+                <a:spcPct val="90000"/>
+              </a:lnSpc>
+            </a:pPr>
+            <a:r>
+              <a:rPr lang="en-US" sz="3600" b="1" dirty="0">
+                <a:gradFill>
+                  <a:gsLst>
+                    <a:gs pos="0">
+                      <a:srgbClr val="75D1FF">
+                        <a:lumMod val="5000"/>
+                        <a:lumOff val="95000"/>
+                      </a:srgbClr>
+                    </a:gs>
+                    <a:gs pos="100000">
+                      <a:srgbClr val="FFFFFF"/>
+                    </a:gs>
+                  </a:gsLst>
+                  <a:lin ang="5400000" scaled="1"/>
+                </a:gradFill>
+              </a:rPr>
+              <a:t>tips</a:t>
+            </a:r>
+            <a:r>
+              <a:rPr lang="en-US" sz="3600" b="1" spc="-100" dirty="0">
+                <a:gradFill>
+                  <a:gsLst>
+                    <a:gs pos="0">
+                      <a:srgbClr val="75D1FF">
+                        <a:lumMod val="5000"/>
+                        <a:lumOff val="95000"/>
+                      </a:srgbClr>
+                    </a:gs>
+                    <a:gs pos="100000">
+                      <a:srgbClr val="FFFFFF"/>
+                    </a:gs>
+                  </a:gsLst>
+                  <a:lin ang="5400000" scaled="1"/>
+                </a:gradFill>
+              </a:rPr>
+              <a:t> </a:t>
+            </a:r>
+            <a:r>
+              <a:rPr lang="en-US" sz="3600" b="1" dirty="0">
+                <a:gradFill>
+                  <a:gsLst>
+                    <a:gs pos="0">
+                      <a:srgbClr val="75D1FF">
+                        <a:lumMod val="5000"/>
+                        <a:lumOff val="95000"/>
+                      </a:srgbClr>
+                    </a:gs>
+                    <a:gs pos="100000">
+                      <a:srgbClr val="FFFFFF"/>
+                    </a:gs>
+                  </a:gsLst>
+                  <a:lin ang="5400000" scaled="1"/>
+                </a:gradFill>
+              </a:rPr>
+              <a:t>&amp; tricks</a:t>
+            </a:r>
+          </a:p>
+        </p:txBody>
+      </p:sp>
+      <p:sp>
+        <p:nvSpPr>
+          <p:cNvPr id="9" name="Title 6"/>
+          <p:cNvSpPr txBox="1"/>
+          <p:nvPr/>
+        </p:nvSpPr>
+        <p:spPr>
+          <a:xfrm>
+            <a:off x="1679957" y="3280601"/>
+            <a:ext cx="5909265" cy="874205"/>
+          </a:xfrm>
+          <a:prstGeom prst="rect">
+            <a:avLst/>
+          </a:prstGeom>
+        </p:spPr>
+        <p:txBody>
+          <a:bodyPr vert="horz" lIns="91440" tIns="0" rIns="91440" bIns="0" rtlCol="0" anchor="ctr">
+            <a:noAutofit/>
+          </a:bodyPr>
+          <a:lstStyle>
+            <a:lvl1pPr algn="ctr" defTabSz="914400" rtl="0" eaLnBrk="1" latinLnBrk="0" hangingPunct="1">
+              <a:lnSpc>
+                <a:spcPct val="90000"/>
+              </a:lnSpc>
+              <a:spcBef>
+                <a:spcPct val="0"/>
+              </a:spcBef>
+              <a:buNone/>
+              <a:defRPr lang="en-US" sz="3200" b="1" i="0" kern="1200" spc="300" dirty="0">
+                <a:solidFill>
+                  <a:schemeClr val="tx1">
+                    <a:lumMod val="85000"/>
+                    <a:lumOff val="15000"/>
+                  </a:schemeClr>
+                </a:solidFill>
+                <a:latin typeface="+mj-lt"/>
+                <a:ea typeface="+mn-ea"/>
+                <a:cs typeface="Segoe UI Semilight" panose="020B0402040204020203" pitchFamily="34" charset="0"/>
+              </a:defRPr>
+            </a:lvl1pPr>
+          </a:lstStyle>
+          <a:p>
+            <a:endParaRPr lang="en-US" sz="8800" spc="-300" dirty="0">
+              <a:gradFill>
+                <a:gsLst>
+                  <a:gs pos="0">
+                    <a:schemeClr val="accent1">
+                      <a:lumMod val="5000"/>
+                      <a:lumOff val="95000"/>
+                    </a:schemeClr>
+                  </a:gs>
+                  <a:gs pos="100000">
+                    <a:schemeClr val="bg1"/>
+                  </a:gs>
+                </a:gsLst>
+                <a:lin ang="5400000" scaled="1"/>
+              </a:gradFill>
+              <a:latin typeface="+mn-lt"/>
+            </a:endParaRPr>
+          </a:p>
+        </p:txBody>
+      </p:sp>
+      <p:sp>
+        <p:nvSpPr>
+          <p:cNvPr id="7" name="Title 6"/>
+          <p:cNvSpPr>
+            <a:spLocks noGrp="1"/>
+          </p:cNvSpPr>
+          <p:nvPr>
+            <p:ph type="ctrTitle"/>
+          </p:nvPr>
+        </p:nvSpPr>
+        <p:spPr>
+          <a:xfrm>
+            <a:off x="687847" y="2461199"/>
+            <a:ext cx="8804365" cy="1586230"/>
+          </a:xfrm>
+        </p:spPr>
+        <p:txBody>
+          <a:bodyPr/>
+          <a:lstStyle/>
+          <a:p>
+            <a:r>
+              <a:rPr lang="en-US" sz="5400" dirty="0"/>
+              <a:t>How to input data in Excel using “form”</a:t>
+            </a:r>
+          </a:p>
+        </p:txBody>
+      </p:sp>
+      <p:sp>
+        <p:nvSpPr>
+          <p:cNvPr id="19" name="Freeform: Shape 18"/>
+          <p:cNvSpPr/>
+          <p:nvPr/>
+        </p:nvSpPr>
+        <p:spPr>
+          <a:xfrm>
+            <a:off x="7066536" y="4361548"/>
+            <a:ext cx="488128" cy="488128"/>
+          </a:xfrm>
+          <a:custGeom>
+            <a:avLst/>
+            <a:gdLst>
+              <a:gd name="connsiteX0" fmla="*/ 244064 w 488128"/>
+              <a:gd name="connsiteY0" fmla="*/ 0 h 488128"/>
+              <a:gd name="connsiteX1" fmla="*/ 488128 w 488128"/>
+              <a:gd name="connsiteY1" fmla="*/ 244064 h 488128"/>
+              <a:gd name="connsiteX2" fmla="*/ 244064 w 488128"/>
+              <a:gd name="connsiteY2" fmla="*/ 488128 h 488128"/>
+              <a:gd name="connsiteX3" fmla="*/ 0 w 488128"/>
+              <a:gd name="connsiteY3" fmla="*/ 244064 h 488128"/>
+              <a:gd name="connsiteX4" fmla="*/ 244064 w 488128"/>
+              <a:gd name="connsiteY4" fmla="*/ 0 h 488128"/>
+            </a:gdLst>
+            <a:ahLst/>
+            <a:cxnLst>
+              <a:cxn ang="0">
+                <a:pos x="connsiteX0" y="connsiteY0"/>
+              </a:cxn>
+              <a:cxn ang="0">
+                <a:pos x="connsiteX1" y="connsiteY1"/>
+              </a:cxn>
+              <a:cxn ang="0">
+                <a:pos x="connsiteX2" y="connsiteY2"/>
+              </a:cxn>
+              <a:cxn ang="0">
+                <a:pos x="connsiteX3" y="connsiteY3"/>
+              </a:cxn>
+              <a:cxn ang="0">
+                <a:pos x="connsiteX4" y="connsiteY4"/>
+              </a:cxn>
+            </a:cxnLst>
+            <a:rect l="l" t="t" r="r" b="b"/>
+            <a:pathLst>
+              <a:path w="488128" h="488128">
+                <a:moveTo>
+                  <a:pt x="244064" y="0"/>
+                </a:moveTo>
+                <a:cubicBezTo>
+                  <a:pt x="378857" y="0"/>
+                  <a:pt x="488128" y="109271"/>
+                  <a:pt x="488128" y="244064"/>
+                </a:cubicBezTo>
+                <a:cubicBezTo>
+                  <a:pt x="488128" y="378857"/>
+                  <a:pt x="378857" y="488128"/>
+                  <a:pt x="244064" y="488128"/>
+                </a:cubicBezTo>
+                <a:cubicBezTo>
+                  <a:pt x="109271" y="488128"/>
+                  <a:pt x="0" y="378857"/>
+                  <a:pt x="0" y="244064"/>
+                </a:cubicBezTo>
+                <a:cubicBezTo>
+                  <a:pt x="0" y="109271"/>
+                  <a:pt x="109271" y="0"/>
+                  <a:pt x="244064" y="0"/>
+                </a:cubicBezTo>
+                <a:close/>
+              </a:path>
+            </a:pathLst>
+          </a:custGeom>
+          <a:solidFill>
+            <a:schemeClr val="accent4"/>
+          </a:solidFill>
+          <a:ln>
+            <a:noFill/>
+          </a:ln>
+        </p:spPr>
+        <p:style>
+          <a:lnRef idx="2">
+            <a:schemeClr val="accent1">
+              <a:shade val="50000"/>
+            </a:schemeClr>
+          </a:lnRef>
+          <a:fillRef idx="1">
+            <a:schemeClr val="accent1"/>
+          </a:fillRef>
+          <a:effectRef idx="0">
+            <a:schemeClr val="accent1"/>
+          </a:effectRef>
+          <a:fontRef idx="minor">
+            <a:schemeClr val="lt1"/>
+          </a:fontRef>
+        </p:style>
+        <p:txBody>
+          <a:bodyPr wrap="square" rtlCol="0" anchor="ctr">
+            <a:noAutofit/>
+          </a:bodyPr>
+          <a:lstStyle/>
+          <a:p>
+            <a:pPr marL="0" marR="0" lvl="0" indent="0" algn="ctr" defTabSz="914400" eaLnBrk="1" fontAlgn="auto" latinLnBrk="0" hangingPunct="1">
+              <a:lnSpc>
+                <a:spcPct val="100000"/>
+              </a:lnSpc>
+              <a:spcBef>
+                <a:spcPts val="0"/>
+              </a:spcBef>
+              <a:spcAft>
+                <a:spcPts val="0"/>
+              </a:spcAft>
+              <a:buClrTx/>
+              <a:buSzTx/>
+              <a:buFontTx/>
+              <a:buNone/>
+              <a:defRPr/>
+            </a:pPr>
+            <a:endParaRPr kumimoji="0" lang="en-US" sz="1800" b="0" i="0" u="none" strike="noStrike" kern="0" cap="none" spc="0" normalizeH="0" baseline="0" dirty="0">
+              <a:ln>
+                <a:noFill/>
+              </a:ln>
+              <a:solidFill>
+                <a:sysClr val="windowText" lastClr="000000"/>
+              </a:solidFill>
+              <a:effectLst/>
+              <a:uLnTx/>
+              <a:uFillTx/>
+            </a:endParaRPr>
+          </a:p>
+        </p:txBody>
+      </p:sp>
+      <p:sp>
+        <p:nvSpPr>
+          <p:cNvPr id="3" name="Slide Number Placeholder 2"/>
+          <p:cNvSpPr>
+            <a:spLocks noGrp="1"/>
+          </p:cNvSpPr>
+          <p:nvPr>
+            <p:ph type="sldNum" sz="quarter" idx="12"/>
+          </p:nvPr>
+        </p:nvSpPr>
+        <p:spPr/>
+        <p:txBody>
+          <a:bodyPr/>
+          <a:lstStyle/>
+          <a:p>
+            <a:fld id="{5AE1514C-5E56-4738-A1FF-4B1CFD2A3E36}" type="slidenum">
+              <a:rPr lang="en-US" smtClean="0"/>
+              <a:t>4</a:t>
+            </a:fld>
+            <a:endParaRPr lang="en-US" dirty="0"/>
+          </a:p>
+        </p:txBody>
+      </p:sp>
+      <p:pic>
+        <p:nvPicPr>
+          <p:cNvPr id="2" name="图片 1"/>
+          <p:cNvPicPr>
+            <a:picLocks noChangeAspect="1"/>
+          </p:cNvPicPr>
+          <p:nvPr>
+            <p:custDataLst>
+              <p:tags r:id="rId1"/>
+            </p:custDataLst>
+          </p:nvPr>
+        </p:nvPicPr>
+        <p:blipFill>
+          <a:blip r:embed="rId5"/>
+          <a:stretch>
+            <a:fillRect/>
+          </a:stretch>
+        </p:blipFill>
+        <p:spPr>
+          <a:xfrm>
+            <a:off x="8068235" y="428625"/>
+            <a:ext cx="3171900" cy="2579171"/>
+          </a:xfrm>
+          <a:prstGeom prst="rect">
+            <a:avLst/>
+          </a:prstGeom>
+          <a:ln>
+            <a:noFill/>
+          </a:ln>
+          <a:effectLst>
+            <a:softEdge rad="112500"/>
+          </a:effectLst>
+        </p:spPr>
+      </p:pic>
+    </p:spTree>
+  </p:cSld>
+  <p:clrMapOvr>
+    <a:masterClrMapping/>
+  </p:clrMapOvr>
+  <mc:AlternateContent xmlns:mc="http://schemas.openxmlformats.org/markup-compatibility/2006" xmlns:p14="http://schemas.microsoft.com/office/powerpoint/2010/main">
+    <mc:Choice Requires="p14">
+      <p:transition spd="med" p14:dur="700">
+        <p:fade/>
+      </p:transition>
+    </mc:Choice>
+    <mc:Fallback xmlns="">
+      <p:transition spd="med">
+        <p:fade/>
+      </p:transition>
+    </mc:Fallback>
+  </mc:AlternateContent>
+  <p:timing>
+    <p:tnLst>
+      <p:par>
+        <p:cTn id="1" dur="indefinite" restart="never" nodeType="tmRoot">
+          <p:childTnLst>
+            <p:seq concurrent="1" nextAc="seek">
+              <p:cTn id="2" dur="indefinite" nodeType="mainSeq">
+                <p:childTnLst>
+                  <p:par>
+                    <p:cTn id="3" fill="hold">
+                      <p:stCondLst>
+                        <p:cond delay="indefinite"/>
+                        <p:cond evt="onBegin" delay="0">
+                          <p:tn val="2"/>
+                        </p:cond>
+                      </p:stCondLst>
+                      <p:childTnLst>
+                        <p:par>
+                          <p:cTn id="4" fill="hold">
+                            <p:stCondLst>
+                              <p:cond delay="0"/>
+                            </p:stCondLst>
+                            <p:childTnLst>
+                              <p:par>
+                                <p:cTn id="5" presetID="53" presetClass="entr" presetSubtype="16" fill="hold" grpId="0" nodeType="withEffect">
+                                  <p:stCondLst>
+                                    <p:cond delay="0"/>
+                                  </p:stCondLst>
+                                  <p:childTnLst>
+                                    <p:set>
+                                      <p:cBhvr>
+                                        <p:cTn id="6" dur="1" fill="hold">
+                                          <p:stCondLst>
+                                            <p:cond delay="0"/>
+                                          </p:stCondLst>
+                                        </p:cTn>
+                                        <p:tgtEl>
+                                          <p:spTgt spid="14"/>
+                                        </p:tgtEl>
+                                        <p:attrNameLst>
+                                          <p:attrName>style.visibility</p:attrName>
+                                        </p:attrNameLst>
+                                      </p:cBhvr>
+                                      <p:to>
+                                        <p:strVal val="visible"/>
+                                      </p:to>
+                                    </p:set>
+                                    <p:anim calcmode="lin" valueType="num">
+                                      <p:cBhvr>
+                                        <p:cTn id="7" dur="500" fill="hold"/>
+                                        <p:tgtEl>
+                                          <p:spTgt spid="14"/>
+                                        </p:tgtEl>
+                                        <p:attrNameLst>
+                                          <p:attrName>ppt_w</p:attrName>
+                                        </p:attrNameLst>
+                                      </p:cBhvr>
+                                      <p:tavLst>
+                                        <p:tav tm="0">
+                                          <p:val>
+                                            <p:fltVal val="0"/>
+                                          </p:val>
+                                        </p:tav>
+                                        <p:tav tm="100000">
+                                          <p:val>
+                                            <p:strVal val="#ppt_w"/>
+                                          </p:val>
+                                        </p:tav>
+                                      </p:tavLst>
+                                    </p:anim>
+                                    <p:anim calcmode="lin" valueType="num">
+                                      <p:cBhvr>
+                                        <p:cTn id="8" dur="500" fill="hold"/>
+                                        <p:tgtEl>
+                                          <p:spTgt spid="14"/>
+                                        </p:tgtEl>
+                                        <p:attrNameLst>
+                                          <p:attrName>ppt_h</p:attrName>
+                                        </p:attrNameLst>
+                                      </p:cBhvr>
+                                      <p:tavLst>
+                                        <p:tav tm="0">
+                                          <p:val>
+                                            <p:fltVal val="0"/>
+                                          </p:val>
+                                        </p:tav>
+                                        <p:tav tm="100000">
+                                          <p:val>
+                                            <p:strVal val="#ppt_h"/>
+                                          </p:val>
+                                        </p:tav>
+                                      </p:tavLst>
+                                    </p:anim>
+                                    <p:animEffect transition="in" filter="fade">
+                                      <p:cBhvr>
+                                        <p:cTn id="9" dur="500"/>
+                                        <p:tgtEl>
+                                          <p:spTgt spid="14"/>
+                                        </p:tgtEl>
+                                      </p:cBhvr>
+                                    </p:animEffect>
+                                  </p:childTnLst>
+                                </p:cTn>
+                              </p:par>
+                              <p:par>
+                                <p:cTn id="10" presetID="10" presetClass="exit" presetSubtype="0" fill="hold" grpId="1" nodeType="withEffect">
+                                  <p:stCondLst>
+                                    <p:cond delay="250"/>
+                                  </p:stCondLst>
+                                  <p:childTnLst>
+                                    <p:animEffect transition="out" filter="fade">
+                                      <p:cBhvr>
+                                        <p:cTn id="11" dur="500"/>
+                                        <p:tgtEl>
+                                          <p:spTgt spid="14"/>
+                                        </p:tgtEl>
+                                      </p:cBhvr>
+                                    </p:animEffect>
+                                    <p:set>
+                                      <p:cBhvr>
+                                        <p:cTn id="12" dur="1" fill="hold">
+                                          <p:stCondLst>
+                                            <p:cond delay="499"/>
+                                          </p:stCondLst>
+                                        </p:cTn>
+                                        <p:tgtEl>
+                                          <p:spTgt spid="14"/>
+                                        </p:tgtEl>
+                                        <p:attrNameLst>
+                                          <p:attrName>style.visibility</p:attrName>
+                                        </p:attrNameLst>
+                                      </p:cBhvr>
+                                      <p:to>
+                                        <p:strVal val="hidden"/>
+                                      </p:to>
+                                    </p:set>
+                                  </p:childTnLst>
+                                </p:cTn>
+                              </p:par>
+                              <p:par>
+                                <p:cTn id="13" presetID="53" presetClass="entr" presetSubtype="16" fill="hold" grpId="0" nodeType="withEffect">
+                                  <p:stCondLst>
+                                    <p:cond delay="250"/>
+                                  </p:stCondLst>
+                                  <p:childTnLst>
+                                    <p:set>
+                                      <p:cBhvr>
+                                        <p:cTn id="14" dur="1" fill="hold">
+                                          <p:stCondLst>
+                                            <p:cond delay="0"/>
+                                          </p:stCondLst>
+                                        </p:cTn>
+                                        <p:tgtEl>
+                                          <p:spTgt spid="15"/>
+                                        </p:tgtEl>
+                                        <p:attrNameLst>
+                                          <p:attrName>style.visibility</p:attrName>
+                                        </p:attrNameLst>
+                                      </p:cBhvr>
+                                      <p:to>
+                                        <p:strVal val="visible"/>
+                                      </p:to>
+                                    </p:set>
+                                    <p:anim calcmode="lin" valueType="num">
+                                      <p:cBhvr>
+                                        <p:cTn id="15" dur="500" fill="hold"/>
+                                        <p:tgtEl>
+                                          <p:spTgt spid="15"/>
+                                        </p:tgtEl>
+                                        <p:attrNameLst>
+                                          <p:attrName>ppt_w</p:attrName>
+                                        </p:attrNameLst>
+                                      </p:cBhvr>
+                                      <p:tavLst>
+                                        <p:tav tm="0">
+                                          <p:val>
+                                            <p:fltVal val="0"/>
+                                          </p:val>
+                                        </p:tav>
+                                        <p:tav tm="100000">
+                                          <p:val>
+                                            <p:strVal val="#ppt_w"/>
+                                          </p:val>
+                                        </p:tav>
+                                      </p:tavLst>
+                                    </p:anim>
+                                    <p:anim calcmode="lin" valueType="num">
+                                      <p:cBhvr>
+                                        <p:cTn id="16" dur="500" fill="hold"/>
+                                        <p:tgtEl>
+                                          <p:spTgt spid="15"/>
+                                        </p:tgtEl>
+                                        <p:attrNameLst>
+                                          <p:attrName>ppt_h</p:attrName>
+                                        </p:attrNameLst>
+                                      </p:cBhvr>
+                                      <p:tavLst>
+                                        <p:tav tm="0">
+                                          <p:val>
+                                            <p:fltVal val="0"/>
+                                          </p:val>
+                                        </p:tav>
+                                        <p:tav tm="100000">
+                                          <p:val>
+                                            <p:strVal val="#ppt_h"/>
+                                          </p:val>
+                                        </p:tav>
+                                      </p:tavLst>
+                                    </p:anim>
+                                    <p:animEffect transition="in" filter="fade">
+                                      <p:cBhvr>
+                                        <p:cTn id="17" dur="500"/>
+                                        <p:tgtEl>
+                                          <p:spTgt spid="15"/>
+                                        </p:tgtEl>
+                                      </p:cBhvr>
+                                    </p:animEffect>
+                                  </p:childTnLst>
+                                </p:cTn>
+                              </p:par>
+                              <p:par>
+                                <p:cTn id="18" presetID="10" presetClass="exit" presetSubtype="0" fill="hold" grpId="1" nodeType="withEffect">
+                                  <p:stCondLst>
+                                    <p:cond delay="500"/>
+                                  </p:stCondLst>
+                                  <p:childTnLst>
+                                    <p:animEffect transition="out" filter="fade">
+                                      <p:cBhvr>
+                                        <p:cTn id="19" dur="500"/>
+                                        <p:tgtEl>
+                                          <p:spTgt spid="15"/>
+                                        </p:tgtEl>
+                                      </p:cBhvr>
+                                    </p:animEffect>
+                                    <p:set>
+                                      <p:cBhvr>
+                                        <p:cTn id="20" dur="1" fill="hold">
+                                          <p:stCondLst>
+                                            <p:cond delay="499"/>
+                                          </p:stCondLst>
+                                        </p:cTn>
+                                        <p:tgtEl>
+                                          <p:spTgt spid="15"/>
+                                        </p:tgtEl>
+                                        <p:attrNameLst>
+                                          <p:attrName>style.visibility</p:attrName>
+                                        </p:attrNameLst>
+                                      </p:cBhvr>
+                                      <p:to>
+                                        <p:strVal val="hidden"/>
+                                      </p:to>
+                                    </p:set>
+                                  </p:childTnLst>
+                                </p:cTn>
+                              </p:par>
+                              <p:par>
+                                <p:cTn id="21" presetID="53" presetClass="entr" presetSubtype="16" fill="hold" grpId="0" nodeType="withEffect">
+                                  <p:stCondLst>
+                                    <p:cond delay="500"/>
+                                  </p:stCondLst>
+                                  <p:childTnLst>
+                                    <p:set>
+                                      <p:cBhvr>
+                                        <p:cTn id="22" dur="1" fill="hold">
+                                          <p:stCondLst>
+                                            <p:cond delay="0"/>
+                                          </p:stCondLst>
+                                        </p:cTn>
+                                        <p:tgtEl>
+                                          <p:spTgt spid="16"/>
+                                        </p:tgtEl>
+                                        <p:attrNameLst>
+                                          <p:attrName>style.visibility</p:attrName>
+                                        </p:attrNameLst>
+                                      </p:cBhvr>
+                                      <p:to>
+                                        <p:strVal val="visible"/>
+                                      </p:to>
+                                    </p:set>
+                                    <p:anim calcmode="lin" valueType="num">
+                                      <p:cBhvr>
+                                        <p:cTn id="23" dur="500" fill="hold"/>
+                                        <p:tgtEl>
+                                          <p:spTgt spid="16"/>
+                                        </p:tgtEl>
+                                        <p:attrNameLst>
+                                          <p:attrName>ppt_w</p:attrName>
+                                        </p:attrNameLst>
+                                      </p:cBhvr>
+                                      <p:tavLst>
+                                        <p:tav tm="0">
+                                          <p:val>
+                                            <p:fltVal val="0"/>
+                                          </p:val>
+                                        </p:tav>
+                                        <p:tav tm="100000">
+                                          <p:val>
+                                            <p:strVal val="#ppt_w"/>
+                                          </p:val>
+                                        </p:tav>
+                                      </p:tavLst>
+                                    </p:anim>
+                                    <p:anim calcmode="lin" valueType="num">
+                                      <p:cBhvr>
+                                        <p:cTn id="24" dur="500" fill="hold"/>
+                                        <p:tgtEl>
+                                          <p:spTgt spid="16"/>
+                                        </p:tgtEl>
+                                        <p:attrNameLst>
+                                          <p:attrName>ppt_h</p:attrName>
+                                        </p:attrNameLst>
+                                      </p:cBhvr>
+                                      <p:tavLst>
+                                        <p:tav tm="0">
+                                          <p:val>
+                                            <p:fltVal val="0"/>
+                                          </p:val>
+                                        </p:tav>
+                                        <p:tav tm="100000">
+                                          <p:val>
+                                            <p:strVal val="#ppt_h"/>
+                                          </p:val>
+                                        </p:tav>
+                                      </p:tavLst>
+                                    </p:anim>
+                                    <p:animEffect transition="in" filter="fade">
+                                      <p:cBhvr>
+                                        <p:cTn id="25" dur="500"/>
+                                        <p:tgtEl>
+                                          <p:spTgt spid="16"/>
+                                        </p:tgtEl>
+                                      </p:cBhvr>
+                                    </p:animEffect>
+                                  </p:childTnLst>
+                                </p:cTn>
+                              </p:par>
+                              <p:par>
+                                <p:cTn id="26" presetID="10" presetClass="exit" presetSubtype="0" fill="hold" grpId="1" nodeType="withEffect">
+                                  <p:stCondLst>
+                                    <p:cond delay="750"/>
+                                  </p:stCondLst>
+                                  <p:childTnLst>
+                                    <p:animEffect transition="out" filter="fade">
+                                      <p:cBhvr>
+                                        <p:cTn id="27" dur="500"/>
+                                        <p:tgtEl>
+                                          <p:spTgt spid="16"/>
+                                        </p:tgtEl>
+                                      </p:cBhvr>
+                                    </p:animEffect>
+                                    <p:set>
+                                      <p:cBhvr>
+                                        <p:cTn id="28" dur="1" fill="hold">
+                                          <p:stCondLst>
+                                            <p:cond delay="499"/>
+                                          </p:stCondLst>
+                                        </p:cTn>
+                                        <p:tgtEl>
+                                          <p:spTgt spid="16"/>
+                                        </p:tgtEl>
+                                        <p:attrNameLst>
+                                          <p:attrName>style.visibility</p:attrName>
+                                        </p:attrNameLst>
+                                      </p:cBhvr>
+                                      <p:to>
+                                        <p:strVal val="hidden"/>
+                                      </p:to>
+                                    </p:set>
+                                  </p:childTnLst>
+                                </p:cTn>
+                              </p:par>
+                              <p:par>
+                                <p:cTn id="29" presetID="53" presetClass="entr" presetSubtype="16" fill="hold" grpId="0" nodeType="withEffect">
+                                  <p:stCondLst>
+                                    <p:cond delay="0"/>
+                                  </p:stCondLst>
+                                  <p:childTnLst>
+                                    <p:set>
+                                      <p:cBhvr>
+                                        <p:cTn id="30" dur="1" fill="hold">
+                                          <p:stCondLst>
+                                            <p:cond delay="0"/>
+                                          </p:stCondLst>
+                                        </p:cTn>
+                                        <p:tgtEl>
+                                          <p:spTgt spid="10"/>
+                                        </p:tgtEl>
+                                        <p:attrNameLst>
+                                          <p:attrName>style.visibility</p:attrName>
+                                        </p:attrNameLst>
+                                      </p:cBhvr>
+                                      <p:to>
+                                        <p:strVal val="visible"/>
+                                      </p:to>
+                                    </p:set>
+                                    <p:anim calcmode="lin" valueType="num">
+                                      <p:cBhvr>
+                                        <p:cTn id="31" dur="500" fill="hold"/>
+                                        <p:tgtEl>
+                                          <p:spTgt spid="10"/>
+                                        </p:tgtEl>
+                                        <p:attrNameLst>
+                                          <p:attrName>ppt_w</p:attrName>
+                                        </p:attrNameLst>
+                                      </p:cBhvr>
+                                      <p:tavLst>
+                                        <p:tav tm="0">
+                                          <p:val>
+                                            <p:fltVal val="0"/>
+                                          </p:val>
+                                        </p:tav>
+                                        <p:tav tm="100000">
+                                          <p:val>
+                                            <p:strVal val="#ppt_w"/>
+                                          </p:val>
+                                        </p:tav>
+                                      </p:tavLst>
+                                    </p:anim>
+                                    <p:anim calcmode="lin" valueType="num">
+                                      <p:cBhvr>
+                                        <p:cTn id="32" dur="500" fill="hold"/>
+                                        <p:tgtEl>
+                                          <p:spTgt spid="10"/>
+                                        </p:tgtEl>
+                                        <p:attrNameLst>
+                                          <p:attrName>ppt_h</p:attrName>
+                                        </p:attrNameLst>
+                                      </p:cBhvr>
+                                      <p:tavLst>
+                                        <p:tav tm="0">
+                                          <p:val>
+                                            <p:fltVal val="0"/>
+                                          </p:val>
+                                        </p:tav>
+                                        <p:tav tm="100000">
+                                          <p:val>
+                                            <p:strVal val="#ppt_h"/>
+                                          </p:val>
+                                        </p:tav>
+                                      </p:tavLst>
+                                    </p:anim>
+                                    <p:animEffect transition="in" filter="fade">
+                                      <p:cBhvr>
+                                        <p:cTn id="33" dur="500"/>
+                                        <p:tgtEl>
+                                          <p:spTgt spid="10"/>
+                                        </p:tgtEl>
+                                      </p:cBhvr>
+                                    </p:animEffect>
+                                  </p:childTnLst>
+                                </p:cTn>
+                              </p:par>
+                              <p:par>
+                                <p:cTn id="34" presetID="10" presetClass="exit" presetSubtype="0" fill="hold" grpId="1" nodeType="withEffect">
+                                  <p:stCondLst>
+                                    <p:cond delay="250"/>
+                                  </p:stCondLst>
+                                  <p:childTnLst>
+                                    <p:animEffect transition="out" filter="fade">
+                                      <p:cBhvr>
+                                        <p:cTn id="35" dur="500"/>
+                                        <p:tgtEl>
+                                          <p:spTgt spid="10"/>
+                                        </p:tgtEl>
+                                      </p:cBhvr>
+                                    </p:animEffect>
+                                    <p:set>
+                                      <p:cBhvr>
+                                        <p:cTn id="36" dur="1" fill="hold">
+                                          <p:stCondLst>
+                                            <p:cond delay="499"/>
+                                          </p:stCondLst>
+                                        </p:cTn>
+                                        <p:tgtEl>
+                                          <p:spTgt spid="10"/>
+                                        </p:tgtEl>
+                                        <p:attrNameLst>
+                                          <p:attrName>style.visibility</p:attrName>
+                                        </p:attrNameLst>
+                                      </p:cBhvr>
+                                      <p:to>
+                                        <p:strVal val="hidden"/>
+                                      </p:to>
+                                    </p:set>
+                                  </p:childTnLst>
+                                </p:cTn>
+                              </p:par>
+                              <p:par>
+                                <p:cTn id="37" presetID="53" presetClass="entr" presetSubtype="16" fill="hold" grpId="0" nodeType="withEffect">
+                                  <p:stCondLst>
+                                    <p:cond delay="250"/>
+                                  </p:stCondLst>
+                                  <p:childTnLst>
+                                    <p:set>
+                                      <p:cBhvr>
+                                        <p:cTn id="38" dur="1" fill="hold">
+                                          <p:stCondLst>
+                                            <p:cond delay="0"/>
+                                          </p:stCondLst>
+                                        </p:cTn>
+                                        <p:tgtEl>
+                                          <p:spTgt spid="11"/>
+                                        </p:tgtEl>
+                                        <p:attrNameLst>
+                                          <p:attrName>style.visibility</p:attrName>
+                                        </p:attrNameLst>
+                                      </p:cBhvr>
+                                      <p:to>
+                                        <p:strVal val="visible"/>
+                                      </p:to>
+                                    </p:set>
+                                    <p:anim calcmode="lin" valueType="num">
+                                      <p:cBhvr>
+                                        <p:cTn id="39" dur="500" fill="hold"/>
+                                        <p:tgtEl>
+                                          <p:spTgt spid="11"/>
+                                        </p:tgtEl>
+                                        <p:attrNameLst>
+                                          <p:attrName>ppt_w</p:attrName>
+                                        </p:attrNameLst>
+                                      </p:cBhvr>
+                                      <p:tavLst>
+                                        <p:tav tm="0">
+                                          <p:val>
+                                            <p:fltVal val="0"/>
+                                          </p:val>
+                                        </p:tav>
+                                        <p:tav tm="100000">
+                                          <p:val>
+                                            <p:strVal val="#ppt_w"/>
+                                          </p:val>
+                                        </p:tav>
+                                      </p:tavLst>
+                                    </p:anim>
+                                    <p:anim calcmode="lin" valueType="num">
+                                      <p:cBhvr>
+                                        <p:cTn id="40" dur="500" fill="hold"/>
+                                        <p:tgtEl>
+                                          <p:spTgt spid="11"/>
+                                        </p:tgtEl>
+                                        <p:attrNameLst>
+                                          <p:attrName>ppt_h</p:attrName>
+                                        </p:attrNameLst>
+                                      </p:cBhvr>
+                                      <p:tavLst>
+                                        <p:tav tm="0">
+                                          <p:val>
+                                            <p:fltVal val="0"/>
+                                          </p:val>
+                                        </p:tav>
+                                        <p:tav tm="100000">
+                                          <p:val>
+                                            <p:strVal val="#ppt_h"/>
+                                          </p:val>
+                                        </p:tav>
+                                      </p:tavLst>
+                                    </p:anim>
+                                    <p:animEffect transition="in" filter="fade">
+                                      <p:cBhvr>
+                                        <p:cTn id="41" dur="500"/>
+                                        <p:tgtEl>
+                                          <p:spTgt spid="11"/>
+                                        </p:tgtEl>
+                                      </p:cBhvr>
+                                    </p:animEffect>
+                                  </p:childTnLst>
+                                </p:cTn>
+                              </p:par>
+                              <p:par>
+                                <p:cTn id="42" presetID="10" presetClass="exit" presetSubtype="0" fill="hold" grpId="1" nodeType="withEffect">
+                                  <p:stCondLst>
+                                    <p:cond delay="500"/>
+                                  </p:stCondLst>
+                                  <p:childTnLst>
+                                    <p:animEffect transition="out" filter="fade">
+                                      <p:cBhvr>
+                                        <p:cTn id="43" dur="500"/>
+                                        <p:tgtEl>
+                                          <p:spTgt spid="11"/>
+                                        </p:tgtEl>
+                                      </p:cBhvr>
+                                    </p:animEffect>
+                                    <p:set>
+                                      <p:cBhvr>
+                                        <p:cTn id="44" dur="1" fill="hold">
+                                          <p:stCondLst>
+                                            <p:cond delay="499"/>
+                                          </p:stCondLst>
+                                        </p:cTn>
+                                        <p:tgtEl>
+                                          <p:spTgt spid="11"/>
+                                        </p:tgtEl>
+                                        <p:attrNameLst>
+                                          <p:attrName>style.visibility</p:attrName>
+                                        </p:attrNameLst>
+                                      </p:cBhvr>
+                                      <p:to>
+                                        <p:strVal val="hidden"/>
+                                      </p:to>
+                                    </p:set>
+                                  </p:childTnLst>
+                                </p:cTn>
+                              </p:par>
+                              <p:par>
+                                <p:cTn id="45" presetID="53" presetClass="entr" presetSubtype="16" fill="hold" grpId="0" nodeType="withEffect">
+                                  <p:stCondLst>
+                                    <p:cond delay="500"/>
+                                  </p:stCondLst>
+                                  <p:childTnLst>
+                                    <p:set>
+                                      <p:cBhvr>
+                                        <p:cTn id="46" dur="1" fill="hold">
+                                          <p:stCondLst>
+                                            <p:cond delay="0"/>
+                                          </p:stCondLst>
+                                        </p:cTn>
+                                        <p:tgtEl>
+                                          <p:spTgt spid="12"/>
+                                        </p:tgtEl>
+                                        <p:attrNameLst>
+                                          <p:attrName>style.visibility</p:attrName>
+                                        </p:attrNameLst>
+                                      </p:cBhvr>
+                                      <p:to>
+                                        <p:strVal val="visible"/>
+                                      </p:to>
+                                    </p:set>
+                                    <p:anim calcmode="lin" valueType="num">
+                                      <p:cBhvr>
+                                        <p:cTn id="47" dur="500" fill="hold"/>
+                                        <p:tgtEl>
+                                          <p:spTgt spid="12"/>
+                                        </p:tgtEl>
+                                        <p:attrNameLst>
+                                          <p:attrName>ppt_w</p:attrName>
+                                        </p:attrNameLst>
+                                      </p:cBhvr>
+                                      <p:tavLst>
+                                        <p:tav tm="0">
+                                          <p:val>
+                                            <p:fltVal val="0"/>
+                                          </p:val>
+                                        </p:tav>
+                                        <p:tav tm="100000">
+                                          <p:val>
+                                            <p:strVal val="#ppt_w"/>
+                                          </p:val>
+                                        </p:tav>
+                                      </p:tavLst>
+                                    </p:anim>
+                                    <p:anim calcmode="lin" valueType="num">
+                                      <p:cBhvr>
+                                        <p:cTn id="48" dur="500" fill="hold"/>
+                                        <p:tgtEl>
+                                          <p:spTgt spid="12"/>
+                                        </p:tgtEl>
+                                        <p:attrNameLst>
+                                          <p:attrName>ppt_h</p:attrName>
+                                        </p:attrNameLst>
+                                      </p:cBhvr>
+                                      <p:tavLst>
+                                        <p:tav tm="0">
+                                          <p:val>
+                                            <p:fltVal val="0"/>
+                                          </p:val>
+                                        </p:tav>
+                                        <p:tav tm="100000">
+                                          <p:val>
+                                            <p:strVal val="#ppt_h"/>
+                                          </p:val>
+                                        </p:tav>
+                                      </p:tavLst>
+                                    </p:anim>
+                                    <p:animEffect transition="in" filter="fade">
+                                      <p:cBhvr>
+                                        <p:cTn id="49" dur="500"/>
+                                        <p:tgtEl>
+                                          <p:spTgt spid="12"/>
+                                        </p:tgtEl>
+                                      </p:cBhvr>
+                                    </p:animEffect>
+                                  </p:childTnLst>
+                                </p:cTn>
+                              </p:par>
+                              <p:par>
+                                <p:cTn id="50" presetID="10" presetClass="exit" presetSubtype="0" fill="hold" grpId="1" nodeType="withEffect">
+                                  <p:stCondLst>
+                                    <p:cond delay="750"/>
+                                  </p:stCondLst>
+                                  <p:childTnLst>
+                                    <p:animEffect transition="out" filter="fade">
+                                      <p:cBhvr>
+                                        <p:cTn id="51" dur="500"/>
+                                        <p:tgtEl>
+                                          <p:spTgt spid="12"/>
+                                        </p:tgtEl>
+                                      </p:cBhvr>
+                                    </p:animEffect>
+                                    <p:set>
+                                      <p:cBhvr>
+                                        <p:cTn id="52" dur="1" fill="hold">
+                                          <p:stCondLst>
+                                            <p:cond delay="499"/>
+                                          </p:stCondLst>
+                                        </p:cTn>
+                                        <p:tgtEl>
+                                          <p:spTgt spid="12"/>
+                                        </p:tgtEl>
+                                        <p:attrNameLst>
+                                          <p:attrName>style.visibility</p:attrName>
+                                        </p:attrNameLst>
+                                      </p:cBhvr>
+                                      <p:to>
+                                        <p:strVal val="hidden"/>
+                                      </p:to>
+                                    </p:set>
+                                  </p:childTnLst>
+                                </p:cTn>
+                              </p:par>
+                            </p:childTnLst>
+                          </p:cTn>
+                        </p:par>
+                        <p:par>
+                          <p:cTn id="53" fill="hold">
+                            <p:stCondLst>
+                              <p:cond delay="500"/>
+                            </p:stCondLst>
+                            <p:childTnLst>
+                              <p:par>
+                                <p:cTn id="54" presetID="1" presetClass="entr" presetSubtype="0" fill="hold" grpId="0" nodeType="afterEffect">
+                                  <p:stCondLst>
+                                    <p:cond delay="0"/>
+                                  </p:stCondLst>
+                                  <p:childTnLst>
+                                    <p:set>
+                                      <p:cBhvr>
+                                        <p:cTn id="55" dur="1" fill="hold">
+                                          <p:stCondLst>
+                                            <p:cond delay="0"/>
+                                          </p:stCondLst>
+                                        </p:cTn>
+                                        <p:tgtEl>
+                                          <p:spTgt spid="19"/>
+                                        </p:tgtEl>
+                                        <p:attrNameLst>
+                                          <p:attrName>style.visibility</p:attrName>
+                                        </p:attrNameLst>
+                                      </p:cBhvr>
+                                      <p:to>
+                                        <p:strVal val="visible"/>
+                                      </p:to>
+                                    </p:set>
+                                  </p:childTnLst>
+                                </p:cTn>
+                              </p:par>
+                            </p:childTnLst>
+                          </p:cTn>
+                        </p:par>
+                        <p:par>
+                          <p:cTn id="56" fill="hold">
+                            <p:stCondLst>
+                              <p:cond delay="500"/>
+                            </p:stCondLst>
+                            <p:childTnLst>
+                              <p:par>
+                                <p:cTn id="57" presetID="2" presetClass="entr" presetSubtype="1" decel="100000" fill="hold" grpId="0" nodeType="afterEffect">
+                                  <p:stCondLst>
+                                    <p:cond delay="0"/>
+                                  </p:stCondLst>
+                                  <p:childTnLst>
+                                    <p:set>
+                                      <p:cBhvr>
+                                        <p:cTn id="58" dur="1" fill="hold">
+                                          <p:stCondLst>
+                                            <p:cond delay="0"/>
+                                          </p:stCondLst>
+                                        </p:cTn>
+                                        <p:tgtEl>
+                                          <p:spTgt spid="46"/>
+                                        </p:tgtEl>
+                                        <p:attrNameLst>
+                                          <p:attrName>style.visibility</p:attrName>
+                                        </p:attrNameLst>
+                                      </p:cBhvr>
+                                      <p:to>
+                                        <p:strVal val="visible"/>
+                                      </p:to>
+                                    </p:set>
+                                    <p:anim calcmode="lin" valueType="num">
+                                      <p:cBhvr additive="base">
+                                        <p:cTn id="59" dur="650" fill="hold"/>
+                                        <p:tgtEl>
+                                          <p:spTgt spid="46"/>
+                                        </p:tgtEl>
+                                        <p:attrNameLst>
+                                          <p:attrName>ppt_x</p:attrName>
+                                        </p:attrNameLst>
+                                      </p:cBhvr>
+                                      <p:tavLst>
+                                        <p:tav tm="0">
+                                          <p:val>
+                                            <p:strVal val="#ppt_x"/>
+                                          </p:val>
+                                        </p:tav>
+                                        <p:tav tm="100000">
+                                          <p:val>
+                                            <p:strVal val="#ppt_x"/>
+                                          </p:val>
+                                        </p:tav>
+                                      </p:tavLst>
+                                    </p:anim>
+                                    <p:anim calcmode="lin" valueType="num">
+                                      <p:cBhvr additive="base">
+                                        <p:cTn id="60" dur="650" fill="hold"/>
+                                        <p:tgtEl>
+                                          <p:spTgt spid="46"/>
+                                        </p:tgtEl>
+                                        <p:attrNameLst>
+                                          <p:attrName>ppt_y</p:attrName>
+                                        </p:attrNameLst>
+                                      </p:cBhvr>
+                                      <p:tavLst>
+                                        <p:tav tm="0">
+                                          <p:val>
+                                            <p:strVal val="0-#ppt_h/2"/>
+                                          </p:val>
+                                        </p:tav>
+                                        <p:tav tm="100000">
+                                          <p:val>
+                                            <p:strVal val="#ppt_y"/>
+                                          </p:val>
+                                        </p:tav>
+                                      </p:tavLst>
+                                    </p:anim>
+                                  </p:childTnLst>
+                                </p:cTn>
+                              </p:par>
+                            </p:childTnLst>
+                          </p:cTn>
+                        </p:par>
+                      </p:childTnLst>
+                    </p:cTn>
+                  </p:par>
+                </p:childTnLst>
+              </p:cTn>
+              <p:prevCondLst>
+                <p:cond evt="onPrev" delay="0">
+                  <p:tgtEl>
+                    <p:sldTgt/>
+                  </p:tgtEl>
+                </p:cond>
+              </p:prevCondLst>
+              <p:nextCondLst>
+                <p:cond evt="onNext" delay="0">
+                  <p:tgtEl>
+                    <p:sldTgt/>
+                  </p:tgtEl>
+                </p:cond>
+              </p:nextCondLst>
+            </p:seq>
+          </p:childTnLst>
+        </p:cTn>
+      </p:par>
+    </p:tnLst>
+    <p:bldLst>
+      <p:bldP spid="14" grpId="0" bldLvl="0" animBg="1"/>
+      <p:bldP spid="14" grpId="1" bldLvl="0" animBg="1"/>
+      <p:bldP spid="15" grpId="0" bldLvl="0" animBg="1"/>
+      <p:bldP spid="15" grpId="1" bldLvl="0" animBg="1"/>
+      <p:bldP spid="16" grpId="0" bldLvl="0" animBg="1"/>
+      <p:bldP spid="16" grpId="1" bldLvl="0" animBg="1"/>
+      <p:bldP spid="10" grpId="0" bldLvl="0" animBg="1"/>
+      <p:bldP spid="10" grpId="1" bldLvl="0" animBg="1"/>
+      <p:bldP spid="11" grpId="0" bldLvl="0" animBg="1"/>
+      <p:bldP spid="11" grpId="1" bldLvl="0" animBg="1"/>
+      <p:bldP spid="12" grpId="0" bldLvl="0" animBg="1"/>
+      <p:bldP spid="12" grpId="1" bldLvl="0" animBg="1"/>
+      <p:bldP spid="46" grpId="0" bldLvl="0" animBg="1"/>
+      <p:bldP spid="19" grpId="0" bldLvl="0" animBg="1"/>
+    </p:bldLst>
+  </p:timing>
+</p:sld>
+</file>
+
+<file path=ppt/slides/slide5.xml><?xml version="1.0" encoding="utf-8"?>
+<p:sld xmlns:a="http://schemas.openxmlformats.org/drawingml/2006/main" xmlns:r="http://schemas.openxmlformats.org/officeDocument/2006/relationships" xmlns:p="http://schemas.openxmlformats.org/presentationml/2006/main">
+  <p:cSld>
+    <p:spTree>
+      <p:nvGrpSpPr>
+        <p:cNvPr id="1" name=""/>
+        <p:cNvGrpSpPr/>
+        <p:nvPr/>
+      </p:nvGrpSpPr>
+      <p:grpSpPr>
+        <a:xfrm>
+          <a:off x="0" y="0"/>
+          <a:ext cx="0" cy="0"/>
+          <a:chOff x="0" y="0"/>
+          <a:chExt cx="0" cy="0"/>
+        </a:xfrm>
+      </p:grpSpPr>
+      <p:sp>
+        <p:nvSpPr>
+          <p:cNvPr id="3" name="Slide Number Placeholder 2"/>
+          <p:cNvSpPr>
+            <a:spLocks noGrp="1"/>
+          </p:cNvSpPr>
+          <p:nvPr>
+            <p:ph type="sldNum" sz="quarter" idx="4294967295"/>
+          </p:nvPr>
+        </p:nvSpPr>
+        <p:spPr>
+          <a:xfrm>
+            <a:off x="11668125" y="6484938"/>
+            <a:ext cx="523875" cy="365125"/>
+          </a:xfrm>
+        </p:spPr>
+        <p:txBody>
+          <a:bodyPr/>
+          <a:lstStyle/>
+          <a:p>
+            <a:fld id="{5AE1514C-5E56-4738-A1FF-4B1CFD2A3E36}" type="slidenum">
+              <a:rPr lang="en-US" smtClean="0"/>
+              <a:t>5</a:t>
+            </a:fld>
+            <a:endParaRPr lang="en-US" dirty="0"/>
+          </a:p>
+        </p:txBody>
+      </p:sp>
+      <p:sp>
+        <p:nvSpPr>
+          <p:cNvPr id="11" name="Title 6"/>
+          <p:cNvSpPr txBox="1"/>
+          <p:nvPr/>
+        </p:nvSpPr>
+        <p:spPr>
+          <a:xfrm>
+            <a:off x="622853" y="768766"/>
+            <a:ext cx="10529241" cy="757130"/>
+          </a:xfrm>
+          <a:prstGeom prst="rect">
+            <a:avLst/>
+          </a:prstGeom>
+          <a:noFill/>
+        </p:spPr>
+        <p:txBody>
+          <a:bodyPr vert="horz" wrap="square" lIns="91440" tIns="45720" rIns="91440" bIns="45720" rtlCol="0" anchor="b" anchorCtr="0">
+            <a:spAutoFit/>
+          </a:bodyPr>
+          <a:lstStyle>
+            <a:lvl1pPr algn="ctr" defTabSz="914400" rtl="0" eaLnBrk="1" latinLnBrk="0" hangingPunct="1">
+              <a:lnSpc>
+                <a:spcPct val="90000"/>
+              </a:lnSpc>
+              <a:spcBef>
+                <a:spcPct val="0"/>
+              </a:spcBef>
+              <a:buNone/>
+              <a:defRPr lang="en-US" sz="8000" b="1" i="0" kern="1200" spc="-300" dirty="0">
+                <a:gradFill>
+                  <a:gsLst>
+                    <a:gs pos="0">
+                      <a:schemeClr val="accent1">
+                        <a:lumMod val="5000"/>
+                        <a:lumOff val="95000"/>
+                      </a:schemeClr>
+                    </a:gs>
+                    <a:gs pos="100000">
+                      <a:schemeClr val="tx1"/>
+                    </a:gs>
+                  </a:gsLst>
+                  <a:lin ang="5400000" scaled="1"/>
+                </a:gradFill>
+                <a:latin typeface="+mn-lt"/>
+                <a:ea typeface="+mn-ea"/>
+                <a:cs typeface="Segoe UI Semilight" panose="020B0402040204020203" pitchFamily="34" charset="0"/>
+              </a:defRPr>
+            </a:lvl1pPr>
+          </a:lstStyle>
+          <a:p>
+            <a:r>
+              <a:rPr lang="en-US" sz="4800" dirty="0"/>
+              <a:t>How to input data in Excel using “form”</a:t>
+            </a:r>
+          </a:p>
+        </p:txBody>
+      </p:sp>
+      <p:sp>
+        <p:nvSpPr>
+          <p:cNvPr id="5" name="TextBox 4">
+            <a:extLst>
+              <a:ext uri="{FF2B5EF4-FFF2-40B4-BE49-F238E27FC236}">
+                <a16:creationId xmlns:a16="http://schemas.microsoft.com/office/drawing/2014/main" id="{D4928D20-B821-0A6C-441D-54E165074188}"/>
+              </a:ext>
+            </a:extLst>
+          </p:cNvPr>
+          <p:cNvSpPr txBox="1"/>
+          <p:nvPr/>
+        </p:nvSpPr>
+        <p:spPr>
+          <a:xfrm>
+            <a:off x="782424" y="2073897"/>
+            <a:ext cx="10162095" cy="3671005"/>
+          </a:xfrm>
+          <a:prstGeom prst="rect">
+            <a:avLst/>
+          </a:prstGeom>
+          <a:noFill/>
+        </p:spPr>
+        <p:txBody>
+          <a:bodyPr wrap="square" rtlCol="0">
+            <a:spAutoFit/>
+          </a:bodyPr>
+          <a:lstStyle/>
+          <a:p>
+            <a:pPr marL="342900" indent="-342900">
+              <a:lnSpc>
+                <a:spcPct val="150000"/>
+              </a:lnSpc>
+              <a:buFont typeface="+mj-lt"/>
+              <a:buAutoNum type="arabicPeriod"/>
+            </a:pPr>
+            <a:r>
+              <a:rPr lang="en-US" sz="4000" dirty="0"/>
+              <a:t> Setup / Activate “Form” Function</a:t>
+            </a:r>
+          </a:p>
+          <a:p>
+            <a:pPr marL="342900" indent="-342900">
+              <a:lnSpc>
+                <a:spcPct val="150000"/>
+              </a:lnSpc>
+              <a:buFont typeface="+mj-lt"/>
+              <a:buAutoNum type="arabicPeriod"/>
+            </a:pPr>
+            <a:r>
+              <a:rPr lang="en-US" sz="4000" dirty="0"/>
+              <a:t> Add new data</a:t>
+            </a:r>
+          </a:p>
+          <a:p>
+            <a:pPr marL="342900" indent="-342900">
+              <a:lnSpc>
+                <a:spcPct val="150000"/>
+              </a:lnSpc>
+              <a:buFont typeface="+mj-lt"/>
+              <a:buAutoNum type="arabicPeriod"/>
+            </a:pPr>
+            <a:r>
+              <a:rPr lang="en-US" sz="4000" dirty="0"/>
+              <a:t> Data view and delete</a:t>
+            </a:r>
+          </a:p>
+          <a:p>
+            <a:pPr marL="342900" indent="-342900">
+              <a:lnSpc>
+                <a:spcPct val="150000"/>
+              </a:lnSpc>
+              <a:buFont typeface="+mj-lt"/>
+              <a:buAutoNum type="arabicPeriod"/>
+            </a:pPr>
+            <a:r>
+              <a:rPr lang="en-US" sz="4000"/>
+              <a:t> Data </a:t>
+            </a:r>
+            <a:r>
+              <a:rPr lang="en-US" sz="4000" dirty="0"/>
+              <a:t>query base on criteria</a:t>
+            </a:r>
+          </a:p>
+        </p:txBody>
+      </p:sp>
+    </p:spTree>
+    <p:extLst>
+      <p:ext uri="{BB962C8B-B14F-4D97-AF65-F5344CB8AC3E}">
+        <p14:creationId xmlns:p14="http://schemas.microsoft.com/office/powerpoint/2010/main" val="330352269"/>
+      </p:ext>
+    </p:extLst>
+  </p:cSld>
+  <p:clrMapOvr>
+    <a:masterClrMapping/>
+  </p:clrMapOvr>
+  <mc:AlternateContent xmlns:mc="http://schemas.openxmlformats.org/markup-compatibility/2006" xmlns:p159="http://schemas.microsoft.com/office/powerpoint/2015/09/main">
+    <mc:Choice Requires="p159">
+      <p:transition xmlns:p14="http://schemas.microsoft.com/office/powerpoint/2010/main" spd="slow" p14:dur="2000">
+        <p159:morph option="byObject"/>
+      </p:transition>
+    </mc:Choice>
+    <mc:Fallback xmlns="">
+      <p:transition spd="slow">
+        <p:fade/>
+      </p:transition>
+    </mc:Fallback>
+  </mc:AlternateContent>
+</p:sld>
+</file>
+
+<file path=ppt/tags/tag1.xml><?xml version="1.0" encoding="utf-8"?>
+<p:tagLst xmlns:a="http://schemas.openxmlformats.org/drawingml/2006/main" xmlns:r="http://schemas.openxmlformats.org/officeDocument/2006/relationships" xmlns:p="http://schemas.openxmlformats.org/presentationml/2006/main">
+  <p:tag name="COMMONDATA" val="eyJoZGlkIjoiMGI0NDc1NWNjMDQyNWNmYjZmODgzODQ3ZWQ3YTQ0NzAifQ=="/>
+</p:tagLst>
+</file>
+
+<file path=ppt/tags/tag2.xml><?xml version="1.0" encoding="utf-8"?>
+<p:tagLst xmlns:a="http://schemas.openxmlformats.org/drawingml/2006/main" xmlns:r="http://schemas.openxmlformats.org/officeDocument/2006/relationships" xmlns:p="http://schemas.openxmlformats.org/presentationml/2006/main">
+  <p:tag name="KSO_WM_BEAUTIFY_FLAG" val=""/>
+</p:tagLst>
 </file>
 
 <file path=ppt/theme/theme1.xml><?xml version="1.0" encoding="utf-8"?>
@@ -23993,7 +25709,7 @@
   <a:extraClrSchemeLst/>
   <a:extLst>
     <a:ext uri="{05A4C25C-085E-4340-85A3-A5531E510DB2}">
-      <thm15:themeFamily xmlns:thm15="http://schemas.microsoft.com/office/thememl/2012/main" name="TF16401425_Powerful Presentations_Win32_mlw - v2" id="{7CBB6D80-F69F-4458-A96A-A39B855A93D5}" vid="{827664DE-2D82-4B7F-8582-8671022436F9}"/>
+      <thm15:themeFamily xmlns:thm15="http://schemas.microsoft.com/office/thememl/2012/main" name="Office Theme" id="{62F939B6-93AF-4DB8-9C6B-D6C7DFDC589F}" vid="{4A3C46E8-61CC-4603-A589-7422A47A8E4A}"/>
     </a:ext>
   </a:extLst>
 </a:theme>
@@ -24042,7 +25758,7 @@
     </a:clrScheme>
     <a:fontScheme name="Office">
       <a:majorFont>
-        <a:latin typeface="Calibri Light" panose="020F0302020204030204"/>
+        <a:latin typeface="Calibri Light"/>
         <a:ea typeface=""/>
         <a:cs typeface=""/>
         <a:font script="Jpan" typeface="游ゴシック Light"/>
@@ -24075,26 +25791,9 @@
         <a:font script="Viet" typeface="Times New Roman"/>
         <a:font script="Uigh" typeface="Microsoft Uighur"/>
         <a:font script="Geor" typeface="Sylfaen"/>
-        <a:font script="Armn" typeface="Arial"/>
-        <a:font script="Bugi" typeface="Leelawadee UI"/>
-        <a:font script="Bopo" typeface="Microsoft JhengHei"/>
-        <a:font script="Java" typeface="Javanese Text"/>
-        <a:font script="Lisu" typeface="Segoe UI"/>
-        <a:font script="Mymr" typeface="Myanmar Text"/>
-        <a:font script="Nkoo" typeface="Ebrima"/>
-        <a:font script="Olck" typeface="Nirmala UI"/>
-        <a:font script="Osma" typeface="Ebrima"/>
-        <a:font script="Phag" typeface="Phagspa"/>
-        <a:font script="Syrn" typeface="Estrangelo Edessa"/>
-        <a:font script="Syrj" typeface="Estrangelo Edessa"/>
-        <a:font script="Syre" typeface="Estrangelo Edessa"/>
-        <a:font script="Sora" typeface="Nirmala UI"/>
-        <a:font script="Tale" typeface="Microsoft Tai Le"/>
-        <a:font script="Talu" typeface="Microsoft New Tai Lue"/>
-        <a:font script="Tfng" typeface="Ebrima"/>
       </a:majorFont>
       <a:minorFont>
-        <a:latin typeface="Calibri" panose="020F0502020204030204"/>
+        <a:latin typeface="Calibri"/>
         <a:ea typeface=""/>
         <a:cs typeface=""/>
         <a:font script="Jpan" typeface="游ゴシック"/>
@@ -24127,23 +25826,6 @@
         <a:font script="Viet" typeface="Arial"/>
         <a:font script="Uigh" typeface="Microsoft Uighur"/>
         <a:font script="Geor" typeface="Sylfaen"/>
-        <a:font script="Armn" typeface="Arial"/>
-        <a:font script="Bugi" typeface="Leelawadee UI"/>
-        <a:font script="Bopo" typeface="Microsoft JhengHei"/>
-        <a:font script="Java" typeface="Javanese Text"/>
-        <a:font script="Lisu" typeface="Segoe UI"/>
-        <a:font script="Mymr" typeface="Myanmar Text"/>
-        <a:font script="Nkoo" typeface="Ebrima"/>
-        <a:font script="Olck" typeface="Nirmala UI"/>
-        <a:font script="Osma" typeface="Ebrima"/>
-        <a:font script="Phag" typeface="Phagspa"/>
-        <a:font script="Syrn" typeface="Estrangelo Edessa"/>
-        <a:font script="Syrj" typeface="Estrangelo Edessa"/>
-        <a:font script="Syre" typeface="Estrangelo Edessa"/>
-        <a:font script="Sora" typeface="Nirmala UI"/>
-        <a:font script="Tale" typeface="Microsoft Tai Le"/>
-        <a:font script="Talu" typeface="Microsoft New Tai Lue"/>
-        <a:font script="Tfng" typeface="Ebrima"/>
       </a:minorFont>
     </a:fontScheme>
     <a:fmtScheme name="Office">
@@ -24337,7 +26019,7 @@
     </a:clrScheme>
     <a:fontScheme name="Office">
       <a:majorFont>
-        <a:latin typeface="Calibri Light" panose="020F0302020204030204"/>
+        <a:latin typeface="Calibri Light"/>
         <a:ea typeface=""/>
         <a:cs typeface=""/>
         <a:font script="Jpan" typeface="游ゴシック Light"/>
@@ -24370,26 +26052,9 @@
         <a:font script="Viet" typeface="Times New Roman"/>
         <a:font script="Uigh" typeface="Microsoft Uighur"/>
         <a:font script="Geor" typeface="Sylfaen"/>
-        <a:font script="Armn" typeface="Arial"/>
-        <a:font script="Bugi" typeface="Leelawadee UI"/>
-        <a:font script="Bopo" typeface="Microsoft JhengHei"/>
-        <a:font script="Java" typeface="Javanese Text"/>
-        <a:font script="Lisu" typeface="Segoe UI"/>
-        <a:font script="Mymr" typeface="Myanmar Text"/>
-        <a:font script="Nkoo" typeface="Ebrima"/>
-        <a:font script="Olck" typeface="Nirmala UI"/>
-        <a:font script="Osma" typeface="Ebrima"/>
-        <a:font script="Phag" typeface="Phagspa"/>
-        <a:font script="Syrn" typeface="Estrangelo Edessa"/>
-        <a:font script="Syrj" typeface="Estrangelo Edessa"/>
-        <a:font script="Syre" typeface="Estrangelo Edessa"/>
-        <a:font script="Sora" typeface="Nirmala UI"/>
-        <a:font script="Tale" typeface="Microsoft Tai Le"/>
-        <a:font script="Talu" typeface="Microsoft New Tai Lue"/>
-        <a:font script="Tfng" typeface="Ebrima"/>
       </a:majorFont>
       <a:minorFont>
-        <a:latin typeface="Calibri" panose="020F0502020204030204"/>
+        <a:latin typeface="Calibri"/>
         <a:ea typeface=""/>
         <a:cs typeface=""/>
         <a:font script="Jpan" typeface="游ゴシック"/>
@@ -24422,23 +26087,6 @@
         <a:font script="Viet" typeface="Arial"/>
         <a:font script="Uigh" typeface="Microsoft Uighur"/>
         <a:font script="Geor" typeface="Sylfaen"/>
-        <a:font script="Armn" typeface="Arial"/>
-        <a:font script="Bugi" typeface="Leelawadee UI"/>
-        <a:font script="Bopo" typeface="Microsoft JhengHei"/>
-        <a:font script="Java" typeface="Javanese Text"/>
-        <a:font script="Lisu" typeface="Segoe UI"/>
-        <a:font script="Mymr" typeface="Myanmar Text"/>
-        <a:font script="Nkoo" typeface="Ebrima"/>
-        <a:font script="Olck" typeface="Nirmala UI"/>
-        <a:font script="Osma" typeface="Ebrima"/>
-        <a:font script="Phag" typeface="Phagspa"/>
-        <a:font script="Syrn" typeface="Estrangelo Edessa"/>
-        <a:font script="Syrj" typeface="Estrangelo Edessa"/>
-        <a:font script="Syre" typeface="Estrangelo Edessa"/>
-        <a:font script="Sora" typeface="Nirmala UI"/>
-        <a:font script="Tale" typeface="Microsoft Tai Le"/>
-        <a:font script="Talu" typeface="Microsoft New Tai Lue"/>
-        <a:font script="Tfng" typeface="Ebrima"/>
       </a:minorFont>
     </a:fontScheme>
     <a:fmtScheme name="Office">
@@ -24590,24 +26238,6 @@
 </file>
 
 <file path=customXml/item1.xml><?xml version="1.0" encoding="utf-8"?>
-<?mso-contentType ?>
-<FormTemplates xmlns="http://schemas.microsoft.com/sharepoint/v3/contenttype/forms">
-  <Display>DocumentLibraryForm</Display>
-  <Edit>DocumentLibraryForm</Edit>
-  <New>DocumentLibraryForm</New>
-</FormTemplates>
-</file>
-
-<file path=customXml/item2.xml><?xml version="1.0" encoding="utf-8"?>
-<p:properties xmlns:p="http://schemas.microsoft.com/office/2006/metadata/properties" xmlns:xsi="http://www.w3.org/2001/XMLSchema-instance" xmlns:pc="http://schemas.microsoft.com/office/infopath/2007/PartnerControls">
-  <documentManagement>
-    <Status xmlns="71af3243-3dd4-4a8d-8c0d-dd76da1f02a5">Not started</Status>
-    <MediaServiceKeyPoints xmlns="71af3243-3dd4-4a8d-8c0d-dd76da1f02a5" xsi:nil="true"/>
-  </documentManagement>
-</p:properties>
-</file>
-
-<file path=customXml/item3.xml><?xml version="1.0" encoding="utf-8"?>
 <ct:contentTypeSchema xmlns:ct="http://schemas.microsoft.com/office/2006/metadata/contentType" xmlns:ma="http://schemas.microsoft.com/office/2006/metadata/properties/metaAttributes" ct:_="" ma:_="" ma:contentTypeName="Document" ma:contentTypeID="0x01010079F111ED35F8CC479449609E8A0923A6" ma:contentTypeVersion="12" ma:contentTypeDescription="Create a new document." ma:contentTypeScope="" ma:versionID="42480f6609812271f56e53f2aff71704">
   <xsd:schema xmlns:xsd="http://www.w3.org/2001/XMLSchema" xmlns:xs="http://www.w3.org/2001/XMLSchema" xmlns:p="http://schemas.microsoft.com/office/2006/metadata/properties" xmlns:ns2="71af3243-3dd4-4a8d-8c0d-dd76da1f02a5" xmlns:ns3="16c05727-aa75-4e4a-9b5f-8a80a1165891" targetNamespace="http://schemas.microsoft.com/office/2006/metadata/properties" ma:root="true" ma:fieldsID="4b48d77c16982ba2890c3fe2b4c067b2" ns2:_="" ns3:_="">
     <xsd:import namespace="71af3243-3dd4-4a8d-8c0d-dd76da1f02a5"/>
@@ -24828,39 +26458,38 @@
 </ct:contentTypeSchema>
 </file>
 
+<file path=customXml/item2.xml><?xml version="1.0" encoding="utf-8"?>
+<p:properties xmlns:p="http://schemas.microsoft.com/office/2006/metadata/properties" xmlns:xsi="http://www.w3.org/2001/XMLSchema-instance" xmlns:pc="http://schemas.microsoft.com/office/infopath/2007/PartnerControls">
+  <documentManagement>
+    <Status xmlns="71af3243-3dd4-4a8d-8c0d-dd76da1f02a5">Not started</Status>
+    <MediaServiceKeyPoints xmlns="71af3243-3dd4-4a8d-8c0d-dd76da1f02a5" xsi:nil="true"/>
+  </documentManagement>
+</p:properties>
+</file>
+
+<file path=customXml/item3.xml><?xml version="1.0" encoding="utf-8"?>
+<?mso-contentType ?>
+<FormTemplates xmlns="http://schemas.microsoft.com/sharepoint/v3/contenttype/forms">
+  <Display>DocumentLibraryForm</Display>
+  <Edit>DocumentLibraryForm</Edit>
+  <New>DocumentLibraryForm</New>
+</FormTemplates>
+</file>
+
 <file path=customXml/itemProps1.xml><?xml version="1.0" encoding="utf-8"?>
-<ds:datastoreItem xmlns:ds="http://schemas.openxmlformats.org/officeDocument/2006/customXml" ds:itemID="{530CA71C-6B24-463C-853F-076A02E27CBC}">
-  <ds:schemaRefs>
-    <ds:schemaRef ds:uri="http://schemas.microsoft.com/sharepoint/v3/contenttype/forms"/>
-  </ds:schemaRefs>
+<ds:datastoreItem xmlns:ds="http://schemas.openxmlformats.org/officeDocument/2006/customXml" ds:itemID="{B1C2FF92-1ACE-4D23-9586-85906FF02F9F}">
+  <ds:schemaRefs/>
 </ds:datastoreItem>
 </file>
 
 <file path=customXml/itemProps2.xml><?xml version="1.0" encoding="utf-8"?>
 <ds:datastoreItem xmlns:ds="http://schemas.openxmlformats.org/officeDocument/2006/customXml" ds:itemID="{9D2E6351-E64A-42DD-A554-7DF752222129}">
-  <ds:schemaRefs>
-    <ds:schemaRef ds:uri="http://schemas.microsoft.com/office/2006/metadata/properties"/>
-    <ds:schemaRef ds:uri="http://schemas.microsoft.com/office/infopath/2007/PartnerControls"/>
-    <ds:schemaRef ds:uri="71af3243-3dd4-4a8d-8c0d-dd76da1f02a5"/>
-  </ds:schemaRefs>
+  <ds:schemaRefs/>
 </ds:datastoreItem>
 </file>
 
 <file path=customXml/itemProps3.xml><?xml version="1.0" encoding="utf-8"?>
-<ds:datastoreItem xmlns:ds="http://schemas.openxmlformats.org/officeDocument/2006/customXml" ds:itemID="{B1C2FF92-1ACE-4D23-9586-85906FF02F9F}">
-  <ds:schemaRefs>
-    <ds:schemaRef ds:uri="http://schemas.microsoft.com/office/2006/metadata/contentType"/>
-    <ds:schemaRef ds:uri="http://schemas.microsoft.com/office/2006/metadata/properties/metaAttributes"/>
-    <ds:schemaRef ds:uri="http://www.w3.org/2001/XMLSchema"/>
-    <ds:schemaRef ds:uri="http://schemas.microsoft.com/office/2006/metadata/properties"/>
-    <ds:schemaRef ds:uri="71af3243-3dd4-4a8d-8c0d-dd76da1f02a5"/>
-    <ds:schemaRef ds:uri="16c05727-aa75-4e4a-9b5f-8a80a1165891"/>
-    <ds:schemaRef ds:uri="http://schemas.microsoft.com/office/2006/documentManagement/types"/>
-    <ds:schemaRef ds:uri="http://schemas.microsoft.com/office/infopath/2007/PartnerControls"/>
-    <ds:schemaRef ds:uri="http://schemas.openxmlformats.org/package/2006/metadata/core-properties"/>
-    <ds:schemaRef ds:uri="http://purl.org/dc/elements/1.1/"/>
-    <ds:schemaRef ds:uri="http://purl.org/dc/terms/"/>
-    <ds:schemaRef ds:uri="http://schemas.microsoft.com/internal/obd"/>
-  </ds:schemaRefs>
+<ds:datastoreItem xmlns:ds="http://schemas.openxmlformats.org/officeDocument/2006/customXml" ds:itemID="{530CA71C-6B24-463C-853F-076A02E27CBC}">
+  <ds:schemaRefs/>
 </ds:datastoreItem>
 </file>
</xml_diff>

<commit_message>
add Power BI replace value tip
</commit_message>
<xml_diff>
--- a/tool-tips.pptx
+++ b/tool-tips.pptx
@@ -5,10 +5,10 @@
     <p:sldMasterId id="2147483648" r:id="rId4"/>
   </p:sldMasterIdLst>
   <p:notesMasterIdLst>
-    <p:notesMasterId r:id="rId18"/>
+    <p:notesMasterId r:id="rId19"/>
   </p:notesMasterIdLst>
   <p:handoutMasterIdLst>
-    <p:handoutMasterId r:id="rId19"/>
+    <p:handoutMasterId r:id="rId20"/>
   </p:handoutMasterIdLst>
   <p:sldIdLst>
     <p:sldId id="394" r:id="rId5"/>
@@ -24,11 +24,12 @@
     <p:sldId id="393" r:id="rId15"/>
     <p:sldId id="395" r:id="rId16"/>
     <p:sldId id="397" r:id="rId17"/>
+    <p:sldId id="398" r:id="rId18"/>
   </p:sldIdLst>
   <p:sldSz cx="12192000" cy="6858000"/>
   <p:notesSz cx="9388475" cy="7102475"/>
   <p:custDataLst>
-    <p:tags r:id="rId20"/>
+    <p:tags r:id="rId21"/>
   </p:custDataLst>
   <p:defaultTextStyle>
     <a:defPPr>
@@ -218,7 +219,7 @@
           <a:p>
             <a:fld id="{7CCA049B-3A46-4BDA-A8F5-2925B00FE570}" type="datetimeFigureOut">
               <a:rPr lang="en-US" smtClean="0"/>
-              <a:t>1/27/2024</a:t>
+              <a:t>5/2/2024</a:t>
             </a:fld>
             <a:endParaRPr lang="en-US" dirty="0"/>
           </a:p>
@@ -383,7 +384,7 @@
           <a:p>
             <a:fld id="{44C46CEC-428A-4DD0-A7C7-21AF8DE33E93}" type="datetimeFigureOut">
               <a:rPr lang="en-US" smtClean="0"/>
-              <a:t>1/27/2024</a:t>
+              <a:t>5/2/2024</a:t>
             </a:fld>
             <a:endParaRPr lang="en-US" dirty="0"/>
           </a:p>
@@ -749,6 +750,119 @@
     <p:extLst>
       <p:ext uri="{BB962C8B-B14F-4D97-AF65-F5344CB8AC3E}">
         <p14:creationId xmlns:p14="http://schemas.microsoft.com/office/powerpoint/2010/main" val="3725275773"/>
+      </p:ext>
+    </p:extLst>
+  </p:cSld>
+  <p:clrMapOvr>
+    <a:masterClrMapping/>
+  </p:clrMapOvr>
+</p:notes>
+</file>
+
+<file path=ppt/notesSlides/notesSlide10.xml><?xml version="1.0" encoding="utf-8"?>
+<p:notes xmlns:a="http://schemas.openxmlformats.org/drawingml/2006/main" xmlns:r="http://schemas.openxmlformats.org/officeDocument/2006/relationships" xmlns:p="http://schemas.openxmlformats.org/presentationml/2006/main">
+  <p:cSld>
+    <p:spTree>
+      <p:nvGrpSpPr>
+        <p:cNvPr id="1" name=""/>
+        <p:cNvGrpSpPr/>
+        <p:nvPr/>
+      </p:nvGrpSpPr>
+      <p:grpSpPr>
+        <a:xfrm>
+          <a:off x="0" y="0"/>
+          <a:ext cx="0" cy="0"/>
+          <a:chOff x="0" y="0"/>
+          <a:chExt cx="0" cy="0"/>
+        </a:xfrm>
+      </p:grpSpPr>
+      <p:sp>
+        <p:nvSpPr>
+          <p:cNvPr id="2" name="Slide Image Placeholder 1"/>
+          <p:cNvSpPr>
+            <a:spLocks noGrp="1" noRot="1" noChangeAspect="1"/>
+          </p:cNvSpPr>
+          <p:nvPr>
+            <p:ph type="sldImg"/>
+          </p:nvPr>
+        </p:nvSpPr>
+        <p:spPr/>
+      </p:sp>
+      <p:sp>
+        <p:nvSpPr>
+          <p:cNvPr id="3" name="Notes Placeholder 2"/>
+          <p:cNvSpPr>
+            <a:spLocks noGrp="1"/>
+          </p:cNvSpPr>
+          <p:nvPr>
+            <p:ph type="body" idx="1"/>
+          </p:nvPr>
+        </p:nvSpPr>
+        <p:spPr/>
+        <p:txBody>
+          <a:bodyPr/>
+          <a:lstStyle/>
+          <a:p>
+            <a:r>
+              <a:rPr lang="en-US" dirty="0"/>
+              <a:t>To use this title animation slide with a new image simply 1) move the top semi-transparent shape</a:t>
+            </a:r>
+            <a:r>
+              <a:rPr lang="en-US" baseline="0" dirty="0"/>
+              <a:t> </a:t>
+            </a:r>
+            <a:r>
+              <a:rPr lang="en-US" dirty="0"/>
+              <a:t>to the side, 2) delete placeholder image,</a:t>
+            </a:r>
+            <a:r>
+              <a:rPr lang="en-US" baseline="0" dirty="0"/>
+              <a:t> </a:t>
+            </a:r>
+            <a:br>
+              <a:rPr lang="en-US" baseline="0" dirty="0"/>
+            </a:br>
+            <a:r>
+              <a:rPr lang="en-US" baseline="0" dirty="0"/>
+              <a:t>3) click on the picture icon to add a new picture, 4) </a:t>
+            </a:r>
+            <a:r>
+              <a:rPr lang="en-US" dirty="0"/>
+              <a:t>Move semi-transparent shape back to original position, 5) Update text on slide.</a:t>
+            </a:r>
+          </a:p>
+          <a:p>
+            <a:endParaRPr lang="en-US" dirty="0"/>
+          </a:p>
+        </p:txBody>
+      </p:sp>
+      <p:sp>
+        <p:nvSpPr>
+          <p:cNvPr id="4" name="Slide Number Placeholder 3"/>
+          <p:cNvSpPr>
+            <a:spLocks noGrp="1"/>
+          </p:cNvSpPr>
+          <p:nvPr>
+            <p:ph type="sldNum" sz="quarter" idx="10"/>
+          </p:nvPr>
+        </p:nvSpPr>
+        <p:spPr/>
+        <p:txBody>
+          <a:bodyPr/>
+          <a:lstStyle/>
+          <a:p>
+            <a:fld id="{4CBCEA92-F142-4D57-B507-37BDAF44710C}" type="slidenum">
+              <a:rPr lang="en-US" smtClean="0"/>
+              <a:t>14</a:t>
+            </a:fld>
+            <a:endParaRPr lang="en-US" dirty="0"/>
+          </a:p>
+        </p:txBody>
+      </p:sp>
+    </p:spTree>
+    <p:extLst>
+      <p:ext uri="{BB962C8B-B14F-4D97-AF65-F5344CB8AC3E}">
+        <p14:creationId xmlns:p14="http://schemas.microsoft.com/office/powerpoint/2010/main" val="2158596178"/>
       </p:ext>
     </p:extLst>
   </p:cSld>
@@ -26811,6 +26925,1845 @@
 </p:sld>
 </file>
 
+<file path=ppt/slides/slide14.xml><?xml version="1.0" encoding="utf-8"?>
+<p:sld xmlns:a="http://schemas.openxmlformats.org/drawingml/2006/main" xmlns:r="http://schemas.openxmlformats.org/officeDocument/2006/relationships" xmlns:p="http://schemas.openxmlformats.org/presentationml/2006/main">
+  <p:cSld>
+    <p:spTree>
+      <p:nvGrpSpPr>
+        <p:cNvPr id="1" name=""/>
+        <p:cNvGrpSpPr/>
+        <p:nvPr/>
+      </p:nvGrpSpPr>
+      <p:grpSpPr>
+        <a:xfrm>
+          <a:off x="0" y="0"/>
+          <a:ext cx="0" cy="0"/>
+          <a:chOff x="0" y="0"/>
+          <a:chExt cx="0" cy="0"/>
+        </a:xfrm>
+      </p:grpSpPr>
+      <p:pic>
+        <p:nvPicPr>
+          <p:cNvPr id="31" name="Picture Placeholder 30"/>
+          <p:cNvPicPr>
+            <a:picLocks noGrp="1" noChangeAspect="1"/>
+          </p:cNvPicPr>
+          <p:nvPr>
+            <p:ph type="pic" sz="quarter" idx="14"/>
+          </p:nvPr>
+        </p:nvPicPr>
+        <p:blipFill>
+          <a:blip r:embed="rId3">
+            <a:extLst>
+              <a:ext uri="{28A0092B-C50C-407E-A947-70E740481C1C}">
+                <a14:useLocalDpi xmlns:a14="http://schemas.microsoft.com/office/drawing/2010/main" val="0"/>
+              </a:ext>
+            </a:extLst>
+          </a:blip>
+          <a:srcRect/>
+          <a:stretch>
+            <a:fillRect/>
+          </a:stretch>
+        </p:blipFill>
+        <p:spPr/>
+      </p:pic>
+      <p:sp>
+        <p:nvSpPr>
+          <p:cNvPr id="4" name="Rectangle 3"/>
+          <p:cNvSpPr/>
+          <p:nvPr/>
+        </p:nvSpPr>
+        <p:spPr>
+          <a:xfrm>
+            <a:off x="0" y="0"/>
+            <a:ext cx="12192000" cy="6858000"/>
+          </a:xfrm>
+          <a:prstGeom prst="rect">
+            <a:avLst/>
+          </a:prstGeom>
+          <a:solidFill>
+            <a:srgbClr val="000000">
+              <a:alpha val="40000"/>
+            </a:srgbClr>
+          </a:solidFill>
+          <a:ln>
+            <a:noFill/>
+          </a:ln>
+        </p:spPr>
+        <p:style>
+          <a:lnRef idx="2">
+            <a:schemeClr val="accent1">
+              <a:shade val="50000"/>
+            </a:schemeClr>
+          </a:lnRef>
+          <a:fillRef idx="1">
+            <a:schemeClr val="accent1"/>
+          </a:fillRef>
+          <a:effectRef idx="0">
+            <a:schemeClr val="accent1"/>
+          </a:effectRef>
+          <a:fontRef idx="minor">
+            <a:schemeClr val="lt1"/>
+          </a:fontRef>
+        </p:style>
+        <p:txBody>
+          <a:bodyPr rtlCol="0" anchor="ctr"/>
+          <a:lstStyle/>
+          <a:p>
+            <a:pPr algn="ctr"/>
+            <a:endParaRPr lang="en-US" dirty="0"/>
+          </a:p>
+        </p:txBody>
+      </p:sp>
+      <p:sp>
+        <p:nvSpPr>
+          <p:cNvPr id="14" name="Oval 13"/>
+          <p:cNvSpPr/>
+          <p:nvPr/>
+        </p:nvSpPr>
+        <p:spPr>
+          <a:xfrm>
+            <a:off x="1219939" y="-739444"/>
+            <a:ext cx="9107555" cy="9034439"/>
+          </a:xfrm>
+          <a:prstGeom prst="ellipse">
+            <a:avLst/>
+          </a:prstGeom>
+          <a:noFill/>
+          <a:ln w="19050">
+            <a:solidFill>
+              <a:schemeClr val="accent1"/>
+            </a:solidFill>
+          </a:ln>
+          <a:effectLst/>
+        </p:spPr>
+        <p:style>
+          <a:lnRef idx="2">
+            <a:schemeClr val="accent1">
+              <a:shade val="50000"/>
+            </a:schemeClr>
+          </a:lnRef>
+          <a:fillRef idx="1">
+            <a:schemeClr val="accent1"/>
+          </a:fillRef>
+          <a:effectRef idx="0">
+            <a:schemeClr val="accent1"/>
+          </a:effectRef>
+          <a:fontRef idx="minor">
+            <a:schemeClr val="lt1"/>
+          </a:fontRef>
+        </p:style>
+        <p:txBody>
+          <a:bodyPr rtlCol="0" anchor="ctr"/>
+          <a:lstStyle/>
+          <a:p>
+            <a:pPr marL="0" marR="0" lvl="0" indent="0" algn="ctr" defTabSz="914400" eaLnBrk="1" fontAlgn="auto" latinLnBrk="0" hangingPunct="1">
+              <a:lnSpc>
+                <a:spcPct val="100000"/>
+              </a:lnSpc>
+              <a:spcBef>
+                <a:spcPts val="0"/>
+              </a:spcBef>
+              <a:spcAft>
+                <a:spcPts val="0"/>
+              </a:spcAft>
+              <a:buClrTx/>
+              <a:buSzTx/>
+              <a:buFontTx/>
+              <a:buNone/>
+              <a:defRPr/>
+            </a:pPr>
+            <a:endParaRPr kumimoji="0" lang="en-US" sz="1800" b="0" i="0" u="none" strike="noStrike" kern="0" cap="none" spc="0" normalizeH="0" baseline="0" dirty="0">
+              <a:ln>
+                <a:noFill/>
+              </a:ln>
+              <a:solidFill>
+                <a:sysClr val="windowText" lastClr="000000"/>
+              </a:solidFill>
+              <a:effectLst/>
+              <a:uLnTx/>
+              <a:uFillTx/>
+            </a:endParaRPr>
+          </a:p>
+        </p:txBody>
+      </p:sp>
+      <p:sp>
+        <p:nvSpPr>
+          <p:cNvPr id="15" name="Oval 14"/>
+          <p:cNvSpPr/>
+          <p:nvPr/>
+        </p:nvSpPr>
+        <p:spPr>
+          <a:xfrm>
+            <a:off x="1219939" y="-739444"/>
+            <a:ext cx="9107555" cy="9034439"/>
+          </a:xfrm>
+          <a:prstGeom prst="ellipse">
+            <a:avLst/>
+          </a:prstGeom>
+          <a:noFill/>
+          <a:ln w="19050">
+            <a:solidFill>
+              <a:schemeClr val="accent1"/>
+            </a:solidFill>
+          </a:ln>
+          <a:effectLst/>
+        </p:spPr>
+        <p:style>
+          <a:lnRef idx="2">
+            <a:schemeClr val="accent1">
+              <a:shade val="50000"/>
+            </a:schemeClr>
+          </a:lnRef>
+          <a:fillRef idx="1">
+            <a:schemeClr val="accent1"/>
+          </a:fillRef>
+          <a:effectRef idx="0">
+            <a:schemeClr val="accent1"/>
+          </a:effectRef>
+          <a:fontRef idx="minor">
+            <a:schemeClr val="lt1"/>
+          </a:fontRef>
+        </p:style>
+        <p:txBody>
+          <a:bodyPr rtlCol="0" anchor="ctr"/>
+          <a:lstStyle/>
+          <a:p>
+            <a:pPr marL="0" marR="0" lvl="0" indent="0" algn="ctr" defTabSz="914400" eaLnBrk="1" fontAlgn="auto" latinLnBrk="0" hangingPunct="1">
+              <a:lnSpc>
+                <a:spcPct val="100000"/>
+              </a:lnSpc>
+              <a:spcBef>
+                <a:spcPts val="0"/>
+              </a:spcBef>
+              <a:spcAft>
+                <a:spcPts val="0"/>
+              </a:spcAft>
+              <a:buClrTx/>
+              <a:buSzTx/>
+              <a:buFontTx/>
+              <a:buNone/>
+              <a:defRPr/>
+            </a:pPr>
+            <a:endParaRPr kumimoji="0" lang="en-US" sz="1800" b="0" i="0" u="none" strike="noStrike" kern="0" cap="none" spc="0" normalizeH="0" baseline="0" dirty="0">
+              <a:ln>
+                <a:noFill/>
+              </a:ln>
+              <a:solidFill>
+                <a:sysClr val="windowText" lastClr="000000"/>
+              </a:solidFill>
+              <a:effectLst/>
+              <a:uLnTx/>
+              <a:uFillTx/>
+            </a:endParaRPr>
+          </a:p>
+        </p:txBody>
+      </p:sp>
+      <p:sp>
+        <p:nvSpPr>
+          <p:cNvPr id="16" name="Oval 15"/>
+          <p:cNvSpPr/>
+          <p:nvPr/>
+        </p:nvSpPr>
+        <p:spPr>
+          <a:xfrm>
+            <a:off x="1219939" y="-739444"/>
+            <a:ext cx="9107555" cy="9034439"/>
+          </a:xfrm>
+          <a:prstGeom prst="ellipse">
+            <a:avLst/>
+          </a:prstGeom>
+          <a:noFill/>
+          <a:ln w="19050">
+            <a:solidFill>
+              <a:schemeClr val="accent1"/>
+            </a:solidFill>
+          </a:ln>
+          <a:effectLst/>
+        </p:spPr>
+        <p:style>
+          <a:lnRef idx="2">
+            <a:schemeClr val="accent1">
+              <a:shade val="50000"/>
+            </a:schemeClr>
+          </a:lnRef>
+          <a:fillRef idx="1">
+            <a:schemeClr val="accent1"/>
+          </a:fillRef>
+          <a:effectRef idx="0">
+            <a:schemeClr val="accent1"/>
+          </a:effectRef>
+          <a:fontRef idx="minor">
+            <a:schemeClr val="lt1"/>
+          </a:fontRef>
+        </p:style>
+        <p:txBody>
+          <a:bodyPr rtlCol="0" anchor="ctr"/>
+          <a:lstStyle/>
+          <a:p>
+            <a:pPr marL="0" marR="0" lvl="0" indent="0" algn="ctr" defTabSz="914400" eaLnBrk="1" fontAlgn="auto" latinLnBrk="0" hangingPunct="1">
+              <a:lnSpc>
+                <a:spcPct val="100000"/>
+              </a:lnSpc>
+              <a:spcBef>
+                <a:spcPts val="0"/>
+              </a:spcBef>
+              <a:spcAft>
+                <a:spcPts val="0"/>
+              </a:spcAft>
+              <a:buClrTx/>
+              <a:buSzTx/>
+              <a:buFontTx/>
+              <a:buNone/>
+              <a:defRPr/>
+            </a:pPr>
+            <a:endParaRPr kumimoji="0" lang="en-US" sz="1800" b="0" i="0" u="none" strike="noStrike" kern="0" cap="none" spc="0" normalizeH="0" baseline="0" dirty="0">
+              <a:ln>
+                <a:noFill/>
+              </a:ln>
+              <a:solidFill>
+                <a:sysClr val="windowText" lastClr="000000"/>
+              </a:solidFill>
+              <a:effectLst/>
+              <a:uLnTx/>
+              <a:uFillTx/>
+            </a:endParaRPr>
+          </a:p>
+        </p:txBody>
+      </p:sp>
+      <p:sp>
+        <p:nvSpPr>
+          <p:cNvPr id="10" name="Oval 9"/>
+          <p:cNvSpPr/>
+          <p:nvPr/>
+        </p:nvSpPr>
+        <p:spPr>
+          <a:xfrm>
+            <a:off x="5907634" y="3213970"/>
+            <a:ext cx="2805809" cy="2783284"/>
+          </a:xfrm>
+          <a:prstGeom prst="ellipse">
+            <a:avLst/>
+          </a:prstGeom>
+          <a:noFill/>
+          <a:ln w="19050">
+            <a:solidFill>
+              <a:schemeClr val="accent1"/>
+            </a:solidFill>
+          </a:ln>
+          <a:effectLst/>
+        </p:spPr>
+        <p:style>
+          <a:lnRef idx="2">
+            <a:schemeClr val="accent1">
+              <a:shade val="50000"/>
+            </a:schemeClr>
+          </a:lnRef>
+          <a:fillRef idx="1">
+            <a:schemeClr val="accent1"/>
+          </a:fillRef>
+          <a:effectRef idx="0">
+            <a:schemeClr val="accent1"/>
+          </a:effectRef>
+          <a:fontRef idx="minor">
+            <a:schemeClr val="lt1"/>
+          </a:fontRef>
+        </p:style>
+        <p:txBody>
+          <a:bodyPr rtlCol="0" anchor="ctr"/>
+          <a:lstStyle/>
+          <a:p>
+            <a:pPr marL="0" marR="0" lvl="0" indent="0" algn="ctr" defTabSz="914400" eaLnBrk="1" fontAlgn="auto" latinLnBrk="0" hangingPunct="1">
+              <a:lnSpc>
+                <a:spcPct val="100000"/>
+              </a:lnSpc>
+              <a:spcBef>
+                <a:spcPts val="0"/>
+              </a:spcBef>
+              <a:spcAft>
+                <a:spcPts val="0"/>
+              </a:spcAft>
+              <a:buClrTx/>
+              <a:buSzTx/>
+              <a:buFontTx/>
+              <a:buNone/>
+              <a:defRPr/>
+            </a:pPr>
+            <a:endParaRPr kumimoji="0" lang="en-US" sz="1800" b="0" i="0" u="none" strike="noStrike" kern="0" cap="none" spc="0" normalizeH="0" baseline="0" dirty="0">
+              <a:ln>
+                <a:noFill/>
+              </a:ln>
+              <a:solidFill>
+                <a:sysClr val="windowText" lastClr="000000"/>
+              </a:solidFill>
+              <a:effectLst/>
+              <a:uLnTx/>
+              <a:uFillTx/>
+            </a:endParaRPr>
+          </a:p>
+        </p:txBody>
+      </p:sp>
+      <p:sp>
+        <p:nvSpPr>
+          <p:cNvPr id="11" name="Oval 10"/>
+          <p:cNvSpPr/>
+          <p:nvPr/>
+        </p:nvSpPr>
+        <p:spPr>
+          <a:xfrm>
+            <a:off x="5907634" y="3213970"/>
+            <a:ext cx="2805809" cy="2783284"/>
+          </a:xfrm>
+          <a:prstGeom prst="ellipse">
+            <a:avLst/>
+          </a:prstGeom>
+          <a:noFill/>
+          <a:ln w="19050">
+            <a:solidFill>
+              <a:schemeClr val="accent1"/>
+            </a:solidFill>
+          </a:ln>
+          <a:effectLst/>
+        </p:spPr>
+        <p:style>
+          <a:lnRef idx="2">
+            <a:schemeClr val="accent1">
+              <a:shade val="50000"/>
+            </a:schemeClr>
+          </a:lnRef>
+          <a:fillRef idx="1">
+            <a:schemeClr val="accent1"/>
+          </a:fillRef>
+          <a:effectRef idx="0">
+            <a:schemeClr val="accent1"/>
+          </a:effectRef>
+          <a:fontRef idx="minor">
+            <a:schemeClr val="lt1"/>
+          </a:fontRef>
+        </p:style>
+        <p:txBody>
+          <a:bodyPr rtlCol="0" anchor="ctr"/>
+          <a:lstStyle/>
+          <a:p>
+            <a:pPr marL="0" marR="0" lvl="0" indent="0" algn="ctr" defTabSz="914400" eaLnBrk="1" fontAlgn="auto" latinLnBrk="0" hangingPunct="1">
+              <a:lnSpc>
+                <a:spcPct val="100000"/>
+              </a:lnSpc>
+              <a:spcBef>
+                <a:spcPts val="0"/>
+              </a:spcBef>
+              <a:spcAft>
+                <a:spcPts val="0"/>
+              </a:spcAft>
+              <a:buClrTx/>
+              <a:buSzTx/>
+              <a:buFontTx/>
+              <a:buNone/>
+              <a:defRPr/>
+            </a:pPr>
+            <a:endParaRPr kumimoji="0" lang="en-US" sz="1800" b="0" i="0" u="none" strike="noStrike" kern="0" cap="none" spc="0" normalizeH="0" baseline="0" dirty="0">
+              <a:ln>
+                <a:noFill/>
+              </a:ln>
+              <a:solidFill>
+                <a:sysClr val="windowText" lastClr="000000"/>
+              </a:solidFill>
+              <a:effectLst/>
+              <a:uLnTx/>
+              <a:uFillTx/>
+            </a:endParaRPr>
+          </a:p>
+        </p:txBody>
+      </p:sp>
+      <p:sp>
+        <p:nvSpPr>
+          <p:cNvPr id="12" name="Oval 11"/>
+          <p:cNvSpPr/>
+          <p:nvPr/>
+        </p:nvSpPr>
+        <p:spPr>
+          <a:xfrm>
+            <a:off x="5907634" y="3213970"/>
+            <a:ext cx="2805809" cy="2783284"/>
+          </a:xfrm>
+          <a:prstGeom prst="ellipse">
+            <a:avLst/>
+          </a:prstGeom>
+          <a:noFill/>
+          <a:ln w="19050" cmpd="thinThick">
+            <a:solidFill>
+              <a:schemeClr val="accent1"/>
+            </a:solidFill>
+            <a:prstDash val="solid"/>
+          </a:ln>
+          <a:effectLst/>
+        </p:spPr>
+        <p:style>
+          <a:lnRef idx="2">
+            <a:schemeClr val="accent1">
+              <a:shade val="50000"/>
+            </a:schemeClr>
+          </a:lnRef>
+          <a:fillRef idx="1">
+            <a:schemeClr val="accent1"/>
+          </a:fillRef>
+          <a:effectRef idx="0">
+            <a:schemeClr val="accent1"/>
+          </a:effectRef>
+          <a:fontRef idx="minor">
+            <a:schemeClr val="lt1"/>
+          </a:fontRef>
+        </p:style>
+        <p:txBody>
+          <a:bodyPr rtlCol="0" anchor="ctr"/>
+          <a:lstStyle/>
+          <a:p>
+            <a:pPr marL="0" marR="0" lvl="0" indent="0" algn="ctr" defTabSz="914400" eaLnBrk="1" fontAlgn="auto" latinLnBrk="0" hangingPunct="1">
+              <a:lnSpc>
+                <a:spcPct val="100000"/>
+              </a:lnSpc>
+              <a:spcBef>
+                <a:spcPts val="0"/>
+              </a:spcBef>
+              <a:spcAft>
+                <a:spcPts val="0"/>
+              </a:spcAft>
+              <a:buClrTx/>
+              <a:buSzTx/>
+              <a:buFontTx/>
+              <a:buNone/>
+              <a:defRPr/>
+            </a:pPr>
+            <a:endParaRPr kumimoji="0" lang="en-US" sz="1800" b="0" i="0" u="none" strike="noStrike" kern="0" cap="none" spc="0" normalizeH="0" baseline="0" dirty="0">
+              <a:ln>
+                <a:noFill/>
+              </a:ln>
+              <a:solidFill>
+                <a:sysClr val="windowText" lastClr="000000"/>
+              </a:solidFill>
+              <a:effectLst/>
+              <a:uLnTx/>
+              <a:uFillTx/>
+            </a:endParaRPr>
+          </a:p>
+        </p:txBody>
+      </p:sp>
+      <p:sp>
+        <p:nvSpPr>
+          <p:cNvPr id="46" name="Rectangle 45"/>
+          <p:cNvSpPr/>
+          <p:nvPr/>
+        </p:nvSpPr>
+        <p:spPr>
+          <a:xfrm flipH="1">
+            <a:off x="7911255" y="4253573"/>
+            <a:ext cx="2995659" cy="704078"/>
+          </a:xfrm>
+          <a:prstGeom prst="rect">
+            <a:avLst/>
+          </a:prstGeom>
+          <a:solidFill>
+            <a:schemeClr val="bg2"/>
+          </a:solidFill>
+          <a:ln>
+            <a:noFill/>
+          </a:ln>
+        </p:spPr>
+        <p:style>
+          <a:lnRef idx="2">
+            <a:schemeClr val="accent1">
+              <a:shade val="50000"/>
+            </a:schemeClr>
+          </a:lnRef>
+          <a:fillRef idx="1">
+            <a:schemeClr val="accent1"/>
+          </a:fillRef>
+          <a:effectRef idx="0">
+            <a:schemeClr val="accent1"/>
+          </a:effectRef>
+          <a:fontRef idx="minor">
+            <a:schemeClr val="lt1"/>
+          </a:fontRef>
+        </p:style>
+        <p:txBody>
+          <a:bodyPr rtlCol="0" anchor="ctr"/>
+          <a:lstStyle/>
+          <a:p>
+            <a:pPr lvl="0" algn="ctr">
+              <a:lnSpc>
+                <a:spcPct val="90000"/>
+              </a:lnSpc>
+            </a:pPr>
+            <a:r>
+              <a:rPr lang="en-US" sz="3600" b="1" dirty="0">
+                <a:gradFill>
+                  <a:gsLst>
+                    <a:gs pos="0">
+                      <a:srgbClr val="75D1FF">
+                        <a:lumMod val="5000"/>
+                        <a:lumOff val="95000"/>
+                      </a:srgbClr>
+                    </a:gs>
+                    <a:gs pos="100000">
+                      <a:srgbClr val="FFFFFF"/>
+                    </a:gs>
+                  </a:gsLst>
+                  <a:lin ang="5400000" scaled="1"/>
+                </a:gradFill>
+              </a:rPr>
+              <a:t>tips</a:t>
+            </a:r>
+            <a:r>
+              <a:rPr lang="en-US" sz="3600" b="1" spc="-100" dirty="0">
+                <a:gradFill>
+                  <a:gsLst>
+                    <a:gs pos="0">
+                      <a:srgbClr val="75D1FF">
+                        <a:lumMod val="5000"/>
+                        <a:lumOff val="95000"/>
+                      </a:srgbClr>
+                    </a:gs>
+                    <a:gs pos="100000">
+                      <a:srgbClr val="FFFFFF"/>
+                    </a:gs>
+                  </a:gsLst>
+                  <a:lin ang="5400000" scaled="1"/>
+                </a:gradFill>
+              </a:rPr>
+              <a:t> </a:t>
+            </a:r>
+            <a:r>
+              <a:rPr lang="en-US" sz="3600" b="1" dirty="0">
+                <a:gradFill>
+                  <a:gsLst>
+                    <a:gs pos="0">
+                      <a:srgbClr val="75D1FF">
+                        <a:lumMod val="5000"/>
+                        <a:lumOff val="95000"/>
+                      </a:srgbClr>
+                    </a:gs>
+                    <a:gs pos="100000">
+                      <a:srgbClr val="FFFFFF"/>
+                    </a:gs>
+                  </a:gsLst>
+                  <a:lin ang="5400000" scaled="1"/>
+                </a:gradFill>
+              </a:rPr>
+              <a:t>&amp; tricks</a:t>
+            </a:r>
+          </a:p>
+        </p:txBody>
+      </p:sp>
+      <p:sp>
+        <p:nvSpPr>
+          <p:cNvPr id="9" name="Title 6"/>
+          <p:cNvSpPr txBox="1"/>
+          <p:nvPr/>
+        </p:nvSpPr>
+        <p:spPr>
+          <a:xfrm>
+            <a:off x="1679957" y="3280601"/>
+            <a:ext cx="5909265" cy="874205"/>
+          </a:xfrm>
+          <a:prstGeom prst="rect">
+            <a:avLst/>
+          </a:prstGeom>
+        </p:spPr>
+        <p:txBody>
+          <a:bodyPr vert="horz" lIns="91440" tIns="0" rIns="91440" bIns="0" rtlCol="0" anchor="ctr">
+            <a:noAutofit/>
+          </a:bodyPr>
+          <a:lstStyle>
+            <a:lvl1pPr algn="ctr" defTabSz="914400" rtl="0" eaLnBrk="1" latinLnBrk="0" hangingPunct="1">
+              <a:lnSpc>
+                <a:spcPct val="90000"/>
+              </a:lnSpc>
+              <a:spcBef>
+                <a:spcPct val="0"/>
+              </a:spcBef>
+              <a:buNone/>
+              <a:defRPr lang="en-US" sz="3200" b="1" i="0" kern="1200" spc="300" dirty="0">
+                <a:solidFill>
+                  <a:schemeClr val="tx1">
+                    <a:lumMod val="85000"/>
+                    <a:lumOff val="15000"/>
+                  </a:schemeClr>
+                </a:solidFill>
+                <a:latin typeface="+mj-lt"/>
+                <a:ea typeface="+mn-ea"/>
+                <a:cs typeface="Segoe UI Semilight" panose="020B0402040204020203" pitchFamily="34" charset="0"/>
+              </a:defRPr>
+            </a:lvl1pPr>
+          </a:lstStyle>
+          <a:p>
+            <a:endParaRPr lang="en-US" sz="8800" spc="-300" dirty="0">
+              <a:gradFill>
+                <a:gsLst>
+                  <a:gs pos="0">
+                    <a:schemeClr val="accent1">
+                      <a:lumMod val="5000"/>
+                      <a:lumOff val="95000"/>
+                    </a:schemeClr>
+                  </a:gs>
+                  <a:gs pos="100000">
+                    <a:schemeClr val="bg1"/>
+                  </a:gs>
+                </a:gsLst>
+                <a:lin ang="5400000" scaled="1"/>
+              </a:gradFill>
+              <a:latin typeface="+mn-lt"/>
+            </a:endParaRPr>
+          </a:p>
+        </p:txBody>
+      </p:sp>
+      <p:sp>
+        <p:nvSpPr>
+          <p:cNvPr id="7" name="Title 6"/>
+          <p:cNvSpPr>
+            <a:spLocks noGrp="1"/>
+          </p:cNvSpPr>
+          <p:nvPr>
+            <p:ph type="ctrTitle"/>
+          </p:nvPr>
+        </p:nvSpPr>
+        <p:spPr>
+          <a:xfrm>
+            <a:off x="687847" y="2461199"/>
+            <a:ext cx="8804365" cy="2336024"/>
+          </a:xfrm>
+        </p:spPr>
+        <p:txBody>
+          <a:bodyPr/>
+          <a:lstStyle/>
+          <a:p>
+            <a:r>
+              <a:rPr lang="en-US" sz="5400" dirty="0"/>
+              <a:t>How to Replace Value with a value from Another Column?</a:t>
+            </a:r>
+          </a:p>
+        </p:txBody>
+      </p:sp>
+      <p:sp>
+        <p:nvSpPr>
+          <p:cNvPr id="19" name="Freeform: Shape 18"/>
+          <p:cNvSpPr/>
+          <p:nvPr/>
+        </p:nvSpPr>
+        <p:spPr>
+          <a:xfrm>
+            <a:off x="7066536" y="4361548"/>
+            <a:ext cx="488128" cy="488128"/>
+          </a:xfrm>
+          <a:custGeom>
+            <a:avLst/>
+            <a:gdLst>
+              <a:gd name="connsiteX0" fmla="*/ 244064 w 488128"/>
+              <a:gd name="connsiteY0" fmla="*/ 0 h 488128"/>
+              <a:gd name="connsiteX1" fmla="*/ 488128 w 488128"/>
+              <a:gd name="connsiteY1" fmla="*/ 244064 h 488128"/>
+              <a:gd name="connsiteX2" fmla="*/ 244064 w 488128"/>
+              <a:gd name="connsiteY2" fmla="*/ 488128 h 488128"/>
+              <a:gd name="connsiteX3" fmla="*/ 0 w 488128"/>
+              <a:gd name="connsiteY3" fmla="*/ 244064 h 488128"/>
+              <a:gd name="connsiteX4" fmla="*/ 244064 w 488128"/>
+              <a:gd name="connsiteY4" fmla="*/ 0 h 488128"/>
+            </a:gdLst>
+            <a:ahLst/>
+            <a:cxnLst>
+              <a:cxn ang="0">
+                <a:pos x="connsiteX0" y="connsiteY0"/>
+              </a:cxn>
+              <a:cxn ang="0">
+                <a:pos x="connsiteX1" y="connsiteY1"/>
+              </a:cxn>
+              <a:cxn ang="0">
+                <a:pos x="connsiteX2" y="connsiteY2"/>
+              </a:cxn>
+              <a:cxn ang="0">
+                <a:pos x="connsiteX3" y="connsiteY3"/>
+              </a:cxn>
+              <a:cxn ang="0">
+                <a:pos x="connsiteX4" y="connsiteY4"/>
+              </a:cxn>
+            </a:cxnLst>
+            <a:rect l="l" t="t" r="r" b="b"/>
+            <a:pathLst>
+              <a:path w="488128" h="488128">
+                <a:moveTo>
+                  <a:pt x="244064" y="0"/>
+                </a:moveTo>
+                <a:cubicBezTo>
+                  <a:pt x="378857" y="0"/>
+                  <a:pt x="488128" y="109271"/>
+                  <a:pt x="488128" y="244064"/>
+                </a:cubicBezTo>
+                <a:cubicBezTo>
+                  <a:pt x="488128" y="378857"/>
+                  <a:pt x="378857" y="488128"/>
+                  <a:pt x="244064" y="488128"/>
+                </a:cubicBezTo>
+                <a:cubicBezTo>
+                  <a:pt x="109271" y="488128"/>
+                  <a:pt x="0" y="378857"/>
+                  <a:pt x="0" y="244064"/>
+                </a:cubicBezTo>
+                <a:cubicBezTo>
+                  <a:pt x="0" y="109271"/>
+                  <a:pt x="109271" y="0"/>
+                  <a:pt x="244064" y="0"/>
+                </a:cubicBezTo>
+                <a:close/>
+              </a:path>
+            </a:pathLst>
+          </a:custGeom>
+          <a:solidFill>
+            <a:schemeClr val="accent4"/>
+          </a:solidFill>
+          <a:ln>
+            <a:noFill/>
+          </a:ln>
+        </p:spPr>
+        <p:style>
+          <a:lnRef idx="2">
+            <a:schemeClr val="accent1">
+              <a:shade val="50000"/>
+            </a:schemeClr>
+          </a:lnRef>
+          <a:fillRef idx="1">
+            <a:schemeClr val="accent1"/>
+          </a:fillRef>
+          <a:effectRef idx="0">
+            <a:schemeClr val="accent1"/>
+          </a:effectRef>
+          <a:fontRef idx="minor">
+            <a:schemeClr val="lt1"/>
+          </a:fontRef>
+        </p:style>
+        <p:txBody>
+          <a:bodyPr wrap="square" rtlCol="0" anchor="ctr">
+            <a:noAutofit/>
+          </a:bodyPr>
+          <a:lstStyle/>
+          <a:p>
+            <a:pPr marL="0" marR="0" lvl="0" indent="0" algn="ctr" defTabSz="914400" eaLnBrk="1" fontAlgn="auto" latinLnBrk="0" hangingPunct="1">
+              <a:lnSpc>
+                <a:spcPct val="100000"/>
+              </a:lnSpc>
+              <a:spcBef>
+                <a:spcPts val="0"/>
+              </a:spcBef>
+              <a:spcAft>
+                <a:spcPts val="0"/>
+              </a:spcAft>
+              <a:buClrTx/>
+              <a:buSzTx/>
+              <a:buFontTx/>
+              <a:buNone/>
+              <a:defRPr/>
+            </a:pPr>
+            <a:endParaRPr kumimoji="0" lang="en-US" sz="1800" b="0" i="0" u="none" strike="noStrike" kern="0" cap="none" spc="0" normalizeH="0" baseline="0" dirty="0">
+              <a:ln>
+                <a:noFill/>
+              </a:ln>
+              <a:solidFill>
+                <a:sysClr val="windowText" lastClr="000000"/>
+              </a:solidFill>
+              <a:effectLst/>
+              <a:uLnTx/>
+              <a:uFillTx/>
+            </a:endParaRPr>
+          </a:p>
+        </p:txBody>
+      </p:sp>
+      <p:sp>
+        <p:nvSpPr>
+          <p:cNvPr id="3" name="Slide Number Placeholder 2"/>
+          <p:cNvSpPr>
+            <a:spLocks noGrp="1"/>
+          </p:cNvSpPr>
+          <p:nvPr>
+            <p:ph type="sldNum" sz="quarter" idx="12"/>
+          </p:nvPr>
+        </p:nvSpPr>
+        <p:spPr/>
+        <p:txBody>
+          <a:bodyPr/>
+          <a:lstStyle/>
+          <a:p>
+            <a:fld id="{5AE1514C-5E56-4738-A1FF-4B1CFD2A3E36}" type="slidenum">
+              <a:rPr lang="en-US" smtClean="0"/>
+              <a:t>14</a:t>
+            </a:fld>
+            <a:endParaRPr lang="en-US" dirty="0"/>
+          </a:p>
+        </p:txBody>
+      </p:sp>
+      <p:pic>
+        <p:nvPicPr>
+          <p:cNvPr id="13" name="Picture 12"/>
+          <p:cNvPicPr>
+            <a:picLocks noChangeAspect="1"/>
+          </p:cNvPicPr>
+          <p:nvPr/>
+        </p:nvPicPr>
+        <p:blipFill>
+          <a:blip r:embed="rId4"/>
+          <a:stretch>
+            <a:fillRect/>
+          </a:stretch>
+        </p:blipFill>
+        <p:spPr>
+          <a:xfrm>
+            <a:off x="5529135" y="866999"/>
+            <a:ext cx="6044675" cy="1594200"/>
+          </a:xfrm>
+          <a:prstGeom prst="rect">
+            <a:avLst/>
+          </a:prstGeom>
+          <a:ln>
+            <a:noFill/>
+          </a:ln>
+          <a:effectLst>
+            <a:softEdge rad="112500"/>
+          </a:effectLst>
+        </p:spPr>
+      </p:pic>
+      <p:pic>
+        <p:nvPicPr>
+          <p:cNvPr id="2" name="Picture 1">
+            <a:extLst>
+              <a:ext uri="{FF2B5EF4-FFF2-40B4-BE49-F238E27FC236}">
+                <a16:creationId xmlns:a16="http://schemas.microsoft.com/office/drawing/2014/main" id="{A8EE87C8-5113-FA70-30A2-398F3F3F3814}"/>
+              </a:ext>
+            </a:extLst>
+          </p:cNvPr>
+          <p:cNvPicPr>
+            <a:picLocks noChangeAspect="1"/>
+          </p:cNvPicPr>
+          <p:nvPr/>
+        </p:nvPicPr>
+        <p:blipFill>
+          <a:blip r:embed="rId5"/>
+          <a:stretch>
+            <a:fillRect/>
+          </a:stretch>
+        </p:blipFill>
+        <p:spPr>
+          <a:xfrm>
+            <a:off x="152004" y="6172747"/>
+            <a:ext cx="2810500" cy="585267"/>
+          </a:xfrm>
+          <a:prstGeom prst="rect">
+            <a:avLst/>
+          </a:prstGeom>
+        </p:spPr>
+      </p:pic>
+    </p:spTree>
+    <p:extLst>
+      <p:ext uri="{BB962C8B-B14F-4D97-AF65-F5344CB8AC3E}">
+        <p14:creationId xmlns:p14="http://schemas.microsoft.com/office/powerpoint/2010/main" val="3661789876"/>
+      </p:ext>
+    </p:extLst>
+  </p:cSld>
+  <p:clrMapOvr>
+    <a:masterClrMapping/>
+  </p:clrMapOvr>
+  <mc:AlternateContent xmlns:mc="http://schemas.openxmlformats.org/markup-compatibility/2006" xmlns:p14="http://schemas.microsoft.com/office/powerpoint/2010/main">
+    <mc:Choice Requires="p14">
+      <p:transition spd="med" p14:dur="700">
+        <p:fade/>
+      </p:transition>
+    </mc:Choice>
+    <mc:Fallback xmlns="">
+      <p:transition spd="med">
+        <p:fade/>
+      </p:transition>
+    </mc:Fallback>
+  </mc:AlternateContent>
+  <p:timing>
+    <p:tnLst>
+      <p:par>
+        <p:cTn id="1" dur="indefinite" restart="never" nodeType="tmRoot">
+          <p:childTnLst>
+            <p:seq concurrent="1" nextAc="seek">
+              <p:cTn id="2" dur="indefinite" nodeType="mainSeq">
+                <p:childTnLst>
+                  <p:par>
+                    <p:cTn id="3" fill="hold">
+                      <p:stCondLst>
+                        <p:cond delay="indefinite"/>
+                        <p:cond evt="onBegin" delay="0">
+                          <p:tn val="2"/>
+                        </p:cond>
+                      </p:stCondLst>
+                      <p:childTnLst>
+                        <p:par>
+                          <p:cTn id="4" fill="hold">
+                            <p:stCondLst>
+                              <p:cond delay="0"/>
+                            </p:stCondLst>
+                            <p:childTnLst>
+                              <p:par>
+                                <p:cTn id="5" presetID="53" presetClass="entr" presetSubtype="16" fill="hold" grpId="0" nodeType="withEffect">
+                                  <p:stCondLst>
+                                    <p:cond delay="0"/>
+                                  </p:stCondLst>
+                                  <p:childTnLst>
+                                    <p:set>
+                                      <p:cBhvr>
+                                        <p:cTn id="6" dur="1" fill="hold">
+                                          <p:stCondLst>
+                                            <p:cond delay="0"/>
+                                          </p:stCondLst>
+                                        </p:cTn>
+                                        <p:tgtEl>
+                                          <p:spTgt spid="14"/>
+                                        </p:tgtEl>
+                                        <p:attrNameLst>
+                                          <p:attrName>style.visibility</p:attrName>
+                                        </p:attrNameLst>
+                                      </p:cBhvr>
+                                      <p:to>
+                                        <p:strVal val="visible"/>
+                                      </p:to>
+                                    </p:set>
+                                    <p:anim calcmode="lin" valueType="num">
+                                      <p:cBhvr>
+                                        <p:cTn id="7" dur="500" fill="hold"/>
+                                        <p:tgtEl>
+                                          <p:spTgt spid="14"/>
+                                        </p:tgtEl>
+                                        <p:attrNameLst>
+                                          <p:attrName>ppt_w</p:attrName>
+                                        </p:attrNameLst>
+                                      </p:cBhvr>
+                                      <p:tavLst>
+                                        <p:tav tm="0">
+                                          <p:val>
+                                            <p:fltVal val="0"/>
+                                          </p:val>
+                                        </p:tav>
+                                        <p:tav tm="100000">
+                                          <p:val>
+                                            <p:strVal val="#ppt_w"/>
+                                          </p:val>
+                                        </p:tav>
+                                      </p:tavLst>
+                                    </p:anim>
+                                    <p:anim calcmode="lin" valueType="num">
+                                      <p:cBhvr>
+                                        <p:cTn id="8" dur="500" fill="hold"/>
+                                        <p:tgtEl>
+                                          <p:spTgt spid="14"/>
+                                        </p:tgtEl>
+                                        <p:attrNameLst>
+                                          <p:attrName>ppt_h</p:attrName>
+                                        </p:attrNameLst>
+                                      </p:cBhvr>
+                                      <p:tavLst>
+                                        <p:tav tm="0">
+                                          <p:val>
+                                            <p:fltVal val="0"/>
+                                          </p:val>
+                                        </p:tav>
+                                        <p:tav tm="100000">
+                                          <p:val>
+                                            <p:strVal val="#ppt_h"/>
+                                          </p:val>
+                                        </p:tav>
+                                      </p:tavLst>
+                                    </p:anim>
+                                    <p:animEffect transition="in" filter="fade">
+                                      <p:cBhvr>
+                                        <p:cTn id="9" dur="500"/>
+                                        <p:tgtEl>
+                                          <p:spTgt spid="14"/>
+                                        </p:tgtEl>
+                                      </p:cBhvr>
+                                    </p:animEffect>
+                                  </p:childTnLst>
+                                </p:cTn>
+                              </p:par>
+                              <p:par>
+                                <p:cTn id="10" presetID="10" presetClass="exit" presetSubtype="0" fill="hold" grpId="1" nodeType="withEffect">
+                                  <p:stCondLst>
+                                    <p:cond delay="250"/>
+                                  </p:stCondLst>
+                                  <p:childTnLst>
+                                    <p:animEffect transition="out" filter="fade">
+                                      <p:cBhvr>
+                                        <p:cTn id="11" dur="500"/>
+                                        <p:tgtEl>
+                                          <p:spTgt spid="14"/>
+                                        </p:tgtEl>
+                                      </p:cBhvr>
+                                    </p:animEffect>
+                                    <p:set>
+                                      <p:cBhvr>
+                                        <p:cTn id="12" dur="1" fill="hold">
+                                          <p:stCondLst>
+                                            <p:cond delay="499"/>
+                                          </p:stCondLst>
+                                        </p:cTn>
+                                        <p:tgtEl>
+                                          <p:spTgt spid="14"/>
+                                        </p:tgtEl>
+                                        <p:attrNameLst>
+                                          <p:attrName>style.visibility</p:attrName>
+                                        </p:attrNameLst>
+                                      </p:cBhvr>
+                                      <p:to>
+                                        <p:strVal val="hidden"/>
+                                      </p:to>
+                                    </p:set>
+                                  </p:childTnLst>
+                                </p:cTn>
+                              </p:par>
+                              <p:par>
+                                <p:cTn id="13" presetID="53" presetClass="entr" presetSubtype="16" fill="hold" grpId="0" nodeType="withEffect">
+                                  <p:stCondLst>
+                                    <p:cond delay="250"/>
+                                  </p:stCondLst>
+                                  <p:childTnLst>
+                                    <p:set>
+                                      <p:cBhvr>
+                                        <p:cTn id="14" dur="1" fill="hold">
+                                          <p:stCondLst>
+                                            <p:cond delay="0"/>
+                                          </p:stCondLst>
+                                        </p:cTn>
+                                        <p:tgtEl>
+                                          <p:spTgt spid="15"/>
+                                        </p:tgtEl>
+                                        <p:attrNameLst>
+                                          <p:attrName>style.visibility</p:attrName>
+                                        </p:attrNameLst>
+                                      </p:cBhvr>
+                                      <p:to>
+                                        <p:strVal val="visible"/>
+                                      </p:to>
+                                    </p:set>
+                                    <p:anim calcmode="lin" valueType="num">
+                                      <p:cBhvr>
+                                        <p:cTn id="15" dur="500" fill="hold"/>
+                                        <p:tgtEl>
+                                          <p:spTgt spid="15"/>
+                                        </p:tgtEl>
+                                        <p:attrNameLst>
+                                          <p:attrName>ppt_w</p:attrName>
+                                        </p:attrNameLst>
+                                      </p:cBhvr>
+                                      <p:tavLst>
+                                        <p:tav tm="0">
+                                          <p:val>
+                                            <p:fltVal val="0"/>
+                                          </p:val>
+                                        </p:tav>
+                                        <p:tav tm="100000">
+                                          <p:val>
+                                            <p:strVal val="#ppt_w"/>
+                                          </p:val>
+                                        </p:tav>
+                                      </p:tavLst>
+                                    </p:anim>
+                                    <p:anim calcmode="lin" valueType="num">
+                                      <p:cBhvr>
+                                        <p:cTn id="16" dur="500" fill="hold"/>
+                                        <p:tgtEl>
+                                          <p:spTgt spid="15"/>
+                                        </p:tgtEl>
+                                        <p:attrNameLst>
+                                          <p:attrName>ppt_h</p:attrName>
+                                        </p:attrNameLst>
+                                      </p:cBhvr>
+                                      <p:tavLst>
+                                        <p:tav tm="0">
+                                          <p:val>
+                                            <p:fltVal val="0"/>
+                                          </p:val>
+                                        </p:tav>
+                                        <p:tav tm="100000">
+                                          <p:val>
+                                            <p:strVal val="#ppt_h"/>
+                                          </p:val>
+                                        </p:tav>
+                                      </p:tavLst>
+                                    </p:anim>
+                                    <p:animEffect transition="in" filter="fade">
+                                      <p:cBhvr>
+                                        <p:cTn id="17" dur="500"/>
+                                        <p:tgtEl>
+                                          <p:spTgt spid="15"/>
+                                        </p:tgtEl>
+                                      </p:cBhvr>
+                                    </p:animEffect>
+                                  </p:childTnLst>
+                                </p:cTn>
+                              </p:par>
+                              <p:par>
+                                <p:cTn id="18" presetID="10" presetClass="exit" presetSubtype="0" fill="hold" grpId="1" nodeType="withEffect">
+                                  <p:stCondLst>
+                                    <p:cond delay="500"/>
+                                  </p:stCondLst>
+                                  <p:childTnLst>
+                                    <p:animEffect transition="out" filter="fade">
+                                      <p:cBhvr>
+                                        <p:cTn id="19" dur="500"/>
+                                        <p:tgtEl>
+                                          <p:spTgt spid="15"/>
+                                        </p:tgtEl>
+                                      </p:cBhvr>
+                                    </p:animEffect>
+                                    <p:set>
+                                      <p:cBhvr>
+                                        <p:cTn id="20" dur="1" fill="hold">
+                                          <p:stCondLst>
+                                            <p:cond delay="499"/>
+                                          </p:stCondLst>
+                                        </p:cTn>
+                                        <p:tgtEl>
+                                          <p:spTgt spid="15"/>
+                                        </p:tgtEl>
+                                        <p:attrNameLst>
+                                          <p:attrName>style.visibility</p:attrName>
+                                        </p:attrNameLst>
+                                      </p:cBhvr>
+                                      <p:to>
+                                        <p:strVal val="hidden"/>
+                                      </p:to>
+                                    </p:set>
+                                  </p:childTnLst>
+                                </p:cTn>
+                              </p:par>
+                              <p:par>
+                                <p:cTn id="21" presetID="53" presetClass="entr" presetSubtype="16" fill="hold" grpId="0" nodeType="withEffect">
+                                  <p:stCondLst>
+                                    <p:cond delay="500"/>
+                                  </p:stCondLst>
+                                  <p:childTnLst>
+                                    <p:set>
+                                      <p:cBhvr>
+                                        <p:cTn id="22" dur="1" fill="hold">
+                                          <p:stCondLst>
+                                            <p:cond delay="0"/>
+                                          </p:stCondLst>
+                                        </p:cTn>
+                                        <p:tgtEl>
+                                          <p:spTgt spid="16"/>
+                                        </p:tgtEl>
+                                        <p:attrNameLst>
+                                          <p:attrName>style.visibility</p:attrName>
+                                        </p:attrNameLst>
+                                      </p:cBhvr>
+                                      <p:to>
+                                        <p:strVal val="visible"/>
+                                      </p:to>
+                                    </p:set>
+                                    <p:anim calcmode="lin" valueType="num">
+                                      <p:cBhvr>
+                                        <p:cTn id="23" dur="500" fill="hold"/>
+                                        <p:tgtEl>
+                                          <p:spTgt spid="16"/>
+                                        </p:tgtEl>
+                                        <p:attrNameLst>
+                                          <p:attrName>ppt_w</p:attrName>
+                                        </p:attrNameLst>
+                                      </p:cBhvr>
+                                      <p:tavLst>
+                                        <p:tav tm="0">
+                                          <p:val>
+                                            <p:fltVal val="0"/>
+                                          </p:val>
+                                        </p:tav>
+                                        <p:tav tm="100000">
+                                          <p:val>
+                                            <p:strVal val="#ppt_w"/>
+                                          </p:val>
+                                        </p:tav>
+                                      </p:tavLst>
+                                    </p:anim>
+                                    <p:anim calcmode="lin" valueType="num">
+                                      <p:cBhvr>
+                                        <p:cTn id="24" dur="500" fill="hold"/>
+                                        <p:tgtEl>
+                                          <p:spTgt spid="16"/>
+                                        </p:tgtEl>
+                                        <p:attrNameLst>
+                                          <p:attrName>ppt_h</p:attrName>
+                                        </p:attrNameLst>
+                                      </p:cBhvr>
+                                      <p:tavLst>
+                                        <p:tav tm="0">
+                                          <p:val>
+                                            <p:fltVal val="0"/>
+                                          </p:val>
+                                        </p:tav>
+                                        <p:tav tm="100000">
+                                          <p:val>
+                                            <p:strVal val="#ppt_h"/>
+                                          </p:val>
+                                        </p:tav>
+                                      </p:tavLst>
+                                    </p:anim>
+                                    <p:animEffect transition="in" filter="fade">
+                                      <p:cBhvr>
+                                        <p:cTn id="25" dur="500"/>
+                                        <p:tgtEl>
+                                          <p:spTgt spid="16"/>
+                                        </p:tgtEl>
+                                      </p:cBhvr>
+                                    </p:animEffect>
+                                  </p:childTnLst>
+                                </p:cTn>
+                              </p:par>
+                              <p:par>
+                                <p:cTn id="26" presetID="10" presetClass="exit" presetSubtype="0" fill="hold" grpId="1" nodeType="withEffect">
+                                  <p:stCondLst>
+                                    <p:cond delay="750"/>
+                                  </p:stCondLst>
+                                  <p:childTnLst>
+                                    <p:animEffect transition="out" filter="fade">
+                                      <p:cBhvr>
+                                        <p:cTn id="27" dur="500"/>
+                                        <p:tgtEl>
+                                          <p:spTgt spid="16"/>
+                                        </p:tgtEl>
+                                      </p:cBhvr>
+                                    </p:animEffect>
+                                    <p:set>
+                                      <p:cBhvr>
+                                        <p:cTn id="28" dur="1" fill="hold">
+                                          <p:stCondLst>
+                                            <p:cond delay="499"/>
+                                          </p:stCondLst>
+                                        </p:cTn>
+                                        <p:tgtEl>
+                                          <p:spTgt spid="16"/>
+                                        </p:tgtEl>
+                                        <p:attrNameLst>
+                                          <p:attrName>style.visibility</p:attrName>
+                                        </p:attrNameLst>
+                                      </p:cBhvr>
+                                      <p:to>
+                                        <p:strVal val="hidden"/>
+                                      </p:to>
+                                    </p:set>
+                                  </p:childTnLst>
+                                </p:cTn>
+                              </p:par>
+                              <p:par>
+                                <p:cTn id="29" presetID="53" presetClass="entr" presetSubtype="16" fill="hold" grpId="0" nodeType="withEffect">
+                                  <p:stCondLst>
+                                    <p:cond delay="0"/>
+                                  </p:stCondLst>
+                                  <p:childTnLst>
+                                    <p:set>
+                                      <p:cBhvr>
+                                        <p:cTn id="30" dur="1" fill="hold">
+                                          <p:stCondLst>
+                                            <p:cond delay="0"/>
+                                          </p:stCondLst>
+                                        </p:cTn>
+                                        <p:tgtEl>
+                                          <p:spTgt spid="10"/>
+                                        </p:tgtEl>
+                                        <p:attrNameLst>
+                                          <p:attrName>style.visibility</p:attrName>
+                                        </p:attrNameLst>
+                                      </p:cBhvr>
+                                      <p:to>
+                                        <p:strVal val="visible"/>
+                                      </p:to>
+                                    </p:set>
+                                    <p:anim calcmode="lin" valueType="num">
+                                      <p:cBhvr>
+                                        <p:cTn id="31" dur="500" fill="hold"/>
+                                        <p:tgtEl>
+                                          <p:spTgt spid="10"/>
+                                        </p:tgtEl>
+                                        <p:attrNameLst>
+                                          <p:attrName>ppt_w</p:attrName>
+                                        </p:attrNameLst>
+                                      </p:cBhvr>
+                                      <p:tavLst>
+                                        <p:tav tm="0">
+                                          <p:val>
+                                            <p:fltVal val="0"/>
+                                          </p:val>
+                                        </p:tav>
+                                        <p:tav tm="100000">
+                                          <p:val>
+                                            <p:strVal val="#ppt_w"/>
+                                          </p:val>
+                                        </p:tav>
+                                      </p:tavLst>
+                                    </p:anim>
+                                    <p:anim calcmode="lin" valueType="num">
+                                      <p:cBhvr>
+                                        <p:cTn id="32" dur="500" fill="hold"/>
+                                        <p:tgtEl>
+                                          <p:spTgt spid="10"/>
+                                        </p:tgtEl>
+                                        <p:attrNameLst>
+                                          <p:attrName>ppt_h</p:attrName>
+                                        </p:attrNameLst>
+                                      </p:cBhvr>
+                                      <p:tavLst>
+                                        <p:tav tm="0">
+                                          <p:val>
+                                            <p:fltVal val="0"/>
+                                          </p:val>
+                                        </p:tav>
+                                        <p:tav tm="100000">
+                                          <p:val>
+                                            <p:strVal val="#ppt_h"/>
+                                          </p:val>
+                                        </p:tav>
+                                      </p:tavLst>
+                                    </p:anim>
+                                    <p:animEffect transition="in" filter="fade">
+                                      <p:cBhvr>
+                                        <p:cTn id="33" dur="500"/>
+                                        <p:tgtEl>
+                                          <p:spTgt spid="10"/>
+                                        </p:tgtEl>
+                                      </p:cBhvr>
+                                    </p:animEffect>
+                                  </p:childTnLst>
+                                </p:cTn>
+                              </p:par>
+                              <p:par>
+                                <p:cTn id="34" presetID="10" presetClass="exit" presetSubtype="0" fill="hold" grpId="1" nodeType="withEffect">
+                                  <p:stCondLst>
+                                    <p:cond delay="250"/>
+                                  </p:stCondLst>
+                                  <p:childTnLst>
+                                    <p:animEffect transition="out" filter="fade">
+                                      <p:cBhvr>
+                                        <p:cTn id="35" dur="500"/>
+                                        <p:tgtEl>
+                                          <p:spTgt spid="10"/>
+                                        </p:tgtEl>
+                                      </p:cBhvr>
+                                    </p:animEffect>
+                                    <p:set>
+                                      <p:cBhvr>
+                                        <p:cTn id="36" dur="1" fill="hold">
+                                          <p:stCondLst>
+                                            <p:cond delay="499"/>
+                                          </p:stCondLst>
+                                        </p:cTn>
+                                        <p:tgtEl>
+                                          <p:spTgt spid="10"/>
+                                        </p:tgtEl>
+                                        <p:attrNameLst>
+                                          <p:attrName>style.visibility</p:attrName>
+                                        </p:attrNameLst>
+                                      </p:cBhvr>
+                                      <p:to>
+                                        <p:strVal val="hidden"/>
+                                      </p:to>
+                                    </p:set>
+                                  </p:childTnLst>
+                                </p:cTn>
+                              </p:par>
+                              <p:par>
+                                <p:cTn id="37" presetID="53" presetClass="entr" presetSubtype="16" fill="hold" grpId="0" nodeType="withEffect">
+                                  <p:stCondLst>
+                                    <p:cond delay="250"/>
+                                  </p:stCondLst>
+                                  <p:childTnLst>
+                                    <p:set>
+                                      <p:cBhvr>
+                                        <p:cTn id="38" dur="1" fill="hold">
+                                          <p:stCondLst>
+                                            <p:cond delay="0"/>
+                                          </p:stCondLst>
+                                        </p:cTn>
+                                        <p:tgtEl>
+                                          <p:spTgt spid="11"/>
+                                        </p:tgtEl>
+                                        <p:attrNameLst>
+                                          <p:attrName>style.visibility</p:attrName>
+                                        </p:attrNameLst>
+                                      </p:cBhvr>
+                                      <p:to>
+                                        <p:strVal val="visible"/>
+                                      </p:to>
+                                    </p:set>
+                                    <p:anim calcmode="lin" valueType="num">
+                                      <p:cBhvr>
+                                        <p:cTn id="39" dur="500" fill="hold"/>
+                                        <p:tgtEl>
+                                          <p:spTgt spid="11"/>
+                                        </p:tgtEl>
+                                        <p:attrNameLst>
+                                          <p:attrName>ppt_w</p:attrName>
+                                        </p:attrNameLst>
+                                      </p:cBhvr>
+                                      <p:tavLst>
+                                        <p:tav tm="0">
+                                          <p:val>
+                                            <p:fltVal val="0"/>
+                                          </p:val>
+                                        </p:tav>
+                                        <p:tav tm="100000">
+                                          <p:val>
+                                            <p:strVal val="#ppt_w"/>
+                                          </p:val>
+                                        </p:tav>
+                                      </p:tavLst>
+                                    </p:anim>
+                                    <p:anim calcmode="lin" valueType="num">
+                                      <p:cBhvr>
+                                        <p:cTn id="40" dur="500" fill="hold"/>
+                                        <p:tgtEl>
+                                          <p:spTgt spid="11"/>
+                                        </p:tgtEl>
+                                        <p:attrNameLst>
+                                          <p:attrName>ppt_h</p:attrName>
+                                        </p:attrNameLst>
+                                      </p:cBhvr>
+                                      <p:tavLst>
+                                        <p:tav tm="0">
+                                          <p:val>
+                                            <p:fltVal val="0"/>
+                                          </p:val>
+                                        </p:tav>
+                                        <p:tav tm="100000">
+                                          <p:val>
+                                            <p:strVal val="#ppt_h"/>
+                                          </p:val>
+                                        </p:tav>
+                                      </p:tavLst>
+                                    </p:anim>
+                                    <p:animEffect transition="in" filter="fade">
+                                      <p:cBhvr>
+                                        <p:cTn id="41" dur="500"/>
+                                        <p:tgtEl>
+                                          <p:spTgt spid="11"/>
+                                        </p:tgtEl>
+                                      </p:cBhvr>
+                                    </p:animEffect>
+                                  </p:childTnLst>
+                                </p:cTn>
+                              </p:par>
+                              <p:par>
+                                <p:cTn id="42" presetID="10" presetClass="exit" presetSubtype="0" fill="hold" grpId="1" nodeType="withEffect">
+                                  <p:stCondLst>
+                                    <p:cond delay="500"/>
+                                  </p:stCondLst>
+                                  <p:childTnLst>
+                                    <p:animEffect transition="out" filter="fade">
+                                      <p:cBhvr>
+                                        <p:cTn id="43" dur="500"/>
+                                        <p:tgtEl>
+                                          <p:spTgt spid="11"/>
+                                        </p:tgtEl>
+                                      </p:cBhvr>
+                                    </p:animEffect>
+                                    <p:set>
+                                      <p:cBhvr>
+                                        <p:cTn id="44" dur="1" fill="hold">
+                                          <p:stCondLst>
+                                            <p:cond delay="499"/>
+                                          </p:stCondLst>
+                                        </p:cTn>
+                                        <p:tgtEl>
+                                          <p:spTgt spid="11"/>
+                                        </p:tgtEl>
+                                        <p:attrNameLst>
+                                          <p:attrName>style.visibility</p:attrName>
+                                        </p:attrNameLst>
+                                      </p:cBhvr>
+                                      <p:to>
+                                        <p:strVal val="hidden"/>
+                                      </p:to>
+                                    </p:set>
+                                  </p:childTnLst>
+                                </p:cTn>
+                              </p:par>
+                              <p:par>
+                                <p:cTn id="45" presetID="53" presetClass="entr" presetSubtype="16" fill="hold" grpId="0" nodeType="withEffect">
+                                  <p:stCondLst>
+                                    <p:cond delay="500"/>
+                                  </p:stCondLst>
+                                  <p:childTnLst>
+                                    <p:set>
+                                      <p:cBhvr>
+                                        <p:cTn id="46" dur="1" fill="hold">
+                                          <p:stCondLst>
+                                            <p:cond delay="0"/>
+                                          </p:stCondLst>
+                                        </p:cTn>
+                                        <p:tgtEl>
+                                          <p:spTgt spid="12"/>
+                                        </p:tgtEl>
+                                        <p:attrNameLst>
+                                          <p:attrName>style.visibility</p:attrName>
+                                        </p:attrNameLst>
+                                      </p:cBhvr>
+                                      <p:to>
+                                        <p:strVal val="visible"/>
+                                      </p:to>
+                                    </p:set>
+                                    <p:anim calcmode="lin" valueType="num">
+                                      <p:cBhvr>
+                                        <p:cTn id="47" dur="500" fill="hold"/>
+                                        <p:tgtEl>
+                                          <p:spTgt spid="12"/>
+                                        </p:tgtEl>
+                                        <p:attrNameLst>
+                                          <p:attrName>ppt_w</p:attrName>
+                                        </p:attrNameLst>
+                                      </p:cBhvr>
+                                      <p:tavLst>
+                                        <p:tav tm="0">
+                                          <p:val>
+                                            <p:fltVal val="0"/>
+                                          </p:val>
+                                        </p:tav>
+                                        <p:tav tm="100000">
+                                          <p:val>
+                                            <p:strVal val="#ppt_w"/>
+                                          </p:val>
+                                        </p:tav>
+                                      </p:tavLst>
+                                    </p:anim>
+                                    <p:anim calcmode="lin" valueType="num">
+                                      <p:cBhvr>
+                                        <p:cTn id="48" dur="500" fill="hold"/>
+                                        <p:tgtEl>
+                                          <p:spTgt spid="12"/>
+                                        </p:tgtEl>
+                                        <p:attrNameLst>
+                                          <p:attrName>ppt_h</p:attrName>
+                                        </p:attrNameLst>
+                                      </p:cBhvr>
+                                      <p:tavLst>
+                                        <p:tav tm="0">
+                                          <p:val>
+                                            <p:fltVal val="0"/>
+                                          </p:val>
+                                        </p:tav>
+                                        <p:tav tm="100000">
+                                          <p:val>
+                                            <p:strVal val="#ppt_h"/>
+                                          </p:val>
+                                        </p:tav>
+                                      </p:tavLst>
+                                    </p:anim>
+                                    <p:animEffect transition="in" filter="fade">
+                                      <p:cBhvr>
+                                        <p:cTn id="49" dur="500"/>
+                                        <p:tgtEl>
+                                          <p:spTgt spid="12"/>
+                                        </p:tgtEl>
+                                      </p:cBhvr>
+                                    </p:animEffect>
+                                  </p:childTnLst>
+                                </p:cTn>
+                              </p:par>
+                              <p:par>
+                                <p:cTn id="50" presetID="10" presetClass="exit" presetSubtype="0" fill="hold" grpId="1" nodeType="withEffect">
+                                  <p:stCondLst>
+                                    <p:cond delay="750"/>
+                                  </p:stCondLst>
+                                  <p:childTnLst>
+                                    <p:animEffect transition="out" filter="fade">
+                                      <p:cBhvr>
+                                        <p:cTn id="51" dur="500"/>
+                                        <p:tgtEl>
+                                          <p:spTgt spid="12"/>
+                                        </p:tgtEl>
+                                      </p:cBhvr>
+                                    </p:animEffect>
+                                    <p:set>
+                                      <p:cBhvr>
+                                        <p:cTn id="52" dur="1" fill="hold">
+                                          <p:stCondLst>
+                                            <p:cond delay="499"/>
+                                          </p:stCondLst>
+                                        </p:cTn>
+                                        <p:tgtEl>
+                                          <p:spTgt spid="12"/>
+                                        </p:tgtEl>
+                                        <p:attrNameLst>
+                                          <p:attrName>style.visibility</p:attrName>
+                                        </p:attrNameLst>
+                                      </p:cBhvr>
+                                      <p:to>
+                                        <p:strVal val="hidden"/>
+                                      </p:to>
+                                    </p:set>
+                                  </p:childTnLst>
+                                </p:cTn>
+                              </p:par>
+                            </p:childTnLst>
+                          </p:cTn>
+                        </p:par>
+                        <p:par>
+                          <p:cTn id="53" fill="hold">
+                            <p:stCondLst>
+                              <p:cond delay="500"/>
+                            </p:stCondLst>
+                            <p:childTnLst>
+                              <p:par>
+                                <p:cTn id="54" presetID="1" presetClass="entr" presetSubtype="0" fill="hold" grpId="0" nodeType="afterEffect">
+                                  <p:stCondLst>
+                                    <p:cond delay="0"/>
+                                  </p:stCondLst>
+                                  <p:childTnLst>
+                                    <p:set>
+                                      <p:cBhvr>
+                                        <p:cTn id="55" dur="1" fill="hold">
+                                          <p:stCondLst>
+                                            <p:cond delay="0"/>
+                                          </p:stCondLst>
+                                        </p:cTn>
+                                        <p:tgtEl>
+                                          <p:spTgt spid="19"/>
+                                        </p:tgtEl>
+                                        <p:attrNameLst>
+                                          <p:attrName>style.visibility</p:attrName>
+                                        </p:attrNameLst>
+                                      </p:cBhvr>
+                                      <p:to>
+                                        <p:strVal val="visible"/>
+                                      </p:to>
+                                    </p:set>
+                                  </p:childTnLst>
+                                </p:cTn>
+                              </p:par>
+                            </p:childTnLst>
+                          </p:cTn>
+                        </p:par>
+                        <p:par>
+                          <p:cTn id="56" fill="hold">
+                            <p:stCondLst>
+                              <p:cond delay="500"/>
+                            </p:stCondLst>
+                            <p:childTnLst>
+                              <p:par>
+                                <p:cTn id="57" presetID="2" presetClass="entr" presetSubtype="1" decel="100000" fill="hold" grpId="0" nodeType="afterEffect">
+                                  <p:stCondLst>
+                                    <p:cond delay="0"/>
+                                  </p:stCondLst>
+                                  <p:childTnLst>
+                                    <p:set>
+                                      <p:cBhvr>
+                                        <p:cTn id="58" dur="1" fill="hold">
+                                          <p:stCondLst>
+                                            <p:cond delay="0"/>
+                                          </p:stCondLst>
+                                        </p:cTn>
+                                        <p:tgtEl>
+                                          <p:spTgt spid="46"/>
+                                        </p:tgtEl>
+                                        <p:attrNameLst>
+                                          <p:attrName>style.visibility</p:attrName>
+                                        </p:attrNameLst>
+                                      </p:cBhvr>
+                                      <p:to>
+                                        <p:strVal val="visible"/>
+                                      </p:to>
+                                    </p:set>
+                                    <p:anim calcmode="lin" valueType="num">
+                                      <p:cBhvr additive="base">
+                                        <p:cTn id="59" dur="650" fill="hold"/>
+                                        <p:tgtEl>
+                                          <p:spTgt spid="46"/>
+                                        </p:tgtEl>
+                                        <p:attrNameLst>
+                                          <p:attrName>ppt_x</p:attrName>
+                                        </p:attrNameLst>
+                                      </p:cBhvr>
+                                      <p:tavLst>
+                                        <p:tav tm="0">
+                                          <p:val>
+                                            <p:strVal val="#ppt_x"/>
+                                          </p:val>
+                                        </p:tav>
+                                        <p:tav tm="100000">
+                                          <p:val>
+                                            <p:strVal val="#ppt_x"/>
+                                          </p:val>
+                                        </p:tav>
+                                      </p:tavLst>
+                                    </p:anim>
+                                    <p:anim calcmode="lin" valueType="num">
+                                      <p:cBhvr additive="base">
+                                        <p:cTn id="60" dur="650" fill="hold"/>
+                                        <p:tgtEl>
+                                          <p:spTgt spid="46"/>
+                                        </p:tgtEl>
+                                        <p:attrNameLst>
+                                          <p:attrName>ppt_y</p:attrName>
+                                        </p:attrNameLst>
+                                      </p:cBhvr>
+                                      <p:tavLst>
+                                        <p:tav tm="0">
+                                          <p:val>
+                                            <p:strVal val="0-#ppt_h/2"/>
+                                          </p:val>
+                                        </p:tav>
+                                        <p:tav tm="100000">
+                                          <p:val>
+                                            <p:strVal val="#ppt_y"/>
+                                          </p:val>
+                                        </p:tav>
+                                      </p:tavLst>
+                                    </p:anim>
+                                  </p:childTnLst>
+                                </p:cTn>
+                              </p:par>
+                            </p:childTnLst>
+                          </p:cTn>
+                        </p:par>
+                      </p:childTnLst>
+                    </p:cTn>
+                  </p:par>
+                </p:childTnLst>
+              </p:cTn>
+              <p:prevCondLst>
+                <p:cond evt="onPrev" delay="0">
+                  <p:tgtEl>
+                    <p:sldTgt/>
+                  </p:tgtEl>
+                </p:cond>
+              </p:prevCondLst>
+              <p:nextCondLst>
+                <p:cond evt="onNext" delay="0">
+                  <p:tgtEl>
+                    <p:sldTgt/>
+                  </p:tgtEl>
+                </p:cond>
+              </p:nextCondLst>
+            </p:seq>
+          </p:childTnLst>
+        </p:cTn>
+      </p:par>
+    </p:tnLst>
+    <p:bldLst>
+      <p:bldP spid="14" grpId="0" animBg="1"/>
+      <p:bldP spid="14" grpId="1" animBg="1"/>
+      <p:bldP spid="15" grpId="0" animBg="1"/>
+      <p:bldP spid="15" grpId="1" animBg="1"/>
+      <p:bldP spid="16" grpId="0" animBg="1"/>
+      <p:bldP spid="16" grpId="1" animBg="1"/>
+      <p:bldP spid="10" grpId="0" animBg="1"/>
+      <p:bldP spid="10" grpId="1" animBg="1"/>
+      <p:bldP spid="11" grpId="0" animBg="1"/>
+      <p:bldP spid="11" grpId="1" animBg="1"/>
+      <p:bldP spid="12" grpId="0" animBg="1"/>
+      <p:bldP spid="12" grpId="1" animBg="1"/>
+      <p:bldP spid="46" grpId="0" animBg="1"/>
+      <p:bldP spid="19" grpId="0" animBg="1"/>
+    </p:bldLst>
+  </p:timing>
+</p:sld>
+</file>
+
 <file path=ppt/slides/slide2.xml><?xml version="1.0" encoding="utf-8"?>
 <p:sld xmlns:a="http://schemas.openxmlformats.org/drawingml/2006/main" xmlns:r="http://schemas.openxmlformats.org/officeDocument/2006/relationships" xmlns:p="http://schemas.openxmlformats.org/presentationml/2006/main">
   <p:cSld>
@@ -39169,12 +41122,12 @@
 </file>
 
 <file path=customXml/item1.xml><?xml version="1.0" encoding="utf-8"?>
-<?mso-contentType ?>
-<FormTemplates xmlns="http://schemas.microsoft.com/sharepoint/v3/contenttype/forms">
-  <Display>DocumentLibraryForm</Display>
-  <Edit>DocumentLibraryForm</Edit>
-  <New>DocumentLibraryForm</New>
-</FormTemplates>
+<p:properties xmlns:p="http://schemas.microsoft.com/office/2006/metadata/properties" xmlns:xsi="http://www.w3.org/2001/XMLSchema-instance" xmlns:pc="http://schemas.microsoft.com/office/infopath/2007/PartnerControls">
+  <documentManagement>
+    <Status xmlns="71af3243-3dd4-4a8d-8c0d-dd76da1f02a5">Not started</Status>
+    <MediaServiceKeyPoints xmlns="71af3243-3dd4-4a8d-8c0d-dd76da1f02a5" xsi:nil="true"/>
+  </documentManagement>
+</p:properties>
 </file>
 
 <file path=customXml/item2.xml><?xml version="1.0" encoding="utf-8"?>
@@ -39399,16 +41352,16 @@
 </file>
 
 <file path=customXml/item3.xml><?xml version="1.0" encoding="utf-8"?>
-<p:properties xmlns:p="http://schemas.microsoft.com/office/2006/metadata/properties" xmlns:xsi="http://www.w3.org/2001/XMLSchema-instance" xmlns:pc="http://schemas.microsoft.com/office/infopath/2007/PartnerControls">
-  <documentManagement>
-    <Status xmlns="71af3243-3dd4-4a8d-8c0d-dd76da1f02a5">Not started</Status>
-    <MediaServiceKeyPoints xmlns="71af3243-3dd4-4a8d-8c0d-dd76da1f02a5" xsi:nil="true"/>
-  </documentManagement>
-</p:properties>
+<?mso-contentType ?>
+<FormTemplates xmlns="http://schemas.microsoft.com/sharepoint/v3/contenttype/forms">
+  <Display>DocumentLibraryForm</Display>
+  <Edit>DocumentLibraryForm</Edit>
+  <New>DocumentLibraryForm</New>
+</FormTemplates>
 </file>
 
 <file path=customXml/itemProps1.xml><?xml version="1.0" encoding="utf-8"?>
-<ds:datastoreItem xmlns:ds="http://schemas.openxmlformats.org/officeDocument/2006/customXml" ds:itemID="{530CA71C-6B24-463C-853F-076A02E27CBC}">
+<ds:datastoreItem xmlns:ds="http://schemas.openxmlformats.org/officeDocument/2006/customXml" ds:itemID="{9D2E6351-E64A-42DD-A554-7DF752222129}">
   <ds:schemaRefs/>
 </ds:datastoreItem>
 </file>
@@ -39420,7 +41373,7 @@
 </file>
 
 <file path=customXml/itemProps3.xml><?xml version="1.0" encoding="utf-8"?>
-<ds:datastoreItem xmlns:ds="http://schemas.openxmlformats.org/officeDocument/2006/customXml" ds:itemID="{9D2E6351-E64A-42DD-A554-7DF752222129}">
+<ds:datastoreItem xmlns:ds="http://schemas.openxmlformats.org/officeDocument/2006/customXml" ds:itemID="{530CA71C-6B24-463C-853F-076A02E27CBC}">
   <ds:schemaRefs/>
 </ds:datastoreItem>
 </file>
</xml_diff>